<commit_message>
Starting Issue752 [Sample spreadsheet should not contain a header row] Update Issue 752 Also updated a json file that had some stale data.
</commit_message>
<xml_diff>
--- a/doc/diagrams/enrollInstructions.pptx
+++ b/doc/diagrams/enrollInstructions.pptx
@@ -196,7 +196,7 @@
             <a:fld id="{31B1A2D1-5D9E-4326-9D62-605919DFE8C4}" type="datetimeFigureOut">
               <a:rPr lang="en-US" smtClean="0"/>
               <a:pPr/>
-              <a:t>6/22/2012</a:t>
+              <a:t>4/1/2013</a:t>
             </a:fld>
             <a:endParaRPr lang="en-US"/>
           </a:p>
@@ -363,7 +363,7 @@
             <a:fld id="{3C190EC6-9769-4DC2-8137-C250C0744441}" type="datetimeFigureOut">
               <a:rPr lang="en-US" smtClean="0"/>
               <a:pPr/>
-              <a:t>6/22/2012</a:t>
+              <a:t>4/1/2013</a:t>
             </a:fld>
             <a:endParaRPr lang="en-US"/>
           </a:p>
@@ -816,7 +816,7 @@
             <a:fld id="{1D8BD707-D9CF-40AE-B4C6-C98DA3205C09}" type="datetimeFigureOut">
               <a:rPr lang="en-US" smtClean="0"/>
               <a:pPr/>
-              <a:t>6/22/2012</a:t>
+              <a:t>4/1/2013</a:t>
             </a:fld>
             <a:endParaRPr lang="en-US"/>
           </a:p>
@@ -983,7 +983,7 @@
             <a:fld id="{1D8BD707-D9CF-40AE-B4C6-C98DA3205C09}" type="datetimeFigureOut">
               <a:rPr lang="en-US" smtClean="0"/>
               <a:pPr/>
-              <a:t>6/22/2012</a:t>
+              <a:t>4/1/2013</a:t>
             </a:fld>
             <a:endParaRPr lang="en-US"/>
           </a:p>
@@ -1160,7 +1160,7 @@
             <a:fld id="{1D8BD707-D9CF-40AE-B4C6-C98DA3205C09}" type="datetimeFigureOut">
               <a:rPr lang="en-US" smtClean="0"/>
               <a:pPr/>
-              <a:t>6/22/2012</a:t>
+              <a:t>4/1/2013</a:t>
             </a:fld>
             <a:endParaRPr lang="en-US"/>
           </a:p>
@@ -1327,7 +1327,7 @@
             <a:fld id="{1D8BD707-D9CF-40AE-B4C6-C98DA3205C09}" type="datetimeFigureOut">
               <a:rPr lang="en-US" smtClean="0"/>
               <a:pPr/>
-              <a:t>6/22/2012</a:t>
+              <a:t>4/1/2013</a:t>
             </a:fld>
             <a:endParaRPr lang="en-US"/>
           </a:p>
@@ -1570,7 +1570,7 @@
             <a:fld id="{1D8BD707-D9CF-40AE-B4C6-C98DA3205C09}" type="datetimeFigureOut">
               <a:rPr lang="en-US" smtClean="0"/>
               <a:pPr/>
-              <a:t>6/22/2012</a:t>
+              <a:t>4/1/2013</a:t>
             </a:fld>
             <a:endParaRPr lang="en-US"/>
           </a:p>
@@ -1855,7 +1855,7 @@
             <a:fld id="{1D8BD707-D9CF-40AE-B4C6-C98DA3205C09}" type="datetimeFigureOut">
               <a:rPr lang="en-US" smtClean="0"/>
               <a:pPr/>
-              <a:t>6/22/2012</a:t>
+              <a:t>4/1/2013</a:t>
             </a:fld>
             <a:endParaRPr lang="en-US"/>
           </a:p>
@@ -2274,7 +2274,7 @@
             <a:fld id="{1D8BD707-D9CF-40AE-B4C6-C98DA3205C09}" type="datetimeFigureOut">
               <a:rPr lang="en-US" smtClean="0"/>
               <a:pPr/>
-              <a:t>6/22/2012</a:t>
+              <a:t>4/1/2013</a:t>
             </a:fld>
             <a:endParaRPr lang="en-US"/>
           </a:p>
@@ -2389,7 +2389,7 @@
             <a:fld id="{1D8BD707-D9CF-40AE-B4C6-C98DA3205C09}" type="datetimeFigureOut">
               <a:rPr lang="en-US" smtClean="0"/>
               <a:pPr/>
-              <a:t>6/22/2012</a:t>
+              <a:t>4/1/2013</a:t>
             </a:fld>
             <a:endParaRPr lang="en-US"/>
           </a:p>
@@ -2481,7 +2481,7 @@
             <a:fld id="{1D8BD707-D9CF-40AE-B4C6-C98DA3205C09}" type="datetimeFigureOut">
               <a:rPr lang="en-US" smtClean="0"/>
               <a:pPr/>
-              <a:t>6/22/2012</a:t>
+              <a:t>4/1/2013</a:t>
             </a:fld>
             <a:endParaRPr lang="en-US"/>
           </a:p>
@@ -2755,7 +2755,7 @@
             <a:fld id="{1D8BD707-D9CF-40AE-B4C6-C98DA3205C09}" type="datetimeFigureOut">
               <a:rPr lang="en-US" smtClean="0"/>
               <a:pPr/>
-              <a:t>6/22/2012</a:t>
+              <a:t>4/1/2013</a:t>
             </a:fld>
             <a:endParaRPr lang="en-US"/>
           </a:p>
@@ -3005,7 +3005,7 @@
             <a:fld id="{1D8BD707-D9CF-40AE-B4C6-C98DA3205C09}" type="datetimeFigureOut">
               <a:rPr lang="en-US" smtClean="0"/>
               <a:pPr/>
-              <a:t>6/22/2012</a:t>
+              <a:t>4/1/2013</a:t>
             </a:fld>
             <a:endParaRPr lang="en-US"/>
           </a:p>
@@ -3215,7 +3215,7 @@
             <a:fld id="{1D8BD707-D9CF-40AE-B4C6-C98DA3205C09}" type="datetimeFigureOut">
               <a:rPr lang="en-US" smtClean="0"/>
               <a:pPr/>
-              <a:t>6/22/2012</a:t>
+              <a:t>4/1/2013</a:t>
             </a:fld>
             <a:endParaRPr lang="en-US"/>
           </a:p>
@@ -3729,14 +3729,681 @@
       </p:cxnSp>
       <p:sp>
         <p:nvSpPr>
+          <p:cNvPr id="35" name="Rounded Rectangle 34"/>
+          <p:cNvSpPr/>
+          <p:nvPr/>
+        </p:nvSpPr>
+        <p:spPr>
+          <a:xfrm>
+            <a:off x="304800" y="228600"/>
+            <a:ext cx="8534400" cy="2667001"/>
+          </a:xfrm>
+          <a:prstGeom prst="roundRect">
+            <a:avLst>
+              <a:gd name="adj" fmla="val 7087"/>
+            </a:avLst>
+          </a:prstGeom>
+          <a:noFill/>
+          <a:ln w="9525">
+            <a:solidFill>
+              <a:schemeClr val="bg1">
+                <a:lumMod val="85000"/>
+              </a:schemeClr>
+            </a:solidFill>
+          </a:ln>
+        </p:spPr>
+        <p:style>
+          <a:lnRef idx="2">
+            <a:schemeClr val="accent1">
+              <a:shade val="50000"/>
+            </a:schemeClr>
+          </a:lnRef>
+          <a:fillRef idx="1">
+            <a:schemeClr val="accent1"/>
+          </a:fillRef>
+          <a:effectRef idx="0">
+            <a:schemeClr val="accent1"/>
+          </a:effectRef>
+          <a:fontRef idx="minor">
+            <a:schemeClr val="lt1"/>
+          </a:fontRef>
+        </p:style>
+        <p:txBody>
+          <a:bodyPr rtlCol="0" anchor="ctr"/>
+          <a:lstStyle/>
+          <a:p>
+            <a:pPr algn="ctr"/>
+            <a:endParaRPr lang="en-US"/>
+          </a:p>
+        </p:txBody>
+      </p:sp>
+      <p:sp>
+        <p:nvSpPr>
+          <p:cNvPr id="37" name="Down Arrow 3"/>
+          <p:cNvSpPr/>
+          <p:nvPr/>
+        </p:nvSpPr>
+        <p:spPr>
+          <a:xfrm>
+            <a:off x="533400" y="614962"/>
+            <a:ext cx="8153400" cy="434907"/>
+          </a:xfrm>
+          <a:custGeom>
+            <a:avLst/>
+            <a:gdLst/>
+            <a:ahLst/>
+            <a:cxnLst/>
+            <a:rect l="l" t="t" r="r" b="b"/>
+            <a:pathLst>
+              <a:path w="8153400" h="434907">
+                <a:moveTo>
+                  <a:pt x="50801" y="0"/>
+                </a:moveTo>
+                <a:lnTo>
+                  <a:pt x="8102599" y="0"/>
+                </a:lnTo>
+                <a:cubicBezTo>
+                  <a:pt x="8130656" y="0"/>
+                  <a:pt x="8153400" y="22744"/>
+                  <a:pt x="8153400" y="50801"/>
+                </a:cubicBezTo>
+                <a:lnTo>
+                  <a:pt x="8153400" y="253999"/>
+                </a:lnTo>
+                <a:cubicBezTo>
+                  <a:pt x="8153400" y="282056"/>
+                  <a:pt x="8130656" y="304800"/>
+                  <a:pt x="8102599" y="304800"/>
+                </a:cubicBezTo>
+                <a:lnTo>
+                  <a:pt x="6788150" y="304800"/>
+                </a:lnTo>
+                <a:lnTo>
+                  <a:pt x="6788150" y="367173"/>
+                </a:lnTo>
+                <a:lnTo>
+                  <a:pt x="6819900" y="367173"/>
+                </a:lnTo>
+                <a:lnTo>
+                  <a:pt x="6705600" y="434907"/>
+                </a:lnTo>
+                <a:lnTo>
+                  <a:pt x="6591300" y="367173"/>
+                </a:lnTo>
+                <a:lnTo>
+                  <a:pt x="6623050" y="367173"/>
+                </a:lnTo>
+                <a:lnTo>
+                  <a:pt x="6623050" y="304800"/>
+                </a:lnTo>
+                <a:lnTo>
+                  <a:pt x="2635250" y="304800"/>
+                </a:lnTo>
+                <a:lnTo>
+                  <a:pt x="2635250" y="367173"/>
+                </a:lnTo>
+                <a:lnTo>
+                  <a:pt x="2667000" y="367173"/>
+                </a:lnTo>
+                <a:lnTo>
+                  <a:pt x="2552700" y="434907"/>
+                </a:lnTo>
+                <a:lnTo>
+                  <a:pt x="2438400" y="367173"/>
+                </a:lnTo>
+                <a:lnTo>
+                  <a:pt x="2470150" y="367173"/>
+                </a:lnTo>
+                <a:lnTo>
+                  <a:pt x="2470150" y="304800"/>
+                </a:lnTo>
+                <a:lnTo>
+                  <a:pt x="50801" y="304800"/>
+                </a:lnTo>
+                <a:cubicBezTo>
+                  <a:pt x="22744" y="304800"/>
+                  <a:pt x="0" y="282056"/>
+                  <a:pt x="0" y="253999"/>
+                </a:cubicBezTo>
+                <a:lnTo>
+                  <a:pt x="0" y="50801"/>
+                </a:lnTo>
+                <a:cubicBezTo>
+                  <a:pt x="0" y="22744"/>
+                  <a:pt x="22744" y="0"/>
+                  <a:pt x="50801" y="0"/>
+                </a:cubicBezTo>
+                <a:close/>
+              </a:path>
+            </a:pathLst>
+          </a:custGeom>
+          <a:solidFill>
+            <a:srgbClr val="FFFFDD"/>
+          </a:solidFill>
+          <a:ln w="9525">
+            <a:solidFill>
+              <a:schemeClr val="bg1">
+                <a:lumMod val="50000"/>
+              </a:schemeClr>
+            </a:solidFill>
+          </a:ln>
+          <a:effectLst/>
+        </p:spPr>
+        <p:style>
+          <a:lnRef idx="2">
+            <a:schemeClr val="accent1">
+              <a:shade val="50000"/>
+            </a:schemeClr>
+          </a:lnRef>
+          <a:fillRef idx="1">
+            <a:schemeClr val="accent1"/>
+          </a:fillRef>
+          <a:effectRef idx="0">
+            <a:schemeClr val="accent1"/>
+          </a:effectRef>
+          <a:fontRef idx="minor">
+            <a:schemeClr val="lt1"/>
+          </a:fontRef>
+        </p:style>
+        <p:txBody>
+          <a:bodyPr wrap="square" lIns="91429" tIns="45715" rIns="91429" bIns="45715" rtlCol="0" anchor="t" anchorCtr="0">
+            <a:noAutofit/>
+          </a:bodyPr>
+          <a:lstStyle/>
+          <a:p>
+            <a:pPr marL="228600"/>
+            <a:r>
+              <a:rPr lang="en-US" sz="1100" dirty="0">
+                <a:solidFill>
+                  <a:schemeClr val="tx1"/>
+                </a:solidFill>
+              </a:rPr>
+              <a:t>You can simply copy-paste from existing spreadsheets </a:t>
+            </a:r>
+            <a:r>
+              <a:rPr lang="en-US" sz="1100" dirty="0" smtClean="0">
+                <a:solidFill>
+                  <a:schemeClr val="tx1"/>
+                </a:solidFill>
+              </a:rPr>
+              <a:t>…                                                                     </a:t>
+            </a:r>
+            <a:r>
+              <a:rPr lang="en-US" sz="1100" dirty="0">
+                <a:solidFill>
+                  <a:schemeClr val="tx1"/>
+                </a:solidFill>
+              </a:rPr>
+              <a:t>… type directly in the text </a:t>
+            </a:r>
+            <a:r>
+              <a:rPr lang="en-US" sz="1100" dirty="0" smtClean="0">
+                <a:solidFill>
+                  <a:schemeClr val="tx1"/>
+                </a:solidFill>
+              </a:rPr>
+              <a:t>box</a:t>
+            </a:r>
+            <a:endParaRPr lang="en-US" sz="1100" dirty="0">
+              <a:solidFill>
+                <a:schemeClr val="tx1"/>
+              </a:solidFill>
+            </a:endParaRPr>
+          </a:p>
+        </p:txBody>
+      </p:sp>
+      <p:sp>
+        <p:nvSpPr>
+          <p:cNvPr id="38" name="Flowchart: Connector 37"/>
+          <p:cNvSpPr/>
+          <p:nvPr/>
+        </p:nvSpPr>
+        <p:spPr>
+          <a:xfrm>
+            <a:off x="5410200" y="533401"/>
+            <a:ext cx="457200" cy="457200"/>
+          </a:xfrm>
+          <a:prstGeom prst="flowChartConnector">
+            <a:avLst/>
+          </a:prstGeom>
+          <a:solidFill>
+            <a:schemeClr val="bg1"/>
+          </a:solidFill>
+          <a:ln>
+            <a:solidFill>
+              <a:schemeClr val="bg1">
+                <a:lumMod val="85000"/>
+              </a:schemeClr>
+            </a:solidFill>
+          </a:ln>
+          <a:effectLst/>
+        </p:spPr>
+        <p:style>
+          <a:lnRef idx="2">
+            <a:schemeClr val="accent1">
+              <a:shade val="50000"/>
+            </a:schemeClr>
+          </a:lnRef>
+          <a:fillRef idx="1">
+            <a:schemeClr val="accent1"/>
+          </a:fillRef>
+          <a:effectRef idx="0">
+            <a:schemeClr val="accent1"/>
+          </a:effectRef>
+          <a:fontRef idx="minor">
+            <a:schemeClr val="lt1"/>
+          </a:fontRef>
+        </p:style>
+        <p:txBody>
+          <a:bodyPr lIns="0" tIns="0" rIns="0" bIns="0" rtlCol="0" anchor="ctr"/>
+          <a:lstStyle/>
+          <a:p>
+            <a:pPr algn="ctr"/>
+            <a:r>
+              <a:rPr lang="en-US" sz="1600" b="1" dirty="0" smtClean="0">
+                <a:solidFill>
+                  <a:schemeClr val="tx1">
+                    <a:lumMod val="50000"/>
+                    <a:lumOff val="50000"/>
+                  </a:schemeClr>
+                </a:solidFill>
+              </a:rPr>
+              <a:t>OR</a:t>
+            </a:r>
+            <a:endParaRPr lang="en-US" sz="1600" b="1" dirty="0">
+              <a:solidFill>
+                <a:schemeClr val="tx1">
+                  <a:lumMod val="50000"/>
+                  <a:lumOff val="50000"/>
+                </a:schemeClr>
+              </a:solidFill>
+            </a:endParaRPr>
+          </a:p>
+        </p:txBody>
+      </p:sp>
+      <p:sp>
+        <p:nvSpPr>
+          <p:cNvPr id="39" name="Up Arrow 25"/>
+          <p:cNvSpPr/>
+          <p:nvPr/>
+        </p:nvSpPr>
+        <p:spPr>
+          <a:xfrm>
+            <a:off x="6781800" y="1702286"/>
+            <a:ext cx="1252774" cy="507514"/>
+          </a:xfrm>
+          <a:custGeom>
+            <a:avLst/>
+            <a:gdLst/>
+            <a:ahLst/>
+            <a:cxnLst/>
+            <a:rect l="l" t="t" r="r" b="b"/>
+            <a:pathLst>
+              <a:path w="1802209" h="787886">
+                <a:moveTo>
+                  <a:pt x="495301" y="0"/>
+                </a:moveTo>
+                <a:lnTo>
+                  <a:pt x="609601" y="114300"/>
+                </a:lnTo>
+                <a:lnTo>
+                  <a:pt x="552451" y="114300"/>
+                </a:lnTo>
+                <a:lnTo>
+                  <a:pt x="552451" y="178286"/>
+                </a:lnTo>
+                <a:lnTo>
+                  <a:pt x="1700607" y="178286"/>
+                </a:lnTo>
+                <a:cubicBezTo>
+                  <a:pt x="1756720" y="178286"/>
+                  <a:pt x="1802209" y="223775"/>
+                  <a:pt x="1802209" y="279888"/>
+                </a:cubicBezTo>
+                <a:lnTo>
+                  <a:pt x="1802209" y="686284"/>
+                </a:lnTo>
+                <a:cubicBezTo>
+                  <a:pt x="1802209" y="742397"/>
+                  <a:pt x="1756720" y="787886"/>
+                  <a:pt x="1700607" y="787886"/>
+                </a:cubicBezTo>
+                <a:lnTo>
+                  <a:pt x="101602" y="787886"/>
+                </a:lnTo>
+                <a:cubicBezTo>
+                  <a:pt x="45489" y="787886"/>
+                  <a:pt x="0" y="742397"/>
+                  <a:pt x="0" y="686284"/>
+                </a:cubicBezTo>
+                <a:lnTo>
+                  <a:pt x="0" y="279888"/>
+                </a:lnTo>
+                <a:cubicBezTo>
+                  <a:pt x="0" y="223775"/>
+                  <a:pt x="45489" y="178286"/>
+                  <a:pt x="101602" y="178286"/>
+                </a:cubicBezTo>
+                <a:lnTo>
+                  <a:pt x="438150" y="178286"/>
+                </a:lnTo>
+                <a:lnTo>
+                  <a:pt x="438150" y="114300"/>
+                </a:lnTo>
+                <a:lnTo>
+                  <a:pt x="381000" y="114300"/>
+                </a:lnTo>
+                <a:close/>
+              </a:path>
+            </a:pathLst>
+          </a:custGeom>
+          <a:solidFill>
+            <a:srgbClr val="FFFFDD"/>
+          </a:solidFill>
+          <a:ln w="9525">
+            <a:solidFill>
+              <a:schemeClr val="bg1">
+                <a:lumMod val="50000"/>
+              </a:schemeClr>
+            </a:solidFill>
+          </a:ln>
+          <a:effectLst/>
+        </p:spPr>
+        <p:style>
+          <a:lnRef idx="2">
+            <a:schemeClr val="accent1">
+              <a:shade val="50000"/>
+            </a:schemeClr>
+          </a:lnRef>
+          <a:fillRef idx="1">
+            <a:schemeClr val="accent1"/>
+          </a:fillRef>
+          <a:effectRef idx="0">
+            <a:schemeClr val="accent1"/>
+          </a:effectRef>
+          <a:fontRef idx="minor">
+            <a:schemeClr val="lt1"/>
+          </a:fontRef>
+        </p:style>
+        <p:txBody>
+          <a:bodyPr wrap="square" lIns="91429" tIns="45715" rIns="91429" bIns="45715" rtlCol="0" anchor="b" anchorCtr="0">
+            <a:noAutofit/>
+          </a:bodyPr>
+          <a:lstStyle/>
+          <a:p>
+            <a:pPr algn="ctr"/>
+            <a:r>
+              <a:rPr lang="en-US" sz="1100" dirty="0">
+                <a:solidFill>
+                  <a:schemeClr val="tx1"/>
+                </a:solidFill>
+              </a:rPr>
+              <a:t>Use ‘</a:t>
+            </a:r>
+            <a:r>
+              <a:rPr lang="en-US" sz="1100" b="1" dirty="0">
+                <a:solidFill>
+                  <a:schemeClr val="tx1"/>
+                </a:solidFill>
+              </a:rPr>
+              <a:t>|</a:t>
+            </a:r>
+            <a:r>
+              <a:rPr lang="en-US" sz="1100" dirty="0">
+                <a:solidFill>
+                  <a:schemeClr val="tx1"/>
+                </a:solidFill>
+              </a:rPr>
+              <a:t>’ or </a:t>
+            </a:r>
+            <a:r>
+              <a:rPr lang="en-US" sz="1100" b="1" dirty="0">
+                <a:solidFill>
+                  <a:schemeClr val="tx1"/>
+                </a:solidFill>
+              </a:rPr>
+              <a:t>TAB</a:t>
+            </a:r>
+            <a:r>
+              <a:rPr lang="en-US" sz="1100" dirty="0">
+                <a:solidFill>
+                  <a:schemeClr val="tx1"/>
+                </a:solidFill>
+              </a:rPr>
+              <a:t> as the separator</a:t>
+            </a:r>
+            <a:endParaRPr lang="en-US" sz="1100" dirty="0">
+              <a:solidFill>
+                <a:schemeClr val="tx1">
+                  <a:lumMod val="50000"/>
+                  <a:lumOff val="50000"/>
+                </a:schemeClr>
+              </a:solidFill>
+            </a:endParaRPr>
+          </a:p>
+        </p:txBody>
+      </p:sp>
+      <p:sp>
+        <p:nvSpPr>
+          <p:cNvPr id="40" name="Up Arrow 28"/>
+          <p:cNvSpPr/>
+          <p:nvPr/>
+        </p:nvSpPr>
+        <p:spPr>
+          <a:xfrm>
+            <a:off x="3200400" y="2229644"/>
+            <a:ext cx="4038600" cy="450850"/>
+          </a:xfrm>
+          <a:custGeom>
+            <a:avLst/>
+            <a:gdLst/>
+            <a:ahLst/>
+            <a:cxnLst/>
+            <a:rect l="l" t="t" r="r" b="b"/>
+            <a:pathLst>
+              <a:path w="4876800" h="450850">
+                <a:moveTo>
+                  <a:pt x="1257299" y="0"/>
+                </a:moveTo>
+                <a:lnTo>
+                  <a:pt x="1371599" y="76200"/>
+                </a:lnTo>
+                <a:lnTo>
+                  <a:pt x="1314449" y="76200"/>
+                </a:lnTo>
+                <a:lnTo>
+                  <a:pt x="1314449" y="146050"/>
+                </a:lnTo>
+                <a:lnTo>
+                  <a:pt x="3632199" y="146050"/>
+                </a:lnTo>
+                <a:lnTo>
+                  <a:pt x="3632199" y="76200"/>
+                </a:lnTo>
+                <a:lnTo>
+                  <a:pt x="3575049" y="76200"/>
+                </a:lnTo>
+                <a:lnTo>
+                  <a:pt x="3689349" y="0"/>
+                </a:lnTo>
+                <a:lnTo>
+                  <a:pt x="3803649" y="76200"/>
+                </a:lnTo>
+                <a:lnTo>
+                  <a:pt x="3746499" y="76200"/>
+                </a:lnTo>
+                <a:lnTo>
+                  <a:pt x="3746499" y="146050"/>
+                </a:lnTo>
+                <a:lnTo>
+                  <a:pt x="4825999" y="146050"/>
+                </a:lnTo>
+                <a:cubicBezTo>
+                  <a:pt x="4854056" y="146050"/>
+                  <a:pt x="4876800" y="168794"/>
+                  <a:pt x="4876800" y="196851"/>
+                </a:cubicBezTo>
+                <a:lnTo>
+                  <a:pt x="4876800" y="400049"/>
+                </a:lnTo>
+                <a:cubicBezTo>
+                  <a:pt x="4876800" y="428106"/>
+                  <a:pt x="4854056" y="450850"/>
+                  <a:pt x="4825999" y="450850"/>
+                </a:cubicBezTo>
+                <a:lnTo>
+                  <a:pt x="50801" y="450850"/>
+                </a:lnTo>
+                <a:cubicBezTo>
+                  <a:pt x="22744" y="450850"/>
+                  <a:pt x="0" y="428106"/>
+                  <a:pt x="0" y="400049"/>
+                </a:cubicBezTo>
+                <a:lnTo>
+                  <a:pt x="0" y="196851"/>
+                </a:lnTo>
+                <a:cubicBezTo>
+                  <a:pt x="0" y="168794"/>
+                  <a:pt x="22744" y="146050"/>
+                  <a:pt x="50801" y="146050"/>
+                </a:cubicBezTo>
+                <a:lnTo>
+                  <a:pt x="1200149" y="146050"/>
+                </a:lnTo>
+                <a:lnTo>
+                  <a:pt x="1200149" y="76200"/>
+                </a:lnTo>
+                <a:lnTo>
+                  <a:pt x="1142999" y="76200"/>
+                </a:lnTo>
+                <a:close/>
+              </a:path>
+            </a:pathLst>
+          </a:custGeom>
+          <a:solidFill>
+            <a:srgbClr val="FFFFDD"/>
+          </a:solidFill>
+          <a:ln w="9525">
+            <a:solidFill>
+              <a:schemeClr val="bg1">
+                <a:lumMod val="50000"/>
+              </a:schemeClr>
+            </a:solidFill>
+          </a:ln>
+          <a:effectLst/>
+        </p:spPr>
+        <p:style>
+          <a:lnRef idx="2">
+            <a:schemeClr val="accent1">
+              <a:shade val="50000"/>
+            </a:schemeClr>
+          </a:lnRef>
+          <a:fillRef idx="1">
+            <a:schemeClr val="accent1"/>
+          </a:fillRef>
+          <a:effectRef idx="0">
+            <a:schemeClr val="accent1"/>
+          </a:effectRef>
+          <a:fontRef idx="minor">
+            <a:schemeClr val="lt1"/>
+          </a:fontRef>
+        </p:style>
+        <p:txBody>
+          <a:bodyPr wrap="square" lIns="91429" tIns="45715" rIns="91429" bIns="45715" rtlCol="0" anchor="b" anchorCtr="0">
+            <a:noAutofit/>
+          </a:bodyPr>
+          <a:lstStyle/>
+          <a:p>
+            <a:pPr algn="ctr"/>
+            <a:r>
+              <a:rPr lang="en-US" sz="1100" b="1" dirty="0">
+                <a:solidFill>
+                  <a:schemeClr val="tx1"/>
+                </a:solidFill>
+              </a:rPr>
+              <a:t>Column order: </a:t>
+            </a:r>
+            <a:r>
+              <a:rPr lang="en-US" sz="1100" dirty="0">
+                <a:solidFill>
+                  <a:schemeClr val="tx1"/>
+                </a:solidFill>
+              </a:rPr>
+              <a:t>Team id, Student name, Email, </a:t>
+            </a:r>
+            <a:r>
+              <a:rPr lang="en-US" sz="1100" dirty="0">
+                <a:solidFill>
+                  <a:schemeClr val="tx1">
+                    <a:lumMod val="50000"/>
+                    <a:lumOff val="50000"/>
+                  </a:schemeClr>
+                </a:solidFill>
+              </a:rPr>
+              <a:t>Comments (optional)</a:t>
+            </a:r>
+          </a:p>
+        </p:txBody>
+      </p:sp>
+      <p:sp>
+        <p:nvSpPr>
+          <p:cNvPr id="2" name="Rectangle 1"/>
+          <p:cNvSpPr/>
+          <p:nvPr/>
+        </p:nvSpPr>
+        <p:spPr>
+          <a:xfrm>
+            <a:off x="2717053" y="1267619"/>
+            <a:ext cx="2716117" cy="627615"/>
+          </a:xfrm>
+          <a:prstGeom prst="rect">
+            <a:avLst/>
+          </a:prstGeom>
+          <a:noFill/>
+          <a:ln>
+            <a:solidFill>
+              <a:schemeClr val="accent2">
+                <a:lumMod val="40000"/>
+                <a:lumOff val="60000"/>
+              </a:schemeClr>
+            </a:solidFill>
+          </a:ln>
+        </p:spPr>
+        <p:style>
+          <a:lnRef idx="2">
+            <a:schemeClr val="accent1">
+              <a:shade val="50000"/>
+            </a:schemeClr>
+          </a:lnRef>
+          <a:fillRef idx="1">
+            <a:schemeClr val="accent1"/>
+          </a:fillRef>
+          <a:effectRef idx="0">
+            <a:schemeClr val="accent1"/>
+          </a:effectRef>
+          <a:fontRef idx="minor">
+            <a:schemeClr val="lt1"/>
+          </a:fontRef>
+        </p:style>
+        <p:txBody>
+          <a:bodyPr rtlCol="0" anchor="ctr"/>
+          <a:lstStyle/>
+          <a:p>
+            <a:pPr algn="ctr"/>
+            <a:endParaRPr lang="en-SG"/>
+          </a:p>
+        </p:txBody>
+      </p:sp>
+      <p:sp>
+        <p:nvSpPr>
           <p:cNvPr id="34" name="Down Arrow 19"/>
           <p:cNvSpPr/>
           <p:nvPr/>
         </p:nvSpPr>
         <p:spPr>
           <a:xfrm rot="2949793">
-            <a:off x="3040165" y="1747897"/>
-            <a:ext cx="228601" cy="276989"/>
+            <a:off x="2896139" y="1842707"/>
+            <a:ext cx="162059" cy="276989"/>
           </a:xfrm>
           <a:custGeom>
             <a:avLst/>
@@ -4084,624 +4751,6 @@
                 <a:schemeClr val="tx1"/>
               </a:solidFill>
             </a:endParaRPr>
-          </a:p>
-        </p:txBody>
-      </p:sp>
-      <p:sp>
-        <p:nvSpPr>
-          <p:cNvPr id="35" name="Rounded Rectangle 34"/>
-          <p:cNvSpPr/>
-          <p:nvPr/>
-        </p:nvSpPr>
-        <p:spPr>
-          <a:xfrm>
-            <a:off x="304800" y="228600"/>
-            <a:ext cx="8534400" cy="2667001"/>
-          </a:xfrm>
-          <a:prstGeom prst="roundRect">
-            <a:avLst>
-              <a:gd name="adj" fmla="val 7087"/>
-            </a:avLst>
-          </a:prstGeom>
-          <a:noFill/>
-          <a:ln w="9525">
-            <a:solidFill>
-              <a:schemeClr val="bg1">
-                <a:lumMod val="85000"/>
-              </a:schemeClr>
-            </a:solidFill>
-          </a:ln>
-        </p:spPr>
-        <p:style>
-          <a:lnRef idx="2">
-            <a:schemeClr val="accent1">
-              <a:shade val="50000"/>
-            </a:schemeClr>
-          </a:lnRef>
-          <a:fillRef idx="1">
-            <a:schemeClr val="accent1"/>
-          </a:fillRef>
-          <a:effectRef idx="0">
-            <a:schemeClr val="accent1"/>
-          </a:effectRef>
-          <a:fontRef idx="minor">
-            <a:schemeClr val="lt1"/>
-          </a:fontRef>
-        </p:style>
-        <p:txBody>
-          <a:bodyPr rtlCol="0" anchor="ctr"/>
-          <a:lstStyle/>
-          <a:p>
-            <a:pPr algn="ctr"/>
-            <a:endParaRPr lang="en-US"/>
-          </a:p>
-        </p:txBody>
-      </p:sp>
-      <p:sp>
-        <p:nvSpPr>
-          <p:cNvPr id="37" name="Down Arrow 3"/>
-          <p:cNvSpPr/>
-          <p:nvPr/>
-        </p:nvSpPr>
-        <p:spPr>
-          <a:xfrm>
-            <a:off x="533400" y="614962"/>
-            <a:ext cx="8153400" cy="434907"/>
-          </a:xfrm>
-          <a:custGeom>
-            <a:avLst/>
-            <a:gdLst/>
-            <a:ahLst/>
-            <a:cxnLst/>
-            <a:rect l="l" t="t" r="r" b="b"/>
-            <a:pathLst>
-              <a:path w="8153400" h="434907">
-                <a:moveTo>
-                  <a:pt x="50801" y="0"/>
-                </a:moveTo>
-                <a:lnTo>
-                  <a:pt x="8102599" y="0"/>
-                </a:lnTo>
-                <a:cubicBezTo>
-                  <a:pt x="8130656" y="0"/>
-                  <a:pt x="8153400" y="22744"/>
-                  <a:pt x="8153400" y="50801"/>
-                </a:cubicBezTo>
-                <a:lnTo>
-                  <a:pt x="8153400" y="253999"/>
-                </a:lnTo>
-                <a:cubicBezTo>
-                  <a:pt x="8153400" y="282056"/>
-                  <a:pt x="8130656" y="304800"/>
-                  <a:pt x="8102599" y="304800"/>
-                </a:cubicBezTo>
-                <a:lnTo>
-                  <a:pt x="6788150" y="304800"/>
-                </a:lnTo>
-                <a:lnTo>
-                  <a:pt x="6788150" y="367173"/>
-                </a:lnTo>
-                <a:lnTo>
-                  <a:pt x="6819900" y="367173"/>
-                </a:lnTo>
-                <a:lnTo>
-                  <a:pt x="6705600" y="434907"/>
-                </a:lnTo>
-                <a:lnTo>
-                  <a:pt x="6591300" y="367173"/>
-                </a:lnTo>
-                <a:lnTo>
-                  <a:pt x="6623050" y="367173"/>
-                </a:lnTo>
-                <a:lnTo>
-                  <a:pt x="6623050" y="304800"/>
-                </a:lnTo>
-                <a:lnTo>
-                  <a:pt x="2635250" y="304800"/>
-                </a:lnTo>
-                <a:lnTo>
-                  <a:pt x="2635250" y="367173"/>
-                </a:lnTo>
-                <a:lnTo>
-                  <a:pt x="2667000" y="367173"/>
-                </a:lnTo>
-                <a:lnTo>
-                  <a:pt x="2552700" y="434907"/>
-                </a:lnTo>
-                <a:lnTo>
-                  <a:pt x="2438400" y="367173"/>
-                </a:lnTo>
-                <a:lnTo>
-                  <a:pt x="2470150" y="367173"/>
-                </a:lnTo>
-                <a:lnTo>
-                  <a:pt x="2470150" y="304800"/>
-                </a:lnTo>
-                <a:lnTo>
-                  <a:pt x="50801" y="304800"/>
-                </a:lnTo>
-                <a:cubicBezTo>
-                  <a:pt x="22744" y="304800"/>
-                  <a:pt x="0" y="282056"/>
-                  <a:pt x="0" y="253999"/>
-                </a:cubicBezTo>
-                <a:lnTo>
-                  <a:pt x="0" y="50801"/>
-                </a:lnTo>
-                <a:cubicBezTo>
-                  <a:pt x="0" y="22744"/>
-                  <a:pt x="22744" y="0"/>
-                  <a:pt x="50801" y="0"/>
-                </a:cubicBezTo>
-                <a:close/>
-              </a:path>
-            </a:pathLst>
-          </a:custGeom>
-          <a:solidFill>
-            <a:srgbClr val="FFFFDD"/>
-          </a:solidFill>
-          <a:ln w="9525">
-            <a:solidFill>
-              <a:schemeClr val="bg1">
-                <a:lumMod val="50000"/>
-              </a:schemeClr>
-            </a:solidFill>
-          </a:ln>
-          <a:effectLst/>
-        </p:spPr>
-        <p:style>
-          <a:lnRef idx="2">
-            <a:schemeClr val="accent1">
-              <a:shade val="50000"/>
-            </a:schemeClr>
-          </a:lnRef>
-          <a:fillRef idx="1">
-            <a:schemeClr val="accent1"/>
-          </a:fillRef>
-          <a:effectRef idx="0">
-            <a:schemeClr val="accent1"/>
-          </a:effectRef>
-          <a:fontRef idx="minor">
-            <a:schemeClr val="lt1"/>
-          </a:fontRef>
-        </p:style>
-        <p:txBody>
-          <a:bodyPr wrap="square" lIns="91429" tIns="45715" rIns="91429" bIns="45715" rtlCol="0" anchor="t" anchorCtr="0">
-            <a:noAutofit/>
-          </a:bodyPr>
-          <a:lstStyle/>
-          <a:p>
-            <a:pPr marL="228600"/>
-            <a:r>
-              <a:rPr lang="en-US" sz="1100" dirty="0">
-                <a:solidFill>
-                  <a:schemeClr val="tx1"/>
-                </a:solidFill>
-              </a:rPr>
-              <a:t>You can simply copy-paste from existing spreadsheets </a:t>
-            </a:r>
-            <a:r>
-              <a:rPr lang="en-US" sz="1100" dirty="0" smtClean="0">
-                <a:solidFill>
-                  <a:schemeClr val="tx1"/>
-                </a:solidFill>
-              </a:rPr>
-              <a:t>…                                                                     </a:t>
-            </a:r>
-            <a:r>
-              <a:rPr lang="en-US" sz="1100" dirty="0">
-                <a:solidFill>
-                  <a:schemeClr val="tx1"/>
-                </a:solidFill>
-              </a:rPr>
-              <a:t>… type directly in the text </a:t>
-            </a:r>
-            <a:r>
-              <a:rPr lang="en-US" sz="1100" dirty="0" smtClean="0">
-                <a:solidFill>
-                  <a:schemeClr val="tx1"/>
-                </a:solidFill>
-              </a:rPr>
-              <a:t>box</a:t>
-            </a:r>
-            <a:endParaRPr lang="en-US" sz="1100" dirty="0">
-              <a:solidFill>
-                <a:schemeClr val="tx1"/>
-              </a:solidFill>
-            </a:endParaRPr>
-          </a:p>
-        </p:txBody>
-      </p:sp>
-      <p:sp>
-        <p:nvSpPr>
-          <p:cNvPr id="38" name="Flowchart: Connector 37"/>
-          <p:cNvSpPr/>
-          <p:nvPr/>
-        </p:nvSpPr>
-        <p:spPr>
-          <a:xfrm>
-            <a:off x="5410200" y="533401"/>
-            <a:ext cx="457200" cy="457200"/>
-          </a:xfrm>
-          <a:prstGeom prst="flowChartConnector">
-            <a:avLst/>
-          </a:prstGeom>
-          <a:solidFill>
-            <a:schemeClr val="bg1"/>
-          </a:solidFill>
-          <a:ln>
-            <a:solidFill>
-              <a:schemeClr val="bg1">
-                <a:lumMod val="85000"/>
-              </a:schemeClr>
-            </a:solidFill>
-          </a:ln>
-          <a:effectLst/>
-        </p:spPr>
-        <p:style>
-          <a:lnRef idx="2">
-            <a:schemeClr val="accent1">
-              <a:shade val="50000"/>
-            </a:schemeClr>
-          </a:lnRef>
-          <a:fillRef idx="1">
-            <a:schemeClr val="accent1"/>
-          </a:fillRef>
-          <a:effectRef idx="0">
-            <a:schemeClr val="accent1"/>
-          </a:effectRef>
-          <a:fontRef idx="minor">
-            <a:schemeClr val="lt1"/>
-          </a:fontRef>
-        </p:style>
-        <p:txBody>
-          <a:bodyPr lIns="0" tIns="0" rIns="0" bIns="0" rtlCol="0" anchor="ctr"/>
-          <a:lstStyle/>
-          <a:p>
-            <a:pPr algn="ctr"/>
-            <a:r>
-              <a:rPr lang="en-US" sz="1600" b="1" dirty="0" smtClean="0">
-                <a:solidFill>
-                  <a:schemeClr val="tx1">
-                    <a:lumMod val="50000"/>
-                    <a:lumOff val="50000"/>
-                  </a:schemeClr>
-                </a:solidFill>
-              </a:rPr>
-              <a:t>OR</a:t>
-            </a:r>
-            <a:endParaRPr lang="en-US" sz="1600" b="1" dirty="0">
-              <a:solidFill>
-                <a:schemeClr val="tx1">
-                  <a:lumMod val="50000"/>
-                  <a:lumOff val="50000"/>
-                </a:schemeClr>
-              </a:solidFill>
-            </a:endParaRPr>
-          </a:p>
-        </p:txBody>
-      </p:sp>
-      <p:sp>
-        <p:nvSpPr>
-          <p:cNvPr id="39" name="Up Arrow 25"/>
-          <p:cNvSpPr/>
-          <p:nvPr/>
-        </p:nvSpPr>
-        <p:spPr>
-          <a:xfrm>
-            <a:off x="6781800" y="1702286"/>
-            <a:ext cx="1252774" cy="507514"/>
-          </a:xfrm>
-          <a:custGeom>
-            <a:avLst/>
-            <a:gdLst/>
-            <a:ahLst/>
-            <a:cxnLst/>
-            <a:rect l="l" t="t" r="r" b="b"/>
-            <a:pathLst>
-              <a:path w="1802209" h="787886">
-                <a:moveTo>
-                  <a:pt x="495301" y="0"/>
-                </a:moveTo>
-                <a:lnTo>
-                  <a:pt x="609601" y="114300"/>
-                </a:lnTo>
-                <a:lnTo>
-                  <a:pt x="552451" y="114300"/>
-                </a:lnTo>
-                <a:lnTo>
-                  <a:pt x="552451" y="178286"/>
-                </a:lnTo>
-                <a:lnTo>
-                  <a:pt x="1700607" y="178286"/>
-                </a:lnTo>
-                <a:cubicBezTo>
-                  <a:pt x="1756720" y="178286"/>
-                  <a:pt x="1802209" y="223775"/>
-                  <a:pt x="1802209" y="279888"/>
-                </a:cubicBezTo>
-                <a:lnTo>
-                  <a:pt x="1802209" y="686284"/>
-                </a:lnTo>
-                <a:cubicBezTo>
-                  <a:pt x="1802209" y="742397"/>
-                  <a:pt x="1756720" y="787886"/>
-                  <a:pt x="1700607" y="787886"/>
-                </a:cubicBezTo>
-                <a:lnTo>
-                  <a:pt x="101602" y="787886"/>
-                </a:lnTo>
-                <a:cubicBezTo>
-                  <a:pt x="45489" y="787886"/>
-                  <a:pt x="0" y="742397"/>
-                  <a:pt x="0" y="686284"/>
-                </a:cubicBezTo>
-                <a:lnTo>
-                  <a:pt x="0" y="279888"/>
-                </a:lnTo>
-                <a:cubicBezTo>
-                  <a:pt x="0" y="223775"/>
-                  <a:pt x="45489" y="178286"/>
-                  <a:pt x="101602" y="178286"/>
-                </a:cubicBezTo>
-                <a:lnTo>
-                  <a:pt x="438150" y="178286"/>
-                </a:lnTo>
-                <a:lnTo>
-                  <a:pt x="438150" y="114300"/>
-                </a:lnTo>
-                <a:lnTo>
-                  <a:pt x="381000" y="114300"/>
-                </a:lnTo>
-                <a:close/>
-              </a:path>
-            </a:pathLst>
-          </a:custGeom>
-          <a:solidFill>
-            <a:srgbClr val="FFFFDD"/>
-          </a:solidFill>
-          <a:ln w="9525">
-            <a:solidFill>
-              <a:schemeClr val="bg1">
-                <a:lumMod val="50000"/>
-              </a:schemeClr>
-            </a:solidFill>
-          </a:ln>
-          <a:effectLst/>
-        </p:spPr>
-        <p:style>
-          <a:lnRef idx="2">
-            <a:schemeClr val="accent1">
-              <a:shade val="50000"/>
-            </a:schemeClr>
-          </a:lnRef>
-          <a:fillRef idx="1">
-            <a:schemeClr val="accent1"/>
-          </a:fillRef>
-          <a:effectRef idx="0">
-            <a:schemeClr val="accent1"/>
-          </a:effectRef>
-          <a:fontRef idx="minor">
-            <a:schemeClr val="lt1"/>
-          </a:fontRef>
-        </p:style>
-        <p:txBody>
-          <a:bodyPr wrap="square" lIns="91429" tIns="45715" rIns="91429" bIns="45715" rtlCol="0" anchor="b" anchorCtr="0">
-            <a:noAutofit/>
-          </a:bodyPr>
-          <a:lstStyle/>
-          <a:p>
-            <a:pPr algn="ctr"/>
-            <a:r>
-              <a:rPr lang="en-US" sz="1100" dirty="0">
-                <a:solidFill>
-                  <a:schemeClr val="tx1"/>
-                </a:solidFill>
-              </a:rPr>
-              <a:t>Use ‘</a:t>
-            </a:r>
-            <a:r>
-              <a:rPr lang="en-US" sz="1100" b="1" dirty="0">
-                <a:solidFill>
-                  <a:schemeClr val="tx1"/>
-                </a:solidFill>
-              </a:rPr>
-              <a:t>|</a:t>
-            </a:r>
-            <a:r>
-              <a:rPr lang="en-US" sz="1100" dirty="0">
-                <a:solidFill>
-                  <a:schemeClr val="tx1"/>
-                </a:solidFill>
-              </a:rPr>
-              <a:t>’ or </a:t>
-            </a:r>
-            <a:r>
-              <a:rPr lang="en-US" sz="1100" b="1" dirty="0">
-                <a:solidFill>
-                  <a:schemeClr val="tx1"/>
-                </a:solidFill>
-              </a:rPr>
-              <a:t>TAB</a:t>
-            </a:r>
-            <a:r>
-              <a:rPr lang="en-US" sz="1100" dirty="0">
-                <a:solidFill>
-                  <a:schemeClr val="tx1"/>
-                </a:solidFill>
-              </a:rPr>
-              <a:t> as the separator</a:t>
-            </a:r>
-            <a:endParaRPr lang="en-US" sz="1100" dirty="0">
-              <a:solidFill>
-                <a:schemeClr val="tx1">
-                  <a:lumMod val="50000"/>
-                  <a:lumOff val="50000"/>
-                </a:schemeClr>
-              </a:solidFill>
-            </a:endParaRPr>
-          </a:p>
-        </p:txBody>
-      </p:sp>
-      <p:sp>
-        <p:nvSpPr>
-          <p:cNvPr id="40" name="Up Arrow 28"/>
-          <p:cNvSpPr/>
-          <p:nvPr/>
-        </p:nvSpPr>
-        <p:spPr>
-          <a:xfrm>
-            <a:off x="3200400" y="2229644"/>
-            <a:ext cx="4038600" cy="450850"/>
-          </a:xfrm>
-          <a:custGeom>
-            <a:avLst/>
-            <a:gdLst/>
-            <a:ahLst/>
-            <a:cxnLst/>
-            <a:rect l="l" t="t" r="r" b="b"/>
-            <a:pathLst>
-              <a:path w="4876800" h="450850">
-                <a:moveTo>
-                  <a:pt x="1257299" y="0"/>
-                </a:moveTo>
-                <a:lnTo>
-                  <a:pt x="1371599" y="76200"/>
-                </a:lnTo>
-                <a:lnTo>
-                  <a:pt x="1314449" y="76200"/>
-                </a:lnTo>
-                <a:lnTo>
-                  <a:pt x="1314449" y="146050"/>
-                </a:lnTo>
-                <a:lnTo>
-                  <a:pt x="3632199" y="146050"/>
-                </a:lnTo>
-                <a:lnTo>
-                  <a:pt x="3632199" y="76200"/>
-                </a:lnTo>
-                <a:lnTo>
-                  <a:pt x="3575049" y="76200"/>
-                </a:lnTo>
-                <a:lnTo>
-                  <a:pt x="3689349" y="0"/>
-                </a:lnTo>
-                <a:lnTo>
-                  <a:pt x="3803649" y="76200"/>
-                </a:lnTo>
-                <a:lnTo>
-                  <a:pt x="3746499" y="76200"/>
-                </a:lnTo>
-                <a:lnTo>
-                  <a:pt x="3746499" y="146050"/>
-                </a:lnTo>
-                <a:lnTo>
-                  <a:pt x="4825999" y="146050"/>
-                </a:lnTo>
-                <a:cubicBezTo>
-                  <a:pt x="4854056" y="146050"/>
-                  <a:pt x="4876800" y="168794"/>
-                  <a:pt x="4876800" y="196851"/>
-                </a:cubicBezTo>
-                <a:lnTo>
-                  <a:pt x="4876800" y="400049"/>
-                </a:lnTo>
-                <a:cubicBezTo>
-                  <a:pt x="4876800" y="428106"/>
-                  <a:pt x="4854056" y="450850"/>
-                  <a:pt x="4825999" y="450850"/>
-                </a:cubicBezTo>
-                <a:lnTo>
-                  <a:pt x="50801" y="450850"/>
-                </a:lnTo>
-                <a:cubicBezTo>
-                  <a:pt x="22744" y="450850"/>
-                  <a:pt x="0" y="428106"/>
-                  <a:pt x="0" y="400049"/>
-                </a:cubicBezTo>
-                <a:lnTo>
-                  <a:pt x="0" y="196851"/>
-                </a:lnTo>
-                <a:cubicBezTo>
-                  <a:pt x="0" y="168794"/>
-                  <a:pt x="22744" y="146050"/>
-                  <a:pt x="50801" y="146050"/>
-                </a:cubicBezTo>
-                <a:lnTo>
-                  <a:pt x="1200149" y="146050"/>
-                </a:lnTo>
-                <a:lnTo>
-                  <a:pt x="1200149" y="76200"/>
-                </a:lnTo>
-                <a:lnTo>
-                  <a:pt x="1142999" y="76200"/>
-                </a:lnTo>
-                <a:close/>
-              </a:path>
-            </a:pathLst>
-          </a:custGeom>
-          <a:solidFill>
-            <a:srgbClr val="FFFFDD"/>
-          </a:solidFill>
-          <a:ln w="9525">
-            <a:solidFill>
-              <a:schemeClr val="bg1">
-                <a:lumMod val="50000"/>
-              </a:schemeClr>
-            </a:solidFill>
-          </a:ln>
-          <a:effectLst/>
-        </p:spPr>
-        <p:style>
-          <a:lnRef idx="2">
-            <a:schemeClr val="accent1">
-              <a:shade val="50000"/>
-            </a:schemeClr>
-          </a:lnRef>
-          <a:fillRef idx="1">
-            <a:schemeClr val="accent1"/>
-          </a:fillRef>
-          <a:effectRef idx="0">
-            <a:schemeClr val="accent1"/>
-          </a:effectRef>
-          <a:fontRef idx="minor">
-            <a:schemeClr val="lt1"/>
-          </a:fontRef>
-        </p:style>
-        <p:txBody>
-          <a:bodyPr wrap="square" lIns="91429" tIns="45715" rIns="91429" bIns="45715" rtlCol="0" anchor="b" anchorCtr="0">
-            <a:noAutofit/>
-          </a:bodyPr>
-          <a:lstStyle/>
-          <a:p>
-            <a:pPr algn="ctr"/>
-            <a:r>
-              <a:rPr lang="en-US" sz="1100" b="1" dirty="0">
-                <a:solidFill>
-                  <a:schemeClr val="tx1"/>
-                </a:solidFill>
-              </a:rPr>
-              <a:t>Column order: </a:t>
-            </a:r>
-            <a:r>
-              <a:rPr lang="en-US" sz="1100" dirty="0">
-                <a:solidFill>
-                  <a:schemeClr val="tx1"/>
-                </a:solidFill>
-              </a:rPr>
-              <a:t>Team id, Student name, Email, </a:t>
-            </a:r>
-            <a:r>
-              <a:rPr lang="en-US" sz="1100" dirty="0">
-                <a:solidFill>
-                  <a:schemeClr val="tx1">
-                    <a:lumMod val="50000"/>
-                    <a:lumOff val="50000"/>
-                  </a:schemeClr>
-                </a:solidFill>
-              </a:rPr>
-              <a:t>Comments (optional)</a:t>
-            </a:r>
           </a:p>
         </p:txBody>
       </p:sp>

</xml_diff>

<commit_message>
Issue 1414: Create a new image for enroll instructions Update Issue 1414
</commit_message>
<xml_diff>
--- a/doc/diagrams/enrollInstructions.pptx
+++ b/doc/diagrams/enrollInstructions.pptx
@@ -5,22 +5,23 @@
     <p:sldMasterId id="2147483648" r:id="rId1"/>
   </p:sldMasterIdLst>
   <p:notesMasterIdLst>
-    <p:notesMasterId r:id="rId3"/>
+    <p:notesMasterId r:id="rId4"/>
   </p:notesMasterIdLst>
   <p:handoutMasterIdLst>
-    <p:handoutMasterId r:id="rId4"/>
+    <p:handoutMasterId r:id="rId5"/>
   </p:handoutMasterIdLst>
   <p:sldIdLst>
     <p:sldId id="259" r:id="rId2"/>
+    <p:sldId id="260" r:id="rId3"/>
   </p:sldIdLst>
-  <p:sldSz cx="9144000" cy="3240088"/>
+  <p:sldSz cx="8640763" cy="2160588"/>
   <p:notesSz cx="9856788" cy="6784975"/>
   <p:defaultTextStyle>
     <a:defPPr>
       <a:defRPr lang="en-US"/>
     </a:defPPr>
-    <a:lvl1pPr marL="0" algn="l" defTabSz="914046" rtl="0" eaLnBrk="1" latinLnBrk="0" hangingPunct="1">
-      <a:defRPr sz="1800" kern="1200">
+    <a:lvl1pPr marL="0" algn="l" defTabSz="862128" rtl="0" eaLnBrk="1" latinLnBrk="0" hangingPunct="1">
+      <a:defRPr sz="1700" kern="1200">
         <a:solidFill>
           <a:schemeClr val="tx1"/>
         </a:solidFill>
@@ -29,8 +30,8 @@
         <a:cs typeface="+mn-cs"/>
       </a:defRPr>
     </a:lvl1pPr>
-    <a:lvl2pPr marL="457023" algn="l" defTabSz="914046" rtl="0" eaLnBrk="1" latinLnBrk="0" hangingPunct="1">
-      <a:defRPr sz="1800" kern="1200">
+    <a:lvl2pPr marL="431064" algn="l" defTabSz="862128" rtl="0" eaLnBrk="1" latinLnBrk="0" hangingPunct="1">
+      <a:defRPr sz="1700" kern="1200">
         <a:solidFill>
           <a:schemeClr val="tx1"/>
         </a:solidFill>
@@ -39,8 +40,8 @@
         <a:cs typeface="+mn-cs"/>
       </a:defRPr>
     </a:lvl2pPr>
-    <a:lvl3pPr marL="914046" algn="l" defTabSz="914046" rtl="0" eaLnBrk="1" latinLnBrk="0" hangingPunct="1">
-      <a:defRPr sz="1800" kern="1200">
+    <a:lvl3pPr marL="862128" algn="l" defTabSz="862128" rtl="0" eaLnBrk="1" latinLnBrk="0" hangingPunct="1">
+      <a:defRPr sz="1700" kern="1200">
         <a:solidFill>
           <a:schemeClr val="tx1"/>
         </a:solidFill>
@@ -49,8 +50,8 @@
         <a:cs typeface="+mn-cs"/>
       </a:defRPr>
     </a:lvl3pPr>
-    <a:lvl4pPr marL="1371070" algn="l" defTabSz="914046" rtl="0" eaLnBrk="1" latinLnBrk="0" hangingPunct="1">
-      <a:defRPr sz="1800" kern="1200">
+    <a:lvl4pPr marL="1293193" algn="l" defTabSz="862128" rtl="0" eaLnBrk="1" latinLnBrk="0" hangingPunct="1">
+      <a:defRPr sz="1700" kern="1200">
         <a:solidFill>
           <a:schemeClr val="tx1"/>
         </a:solidFill>
@@ -59,8 +60,8 @@
         <a:cs typeface="+mn-cs"/>
       </a:defRPr>
     </a:lvl4pPr>
-    <a:lvl5pPr marL="1828093" algn="l" defTabSz="914046" rtl="0" eaLnBrk="1" latinLnBrk="0" hangingPunct="1">
-      <a:defRPr sz="1800" kern="1200">
+    <a:lvl5pPr marL="1724257" algn="l" defTabSz="862128" rtl="0" eaLnBrk="1" latinLnBrk="0" hangingPunct="1">
+      <a:defRPr sz="1700" kern="1200">
         <a:solidFill>
           <a:schemeClr val="tx1"/>
         </a:solidFill>
@@ -69,8 +70,8 @@
         <a:cs typeface="+mn-cs"/>
       </a:defRPr>
     </a:lvl5pPr>
-    <a:lvl6pPr marL="2285116" algn="l" defTabSz="914046" rtl="0" eaLnBrk="1" latinLnBrk="0" hangingPunct="1">
-      <a:defRPr sz="1800" kern="1200">
+    <a:lvl6pPr marL="2155321" algn="l" defTabSz="862128" rtl="0" eaLnBrk="1" latinLnBrk="0" hangingPunct="1">
+      <a:defRPr sz="1700" kern="1200">
         <a:solidFill>
           <a:schemeClr val="tx1"/>
         </a:solidFill>
@@ -79,8 +80,8 @@
         <a:cs typeface="+mn-cs"/>
       </a:defRPr>
     </a:lvl6pPr>
-    <a:lvl7pPr marL="2742139" algn="l" defTabSz="914046" rtl="0" eaLnBrk="1" latinLnBrk="0" hangingPunct="1">
-      <a:defRPr sz="1800" kern="1200">
+    <a:lvl7pPr marL="2586386" algn="l" defTabSz="862128" rtl="0" eaLnBrk="1" latinLnBrk="0" hangingPunct="1">
+      <a:defRPr sz="1700" kern="1200">
         <a:solidFill>
           <a:schemeClr val="tx1"/>
         </a:solidFill>
@@ -89,8 +90,8 @@
         <a:cs typeface="+mn-cs"/>
       </a:defRPr>
     </a:lvl7pPr>
-    <a:lvl8pPr marL="3199161" algn="l" defTabSz="914046" rtl="0" eaLnBrk="1" latinLnBrk="0" hangingPunct="1">
-      <a:defRPr sz="1800" kern="1200">
+    <a:lvl8pPr marL="3017449" algn="l" defTabSz="862128" rtl="0" eaLnBrk="1" latinLnBrk="0" hangingPunct="1">
+      <a:defRPr sz="1700" kern="1200">
         <a:solidFill>
           <a:schemeClr val="tx1"/>
         </a:solidFill>
@@ -99,8 +100,8 @@
         <a:cs typeface="+mn-cs"/>
       </a:defRPr>
     </a:lvl8pPr>
-    <a:lvl9pPr marL="3656185" algn="l" defTabSz="914046" rtl="0" eaLnBrk="1" latinLnBrk="0" hangingPunct="1">
-      <a:defRPr sz="1800" kern="1200">
+    <a:lvl9pPr marL="3448514" algn="l" defTabSz="862128" rtl="0" eaLnBrk="1" latinLnBrk="0" hangingPunct="1">
+      <a:defRPr sz="1700" kern="1200">
         <a:solidFill>
           <a:schemeClr val="tx1"/>
         </a:solidFill>
@@ -196,7 +197,7 @@
             <a:fld id="{31B1A2D1-5D9E-4326-9D62-605919DFE8C4}" type="datetimeFigureOut">
               <a:rPr lang="en-US" smtClean="0"/>
               <a:pPr/>
-              <a:t>4/1/2013</a:t>
+              <a:t>1/4/2014</a:t>
             </a:fld>
             <a:endParaRPr lang="en-US"/>
           </a:p>
@@ -363,7 +364,7 @@
             <a:fld id="{3C190EC6-9769-4DC2-8137-C250C0744441}" type="datetimeFigureOut">
               <a:rPr lang="en-US" smtClean="0"/>
               <a:pPr/>
-              <a:t>4/1/2013</a:t>
+              <a:t>1/4/2014</a:t>
             </a:fld>
             <a:endParaRPr lang="en-US"/>
           </a:p>
@@ -381,8 +382,8 @@
         </p:nvSpPr>
         <p:spPr>
           <a:xfrm>
-            <a:off x="1339850" y="509588"/>
-            <a:ext cx="7177088" cy="2543175"/>
+            <a:off x="-155575" y="509588"/>
+            <a:ext cx="10167938" cy="2543175"/>
           </a:xfrm>
           <a:prstGeom prst="rect">
             <a:avLst/>
@@ -540,8 +541,8 @@
   </p:cSld>
   <p:clrMap bg1="lt1" tx1="dk1" bg2="lt2" tx2="dk2" accent1="accent1" accent2="accent2" accent3="accent3" accent4="accent4" accent5="accent5" accent6="accent6" hlink="hlink" folHlink="folHlink"/>
   <p:notesStyle>
-    <a:lvl1pPr marL="0" algn="l" defTabSz="914046" rtl="0" eaLnBrk="1" latinLnBrk="0" hangingPunct="1">
-      <a:defRPr sz="1200" kern="1200">
+    <a:lvl1pPr marL="0" algn="l" defTabSz="862128" rtl="0" eaLnBrk="1" latinLnBrk="0" hangingPunct="1">
+      <a:defRPr sz="1100" kern="1200">
         <a:solidFill>
           <a:schemeClr val="tx1"/>
         </a:solidFill>
@@ -550,8 +551,8 @@
         <a:cs typeface="+mn-cs"/>
       </a:defRPr>
     </a:lvl1pPr>
-    <a:lvl2pPr marL="457023" algn="l" defTabSz="914046" rtl="0" eaLnBrk="1" latinLnBrk="0" hangingPunct="1">
-      <a:defRPr sz="1200" kern="1200">
+    <a:lvl2pPr marL="431064" algn="l" defTabSz="862128" rtl="0" eaLnBrk="1" latinLnBrk="0" hangingPunct="1">
+      <a:defRPr sz="1100" kern="1200">
         <a:solidFill>
           <a:schemeClr val="tx1"/>
         </a:solidFill>
@@ -560,8 +561,8 @@
         <a:cs typeface="+mn-cs"/>
       </a:defRPr>
     </a:lvl2pPr>
-    <a:lvl3pPr marL="914046" algn="l" defTabSz="914046" rtl="0" eaLnBrk="1" latinLnBrk="0" hangingPunct="1">
-      <a:defRPr sz="1200" kern="1200">
+    <a:lvl3pPr marL="862128" algn="l" defTabSz="862128" rtl="0" eaLnBrk="1" latinLnBrk="0" hangingPunct="1">
+      <a:defRPr sz="1100" kern="1200">
         <a:solidFill>
           <a:schemeClr val="tx1"/>
         </a:solidFill>
@@ -570,8 +571,8 @@
         <a:cs typeface="+mn-cs"/>
       </a:defRPr>
     </a:lvl3pPr>
-    <a:lvl4pPr marL="1371070" algn="l" defTabSz="914046" rtl="0" eaLnBrk="1" latinLnBrk="0" hangingPunct="1">
-      <a:defRPr sz="1200" kern="1200">
+    <a:lvl4pPr marL="1293193" algn="l" defTabSz="862128" rtl="0" eaLnBrk="1" latinLnBrk="0" hangingPunct="1">
+      <a:defRPr sz="1100" kern="1200">
         <a:solidFill>
           <a:schemeClr val="tx1"/>
         </a:solidFill>
@@ -580,8 +581,8 @@
         <a:cs typeface="+mn-cs"/>
       </a:defRPr>
     </a:lvl4pPr>
-    <a:lvl5pPr marL="1828093" algn="l" defTabSz="914046" rtl="0" eaLnBrk="1" latinLnBrk="0" hangingPunct="1">
-      <a:defRPr sz="1200" kern="1200">
+    <a:lvl5pPr marL="1724257" algn="l" defTabSz="862128" rtl="0" eaLnBrk="1" latinLnBrk="0" hangingPunct="1">
+      <a:defRPr sz="1100" kern="1200">
         <a:solidFill>
           <a:schemeClr val="tx1"/>
         </a:solidFill>
@@ -590,8 +591,8 @@
         <a:cs typeface="+mn-cs"/>
       </a:defRPr>
     </a:lvl5pPr>
-    <a:lvl6pPr marL="2285116" algn="l" defTabSz="914046" rtl="0" eaLnBrk="1" latinLnBrk="0" hangingPunct="1">
-      <a:defRPr sz="1200" kern="1200">
+    <a:lvl6pPr marL="2155321" algn="l" defTabSz="862128" rtl="0" eaLnBrk="1" latinLnBrk="0" hangingPunct="1">
+      <a:defRPr sz="1100" kern="1200">
         <a:solidFill>
           <a:schemeClr val="tx1"/>
         </a:solidFill>
@@ -600,8 +601,8 @@
         <a:cs typeface="+mn-cs"/>
       </a:defRPr>
     </a:lvl6pPr>
-    <a:lvl7pPr marL="2742139" algn="l" defTabSz="914046" rtl="0" eaLnBrk="1" latinLnBrk="0" hangingPunct="1">
-      <a:defRPr sz="1200" kern="1200">
+    <a:lvl7pPr marL="2586386" algn="l" defTabSz="862128" rtl="0" eaLnBrk="1" latinLnBrk="0" hangingPunct="1">
+      <a:defRPr sz="1100" kern="1200">
         <a:solidFill>
           <a:schemeClr val="tx1"/>
         </a:solidFill>
@@ -610,8 +611,8 @@
         <a:cs typeface="+mn-cs"/>
       </a:defRPr>
     </a:lvl7pPr>
-    <a:lvl8pPr marL="3199161" algn="l" defTabSz="914046" rtl="0" eaLnBrk="1" latinLnBrk="0" hangingPunct="1">
-      <a:defRPr sz="1200" kern="1200">
+    <a:lvl8pPr marL="3017449" algn="l" defTabSz="862128" rtl="0" eaLnBrk="1" latinLnBrk="0" hangingPunct="1">
+      <a:defRPr sz="1100" kern="1200">
         <a:solidFill>
           <a:schemeClr val="tx1"/>
         </a:solidFill>
@@ -620,8 +621,8 @@
         <a:cs typeface="+mn-cs"/>
       </a:defRPr>
     </a:lvl8pPr>
-    <a:lvl9pPr marL="3656185" algn="l" defTabSz="914046" rtl="0" eaLnBrk="1" latinLnBrk="0" hangingPunct="1">
-      <a:defRPr sz="1200" kern="1200">
+    <a:lvl9pPr marL="3448514" algn="l" defTabSz="862128" rtl="0" eaLnBrk="1" latinLnBrk="0" hangingPunct="1">
+      <a:defRPr sz="1100" kern="1200">
         <a:solidFill>
           <a:schemeClr val="tx1"/>
         </a:solidFill>
@@ -663,8 +664,8 @@
         </p:nvSpPr>
         <p:spPr>
           <a:xfrm>
-            <a:off x="685800" y="1006530"/>
-            <a:ext cx="7772400" cy="694519"/>
+            <a:off x="648059" y="671186"/>
+            <a:ext cx="7344649" cy="463127"/>
           </a:xfrm>
         </p:spPr>
         <p:txBody>
@@ -691,8 +692,8 @@
         </p:nvSpPr>
         <p:spPr>
           <a:xfrm>
-            <a:off x="1371601" y="1836050"/>
-            <a:ext cx="6400800" cy="828023"/>
+            <a:off x="1296115" y="1224334"/>
+            <a:ext cx="6048534" cy="552150"/>
           </a:xfrm>
         </p:spPr>
         <p:txBody>
@@ -708,7 +709,7 @@
                 </a:solidFill>
               </a:defRPr>
             </a:lvl1pPr>
-            <a:lvl2pPr marL="457023" indent="0" algn="ctr">
+            <a:lvl2pPr marL="431064" indent="0" algn="ctr">
               <a:buNone/>
               <a:defRPr>
                 <a:solidFill>
@@ -718,7 +719,7 @@
                 </a:solidFill>
               </a:defRPr>
             </a:lvl2pPr>
-            <a:lvl3pPr marL="914046" indent="0" algn="ctr">
+            <a:lvl3pPr marL="862128" indent="0" algn="ctr">
               <a:buNone/>
               <a:defRPr>
                 <a:solidFill>
@@ -728,7 +729,7 @@
                 </a:solidFill>
               </a:defRPr>
             </a:lvl3pPr>
-            <a:lvl4pPr marL="1371070" indent="0" algn="ctr">
+            <a:lvl4pPr marL="1293193" indent="0" algn="ctr">
               <a:buNone/>
               <a:defRPr>
                 <a:solidFill>
@@ -738,7 +739,7 @@
                 </a:solidFill>
               </a:defRPr>
             </a:lvl4pPr>
-            <a:lvl5pPr marL="1828093" indent="0" algn="ctr">
+            <a:lvl5pPr marL="1724257" indent="0" algn="ctr">
               <a:buNone/>
               <a:defRPr>
                 <a:solidFill>
@@ -748,7 +749,7 @@
                 </a:solidFill>
               </a:defRPr>
             </a:lvl5pPr>
-            <a:lvl6pPr marL="2285116" indent="0" algn="ctr">
+            <a:lvl6pPr marL="2155321" indent="0" algn="ctr">
               <a:buNone/>
               <a:defRPr>
                 <a:solidFill>
@@ -758,7 +759,7 @@
                 </a:solidFill>
               </a:defRPr>
             </a:lvl6pPr>
-            <a:lvl7pPr marL="2742139" indent="0" algn="ctr">
+            <a:lvl7pPr marL="2586386" indent="0" algn="ctr">
               <a:buNone/>
               <a:defRPr>
                 <a:solidFill>
@@ -768,7 +769,7 @@
                 </a:solidFill>
               </a:defRPr>
             </a:lvl7pPr>
-            <a:lvl8pPr marL="3199161" indent="0" algn="ctr">
+            <a:lvl8pPr marL="3017449" indent="0" algn="ctr">
               <a:buNone/>
               <a:defRPr>
                 <a:solidFill>
@@ -778,7 +779,7 @@
                 </a:solidFill>
               </a:defRPr>
             </a:lvl8pPr>
-            <a:lvl9pPr marL="3656185" indent="0" algn="ctr">
+            <a:lvl9pPr marL="3448514" indent="0" algn="ctr">
               <a:buNone/>
               <a:defRPr>
                 <a:solidFill>
@@ -816,7 +817,7 @@
             <a:fld id="{1D8BD707-D9CF-40AE-B4C6-C98DA3205C09}" type="datetimeFigureOut">
               <a:rPr lang="en-US" smtClean="0"/>
               <a:pPr/>
-              <a:t>4/1/2013</a:t>
+              <a:t>1/4/2014</a:t>
             </a:fld>
             <a:endParaRPr lang="en-US"/>
           </a:p>
@@ -983,7 +984,7 @@
             <a:fld id="{1D8BD707-D9CF-40AE-B4C6-C98DA3205C09}" type="datetimeFigureOut">
               <a:rPr lang="en-US" smtClean="0"/>
               <a:pPr/>
-              <a:t>4/1/2013</a:t>
+              <a:t>1/4/2014</a:t>
             </a:fld>
             <a:endParaRPr lang="en-US"/>
           </a:p>
@@ -1069,8 +1070,8 @@
         </p:nvSpPr>
         <p:spPr>
           <a:xfrm>
-            <a:off x="6629400" y="129757"/>
-            <a:ext cx="2057400" cy="2764575"/>
+            <a:off x="6264553" y="86527"/>
+            <a:ext cx="1944172" cy="1843502"/>
           </a:xfrm>
         </p:spPr>
         <p:txBody>
@@ -1097,8 +1098,8 @@
         </p:nvSpPr>
         <p:spPr>
           <a:xfrm>
-            <a:off x="457201" y="129757"/>
-            <a:ext cx="6019800" cy="2764575"/>
+            <a:off x="432039" y="86527"/>
+            <a:ext cx="5688502" cy="1843502"/>
           </a:xfrm>
         </p:spPr>
         <p:txBody>
@@ -1160,7 +1161,7 @@
             <a:fld id="{1D8BD707-D9CF-40AE-B4C6-C98DA3205C09}" type="datetimeFigureOut">
               <a:rPr lang="en-US" smtClean="0"/>
               <a:pPr/>
-              <a:t>4/1/2013</a:t>
+              <a:t>1/4/2014</a:t>
             </a:fld>
             <a:endParaRPr lang="en-US"/>
           </a:p>
@@ -1327,7 +1328,7 @@
             <a:fld id="{1D8BD707-D9CF-40AE-B4C6-C98DA3205C09}" type="datetimeFigureOut">
               <a:rPr lang="en-US" smtClean="0"/>
               <a:pPr/>
-              <a:t>4/1/2013</a:t>
+              <a:t>1/4/2014</a:t>
             </a:fld>
             <a:endParaRPr lang="en-US"/>
           </a:p>
@@ -1413,15 +1414,15 @@
         </p:nvSpPr>
         <p:spPr>
           <a:xfrm>
-            <a:off x="722313" y="2082059"/>
-            <a:ext cx="7772400" cy="643517"/>
+            <a:off x="682563" y="1388381"/>
+            <a:ext cx="7344649" cy="429117"/>
           </a:xfrm>
         </p:spPr>
         <p:txBody>
           <a:bodyPr anchor="t"/>
           <a:lstStyle>
             <a:lvl1pPr algn="l">
-              <a:defRPr sz="4000" b="1" cap="all"/>
+              <a:defRPr sz="3800" b="1" cap="all"/>
             </a:lvl1pPr>
           </a:lstStyle>
           <a:p>
@@ -1445,8 +1446,8 @@
         </p:nvSpPr>
         <p:spPr>
           <a:xfrm>
-            <a:off x="722313" y="1373290"/>
-            <a:ext cx="7772400" cy="708769"/>
+            <a:off x="682563" y="915752"/>
+            <a:ext cx="7344649" cy="472629"/>
           </a:xfrm>
         </p:spPr>
         <p:txBody>
@@ -1454,7 +1455,7 @@
           <a:lstStyle>
             <a:lvl1pPr marL="0" indent="0">
               <a:buNone/>
-              <a:defRPr sz="2000">
+              <a:defRPr sz="1900">
                 <a:solidFill>
                   <a:schemeClr val="tx1">
                     <a:tint val="75000"/>
@@ -1462,9 +1463,9 @@
                 </a:solidFill>
               </a:defRPr>
             </a:lvl1pPr>
-            <a:lvl2pPr marL="457023" indent="0">
+            <a:lvl2pPr marL="431064" indent="0">
               <a:buNone/>
-              <a:defRPr sz="1800">
+              <a:defRPr sz="1700">
                 <a:solidFill>
                   <a:schemeClr val="tx1">
                     <a:tint val="75000"/>
@@ -1472,9 +1473,9 @@
                 </a:solidFill>
               </a:defRPr>
             </a:lvl2pPr>
-            <a:lvl3pPr marL="914046" indent="0">
+            <a:lvl3pPr marL="862128" indent="0">
               <a:buNone/>
-              <a:defRPr sz="1600">
+              <a:defRPr sz="1500">
                 <a:solidFill>
                   <a:schemeClr val="tx1">
                     <a:tint val="75000"/>
@@ -1482,9 +1483,9 @@
                 </a:solidFill>
               </a:defRPr>
             </a:lvl3pPr>
-            <a:lvl4pPr marL="1371070" indent="0">
+            <a:lvl4pPr marL="1293193" indent="0">
               <a:buNone/>
-              <a:defRPr sz="1400">
+              <a:defRPr sz="1300">
                 <a:solidFill>
                   <a:schemeClr val="tx1">
                     <a:tint val="75000"/>
@@ -1492,9 +1493,9 @@
                 </a:solidFill>
               </a:defRPr>
             </a:lvl4pPr>
-            <a:lvl5pPr marL="1828093" indent="0">
+            <a:lvl5pPr marL="1724257" indent="0">
               <a:buNone/>
-              <a:defRPr sz="1400">
+              <a:defRPr sz="1300">
                 <a:solidFill>
                   <a:schemeClr val="tx1">
                     <a:tint val="75000"/>
@@ -1502,9 +1503,9 @@
                 </a:solidFill>
               </a:defRPr>
             </a:lvl5pPr>
-            <a:lvl6pPr marL="2285116" indent="0">
+            <a:lvl6pPr marL="2155321" indent="0">
               <a:buNone/>
-              <a:defRPr sz="1400">
+              <a:defRPr sz="1300">
                 <a:solidFill>
                   <a:schemeClr val="tx1">
                     <a:tint val="75000"/>
@@ -1512,9 +1513,9 @@
                 </a:solidFill>
               </a:defRPr>
             </a:lvl6pPr>
-            <a:lvl7pPr marL="2742139" indent="0">
+            <a:lvl7pPr marL="2586386" indent="0">
               <a:buNone/>
-              <a:defRPr sz="1400">
+              <a:defRPr sz="1300">
                 <a:solidFill>
                   <a:schemeClr val="tx1">
                     <a:tint val="75000"/>
@@ -1522,9 +1523,9 @@
                 </a:solidFill>
               </a:defRPr>
             </a:lvl7pPr>
-            <a:lvl8pPr marL="3199161" indent="0">
+            <a:lvl8pPr marL="3017449" indent="0">
               <a:buNone/>
-              <a:defRPr sz="1400">
+              <a:defRPr sz="1300">
                 <a:solidFill>
                   <a:schemeClr val="tx1">
                     <a:tint val="75000"/>
@@ -1532,9 +1533,9 @@
                 </a:solidFill>
               </a:defRPr>
             </a:lvl8pPr>
-            <a:lvl9pPr marL="3656185" indent="0">
+            <a:lvl9pPr marL="3448514" indent="0">
               <a:buNone/>
-              <a:defRPr sz="1400">
+              <a:defRPr sz="1300">
                 <a:solidFill>
                   <a:schemeClr val="tx1">
                     <a:tint val="75000"/>
@@ -1570,7 +1571,7 @@
             <a:fld id="{1D8BD707-D9CF-40AE-B4C6-C98DA3205C09}" type="datetimeFigureOut">
               <a:rPr lang="en-US" smtClean="0"/>
               <a:pPr/>
-              <a:t>4/1/2013</a:t>
+              <a:t>1/4/2014</a:t>
             </a:fld>
             <a:endParaRPr lang="en-US"/>
           </a:p>
@@ -1679,39 +1680,39 @@
         </p:nvSpPr>
         <p:spPr>
           <a:xfrm>
-            <a:off x="457200" y="756024"/>
-            <a:ext cx="4038600" cy="2138309"/>
+            <a:off x="432040" y="504140"/>
+            <a:ext cx="3816337" cy="1425889"/>
           </a:xfrm>
         </p:spPr>
         <p:txBody>
           <a:bodyPr/>
           <a:lstStyle>
             <a:lvl1pPr>
-              <a:defRPr sz="2800"/>
+              <a:defRPr sz="2600"/>
             </a:lvl1pPr>
             <a:lvl2pPr>
-              <a:defRPr sz="2400"/>
+              <a:defRPr sz="2300"/>
             </a:lvl2pPr>
             <a:lvl3pPr>
-              <a:defRPr sz="2000"/>
+              <a:defRPr sz="1900"/>
             </a:lvl3pPr>
             <a:lvl4pPr>
-              <a:defRPr sz="1800"/>
+              <a:defRPr sz="1700"/>
             </a:lvl4pPr>
             <a:lvl5pPr>
-              <a:defRPr sz="1800"/>
+              <a:defRPr sz="1700"/>
             </a:lvl5pPr>
             <a:lvl6pPr>
-              <a:defRPr sz="1800"/>
+              <a:defRPr sz="1700"/>
             </a:lvl6pPr>
             <a:lvl7pPr>
-              <a:defRPr sz="1800"/>
+              <a:defRPr sz="1700"/>
             </a:lvl7pPr>
             <a:lvl8pPr>
-              <a:defRPr sz="1800"/>
+              <a:defRPr sz="1700"/>
             </a:lvl8pPr>
             <a:lvl9pPr>
-              <a:defRPr sz="1800"/>
+              <a:defRPr sz="1700"/>
             </a:lvl9pPr>
           </a:lstStyle>
           <a:p>
@@ -1764,39 +1765,39 @@
         </p:nvSpPr>
         <p:spPr>
           <a:xfrm>
-            <a:off x="4648200" y="756024"/>
-            <a:ext cx="4038600" cy="2138309"/>
+            <a:off x="4392390" y="504140"/>
+            <a:ext cx="3816337" cy="1425889"/>
           </a:xfrm>
         </p:spPr>
         <p:txBody>
           <a:bodyPr/>
           <a:lstStyle>
             <a:lvl1pPr>
-              <a:defRPr sz="2800"/>
+              <a:defRPr sz="2600"/>
             </a:lvl1pPr>
             <a:lvl2pPr>
-              <a:defRPr sz="2400"/>
+              <a:defRPr sz="2300"/>
             </a:lvl2pPr>
             <a:lvl3pPr>
-              <a:defRPr sz="2000"/>
+              <a:defRPr sz="1900"/>
             </a:lvl3pPr>
             <a:lvl4pPr>
-              <a:defRPr sz="1800"/>
+              <a:defRPr sz="1700"/>
             </a:lvl4pPr>
             <a:lvl5pPr>
-              <a:defRPr sz="1800"/>
+              <a:defRPr sz="1700"/>
             </a:lvl5pPr>
             <a:lvl6pPr>
-              <a:defRPr sz="1800"/>
+              <a:defRPr sz="1700"/>
             </a:lvl6pPr>
             <a:lvl7pPr>
-              <a:defRPr sz="1800"/>
+              <a:defRPr sz="1700"/>
             </a:lvl7pPr>
             <a:lvl8pPr>
-              <a:defRPr sz="1800"/>
+              <a:defRPr sz="1700"/>
             </a:lvl8pPr>
             <a:lvl9pPr>
-              <a:defRPr sz="1800"/>
+              <a:defRPr sz="1700"/>
             </a:lvl9pPr>
           </a:lstStyle>
           <a:p>
@@ -1855,7 +1856,7 @@
             <a:fld id="{1D8BD707-D9CF-40AE-B4C6-C98DA3205C09}" type="datetimeFigureOut">
               <a:rPr lang="en-US" smtClean="0"/>
               <a:pPr/>
-              <a:t>4/1/2013</a:t>
+              <a:t>1/4/2014</a:t>
             </a:fld>
             <a:endParaRPr lang="en-US"/>
           </a:p>
@@ -1968,8 +1969,8 @@
         </p:nvSpPr>
         <p:spPr>
           <a:xfrm>
-            <a:off x="457200" y="725270"/>
-            <a:ext cx="4040188" cy="302259"/>
+            <a:off x="432038" y="483633"/>
+            <a:ext cx="3817838" cy="201555"/>
           </a:xfrm>
         </p:spPr>
         <p:txBody>
@@ -1977,39 +1978,39 @@
           <a:lstStyle>
             <a:lvl1pPr marL="0" indent="0">
               <a:buNone/>
-              <a:defRPr sz="2400" b="1"/>
+              <a:defRPr sz="2300" b="1"/>
             </a:lvl1pPr>
-            <a:lvl2pPr marL="457023" indent="0">
+            <a:lvl2pPr marL="431064" indent="0">
               <a:buNone/>
-              <a:defRPr sz="2000" b="1"/>
+              <a:defRPr sz="1900" b="1"/>
             </a:lvl2pPr>
-            <a:lvl3pPr marL="914046" indent="0">
+            <a:lvl3pPr marL="862128" indent="0">
               <a:buNone/>
-              <a:defRPr sz="1800" b="1"/>
+              <a:defRPr sz="1700" b="1"/>
             </a:lvl3pPr>
-            <a:lvl4pPr marL="1371070" indent="0">
+            <a:lvl4pPr marL="1293193" indent="0">
               <a:buNone/>
-              <a:defRPr sz="1600" b="1"/>
+              <a:defRPr sz="1500" b="1"/>
             </a:lvl4pPr>
-            <a:lvl5pPr marL="1828093" indent="0">
+            <a:lvl5pPr marL="1724257" indent="0">
               <a:buNone/>
-              <a:defRPr sz="1600" b="1"/>
+              <a:defRPr sz="1500" b="1"/>
             </a:lvl5pPr>
-            <a:lvl6pPr marL="2285116" indent="0">
+            <a:lvl6pPr marL="2155321" indent="0">
               <a:buNone/>
-              <a:defRPr sz="1600" b="1"/>
+              <a:defRPr sz="1500" b="1"/>
             </a:lvl6pPr>
-            <a:lvl7pPr marL="2742139" indent="0">
+            <a:lvl7pPr marL="2586386" indent="0">
               <a:buNone/>
-              <a:defRPr sz="1600" b="1"/>
+              <a:defRPr sz="1500" b="1"/>
             </a:lvl7pPr>
-            <a:lvl8pPr marL="3199161" indent="0">
+            <a:lvl8pPr marL="3017449" indent="0">
               <a:buNone/>
-              <a:defRPr sz="1600" b="1"/>
+              <a:defRPr sz="1500" b="1"/>
             </a:lvl8pPr>
-            <a:lvl9pPr marL="3656185" indent="0">
+            <a:lvl9pPr marL="3448514" indent="0">
               <a:buNone/>
-              <a:defRPr sz="1600" b="1"/>
+              <a:defRPr sz="1500" b="1"/>
             </a:lvl9pPr>
           </a:lstStyle>
           <a:p>
@@ -2033,39 +2034,39 @@
         </p:nvSpPr>
         <p:spPr>
           <a:xfrm>
-            <a:off x="457200" y="1027527"/>
-            <a:ext cx="4040188" cy="1866801"/>
+            <a:off x="432038" y="685186"/>
+            <a:ext cx="3817838" cy="1244839"/>
           </a:xfrm>
         </p:spPr>
         <p:txBody>
           <a:bodyPr/>
           <a:lstStyle>
             <a:lvl1pPr>
-              <a:defRPr sz="2400"/>
+              <a:defRPr sz="2300"/>
             </a:lvl1pPr>
             <a:lvl2pPr>
-              <a:defRPr sz="2000"/>
+              <a:defRPr sz="1900"/>
             </a:lvl2pPr>
             <a:lvl3pPr>
-              <a:defRPr sz="1800"/>
+              <a:defRPr sz="1700"/>
             </a:lvl3pPr>
             <a:lvl4pPr>
-              <a:defRPr sz="1600"/>
+              <a:defRPr sz="1500"/>
             </a:lvl4pPr>
             <a:lvl5pPr>
-              <a:defRPr sz="1600"/>
+              <a:defRPr sz="1500"/>
             </a:lvl5pPr>
             <a:lvl6pPr>
-              <a:defRPr sz="1600"/>
+              <a:defRPr sz="1500"/>
             </a:lvl6pPr>
             <a:lvl7pPr>
-              <a:defRPr sz="1600"/>
+              <a:defRPr sz="1500"/>
             </a:lvl7pPr>
             <a:lvl8pPr>
-              <a:defRPr sz="1600"/>
+              <a:defRPr sz="1500"/>
             </a:lvl8pPr>
             <a:lvl9pPr>
-              <a:defRPr sz="1600"/>
+              <a:defRPr sz="1500"/>
             </a:lvl9pPr>
           </a:lstStyle>
           <a:p>
@@ -2118,8 +2119,8 @@
         </p:nvSpPr>
         <p:spPr>
           <a:xfrm>
-            <a:off x="4645032" y="725270"/>
-            <a:ext cx="4041775" cy="302259"/>
+            <a:off x="4389398" y="483633"/>
+            <a:ext cx="3819337" cy="201555"/>
           </a:xfrm>
         </p:spPr>
         <p:txBody>
@@ -2127,39 +2128,39 @@
           <a:lstStyle>
             <a:lvl1pPr marL="0" indent="0">
               <a:buNone/>
-              <a:defRPr sz="2400" b="1"/>
+              <a:defRPr sz="2300" b="1"/>
             </a:lvl1pPr>
-            <a:lvl2pPr marL="457023" indent="0">
+            <a:lvl2pPr marL="431064" indent="0">
               <a:buNone/>
-              <a:defRPr sz="2000" b="1"/>
+              <a:defRPr sz="1900" b="1"/>
             </a:lvl2pPr>
-            <a:lvl3pPr marL="914046" indent="0">
+            <a:lvl3pPr marL="862128" indent="0">
               <a:buNone/>
-              <a:defRPr sz="1800" b="1"/>
+              <a:defRPr sz="1700" b="1"/>
             </a:lvl3pPr>
-            <a:lvl4pPr marL="1371070" indent="0">
+            <a:lvl4pPr marL="1293193" indent="0">
               <a:buNone/>
-              <a:defRPr sz="1600" b="1"/>
+              <a:defRPr sz="1500" b="1"/>
             </a:lvl4pPr>
-            <a:lvl5pPr marL="1828093" indent="0">
+            <a:lvl5pPr marL="1724257" indent="0">
               <a:buNone/>
-              <a:defRPr sz="1600" b="1"/>
+              <a:defRPr sz="1500" b="1"/>
             </a:lvl5pPr>
-            <a:lvl6pPr marL="2285116" indent="0">
+            <a:lvl6pPr marL="2155321" indent="0">
               <a:buNone/>
-              <a:defRPr sz="1600" b="1"/>
+              <a:defRPr sz="1500" b="1"/>
             </a:lvl6pPr>
-            <a:lvl7pPr marL="2742139" indent="0">
+            <a:lvl7pPr marL="2586386" indent="0">
               <a:buNone/>
-              <a:defRPr sz="1600" b="1"/>
+              <a:defRPr sz="1500" b="1"/>
             </a:lvl7pPr>
-            <a:lvl8pPr marL="3199161" indent="0">
+            <a:lvl8pPr marL="3017449" indent="0">
               <a:buNone/>
-              <a:defRPr sz="1600" b="1"/>
+              <a:defRPr sz="1500" b="1"/>
             </a:lvl8pPr>
-            <a:lvl9pPr marL="3656185" indent="0">
+            <a:lvl9pPr marL="3448514" indent="0">
               <a:buNone/>
-              <a:defRPr sz="1600" b="1"/>
+              <a:defRPr sz="1500" b="1"/>
             </a:lvl9pPr>
           </a:lstStyle>
           <a:p>
@@ -2183,39 +2184,39 @@
         </p:nvSpPr>
         <p:spPr>
           <a:xfrm>
-            <a:off x="4645032" y="1027527"/>
-            <a:ext cx="4041775" cy="1866801"/>
+            <a:off x="4389398" y="685186"/>
+            <a:ext cx="3819337" cy="1244839"/>
           </a:xfrm>
         </p:spPr>
         <p:txBody>
           <a:bodyPr/>
           <a:lstStyle>
             <a:lvl1pPr>
-              <a:defRPr sz="2400"/>
+              <a:defRPr sz="2300"/>
             </a:lvl1pPr>
             <a:lvl2pPr>
-              <a:defRPr sz="2000"/>
+              <a:defRPr sz="1900"/>
             </a:lvl2pPr>
             <a:lvl3pPr>
-              <a:defRPr sz="1800"/>
+              <a:defRPr sz="1700"/>
             </a:lvl3pPr>
             <a:lvl4pPr>
-              <a:defRPr sz="1600"/>
+              <a:defRPr sz="1500"/>
             </a:lvl4pPr>
             <a:lvl5pPr>
-              <a:defRPr sz="1600"/>
+              <a:defRPr sz="1500"/>
             </a:lvl5pPr>
             <a:lvl6pPr>
-              <a:defRPr sz="1600"/>
+              <a:defRPr sz="1500"/>
             </a:lvl6pPr>
             <a:lvl7pPr>
-              <a:defRPr sz="1600"/>
+              <a:defRPr sz="1500"/>
             </a:lvl7pPr>
             <a:lvl8pPr>
-              <a:defRPr sz="1600"/>
+              <a:defRPr sz="1500"/>
             </a:lvl8pPr>
             <a:lvl9pPr>
-              <a:defRPr sz="1600"/>
+              <a:defRPr sz="1500"/>
             </a:lvl9pPr>
           </a:lstStyle>
           <a:p>
@@ -2274,7 +2275,7 @@
             <a:fld id="{1D8BD707-D9CF-40AE-B4C6-C98DA3205C09}" type="datetimeFigureOut">
               <a:rPr lang="en-US" smtClean="0"/>
               <a:pPr/>
-              <a:t>4/1/2013</a:t>
+              <a:t>1/4/2014</a:t>
             </a:fld>
             <a:endParaRPr lang="en-US"/>
           </a:p>
@@ -2389,7 +2390,7 @@
             <a:fld id="{1D8BD707-D9CF-40AE-B4C6-C98DA3205C09}" type="datetimeFigureOut">
               <a:rPr lang="en-US" smtClean="0"/>
               <a:pPr/>
-              <a:t>4/1/2013</a:t>
+              <a:t>1/4/2014</a:t>
             </a:fld>
             <a:endParaRPr lang="en-US"/>
           </a:p>
@@ -2481,7 +2482,7 @@
             <a:fld id="{1D8BD707-D9CF-40AE-B4C6-C98DA3205C09}" type="datetimeFigureOut">
               <a:rPr lang="en-US" smtClean="0"/>
               <a:pPr/>
-              <a:t>4/1/2013</a:t>
+              <a:t>1/4/2014</a:t>
             </a:fld>
             <a:endParaRPr lang="en-US"/>
           </a:p>
@@ -2567,15 +2568,15 @@
         </p:nvSpPr>
         <p:spPr>
           <a:xfrm>
-            <a:off x="457205" y="129003"/>
-            <a:ext cx="3008313" cy="549015"/>
+            <a:off x="432047" y="86024"/>
+            <a:ext cx="2842751" cy="366100"/>
           </a:xfrm>
         </p:spPr>
         <p:txBody>
           <a:bodyPr anchor="b"/>
           <a:lstStyle>
             <a:lvl1pPr algn="l">
-              <a:defRPr sz="2000" b="1"/>
+              <a:defRPr sz="1900" b="1"/>
             </a:lvl1pPr>
           </a:lstStyle>
           <a:p>
@@ -2599,39 +2600,39 @@
         </p:nvSpPr>
         <p:spPr>
           <a:xfrm>
-            <a:off x="3575051" y="129006"/>
-            <a:ext cx="5111750" cy="2765325"/>
+            <a:off x="3378301" y="86026"/>
+            <a:ext cx="4830427" cy="1844001"/>
           </a:xfrm>
         </p:spPr>
         <p:txBody>
           <a:bodyPr/>
           <a:lstStyle>
             <a:lvl1pPr>
-              <a:defRPr sz="3200"/>
+              <a:defRPr sz="3000"/>
             </a:lvl1pPr>
             <a:lvl2pPr>
-              <a:defRPr sz="2800"/>
+              <a:defRPr sz="2600"/>
             </a:lvl2pPr>
             <a:lvl3pPr>
-              <a:defRPr sz="2400"/>
+              <a:defRPr sz="2300"/>
             </a:lvl3pPr>
             <a:lvl4pPr>
-              <a:defRPr sz="2000"/>
+              <a:defRPr sz="1900"/>
             </a:lvl4pPr>
             <a:lvl5pPr>
-              <a:defRPr sz="2000"/>
+              <a:defRPr sz="1900"/>
             </a:lvl5pPr>
             <a:lvl6pPr>
-              <a:defRPr sz="2000"/>
+              <a:defRPr sz="1900"/>
             </a:lvl6pPr>
             <a:lvl7pPr>
-              <a:defRPr sz="2000"/>
+              <a:defRPr sz="1900"/>
             </a:lvl7pPr>
             <a:lvl8pPr>
-              <a:defRPr sz="2000"/>
+              <a:defRPr sz="1900"/>
             </a:lvl8pPr>
             <a:lvl9pPr>
-              <a:defRPr sz="2000"/>
+              <a:defRPr sz="1900"/>
             </a:lvl9pPr>
           </a:lstStyle>
           <a:p>
@@ -2684,8 +2685,8 @@
         </p:nvSpPr>
         <p:spPr>
           <a:xfrm>
-            <a:off x="457205" y="678020"/>
-            <a:ext cx="3008313" cy="2216310"/>
+            <a:off x="432047" y="452124"/>
+            <a:ext cx="2842751" cy="1477902"/>
           </a:xfrm>
         </p:spPr>
         <p:txBody>
@@ -2693,39 +2694,39 @@
           <a:lstStyle>
             <a:lvl1pPr marL="0" indent="0">
               <a:buNone/>
-              <a:defRPr sz="1400"/>
+              <a:defRPr sz="1300"/>
             </a:lvl1pPr>
-            <a:lvl2pPr marL="457023" indent="0">
+            <a:lvl2pPr marL="431064" indent="0">
               <a:buNone/>
-              <a:defRPr sz="1200"/>
+              <a:defRPr sz="1100"/>
             </a:lvl2pPr>
-            <a:lvl3pPr marL="914046" indent="0">
-              <a:buNone/>
-              <a:defRPr sz="1000"/>
-            </a:lvl3pPr>
-            <a:lvl4pPr marL="1371070" indent="0">
+            <a:lvl3pPr marL="862128" indent="0">
               <a:buNone/>
               <a:defRPr sz="900"/>
+            </a:lvl3pPr>
+            <a:lvl4pPr marL="1293193" indent="0">
+              <a:buNone/>
+              <a:defRPr sz="800"/>
             </a:lvl4pPr>
-            <a:lvl5pPr marL="1828093" indent="0">
+            <a:lvl5pPr marL="1724257" indent="0">
               <a:buNone/>
-              <a:defRPr sz="900"/>
+              <a:defRPr sz="800"/>
             </a:lvl5pPr>
-            <a:lvl6pPr marL="2285116" indent="0">
+            <a:lvl6pPr marL="2155321" indent="0">
               <a:buNone/>
-              <a:defRPr sz="900"/>
+              <a:defRPr sz="800"/>
             </a:lvl6pPr>
-            <a:lvl7pPr marL="2742139" indent="0">
+            <a:lvl7pPr marL="2586386" indent="0">
               <a:buNone/>
-              <a:defRPr sz="900"/>
+              <a:defRPr sz="800"/>
             </a:lvl7pPr>
-            <a:lvl8pPr marL="3199161" indent="0">
+            <a:lvl8pPr marL="3017449" indent="0">
               <a:buNone/>
-              <a:defRPr sz="900"/>
+              <a:defRPr sz="800"/>
             </a:lvl8pPr>
-            <a:lvl9pPr marL="3656185" indent="0">
+            <a:lvl9pPr marL="3448514" indent="0">
               <a:buNone/>
-              <a:defRPr sz="900"/>
+              <a:defRPr sz="800"/>
             </a:lvl9pPr>
           </a:lstStyle>
           <a:p>
@@ -2755,7 +2756,7 @@
             <a:fld id="{1D8BD707-D9CF-40AE-B4C6-C98DA3205C09}" type="datetimeFigureOut">
               <a:rPr lang="en-US" smtClean="0"/>
               <a:pPr/>
-              <a:t>4/1/2013</a:t>
+              <a:t>1/4/2014</a:t>
             </a:fld>
             <a:endParaRPr lang="en-US"/>
           </a:p>
@@ -2841,15 +2842,15 @@
         </p:nvSpPr>
         <p:spPr>
           <a:xfrm>
-            <a:off x="1792289" y="2268063"/>
-            <a:ext cx="5486400" cy="267757"/>
+            <a:off x="1693651" y="1512414"/>
+            <a:ext cx="5184458" cy="178549"/>
           </a:xfrm>
         </p:spPr>
         <p:txBody>
           <a:bodyPr anchor="b"/>
           <a:lstStyle>
             <a:lvl1pPr algn="l">
-              <a:defRPr sz="2000" b="1"/>
+              <a:defRPr sz="1900" b="1"/>
             </a:lvl1pPr>
           </a:lstStyle>
           <a:p>
@@ -2873,8 +2874,8 @@
         </p:nvSpPr>
         <p:spPr>
           <a:xfrm>
-            <a:off x="1792289" y="289508"/>
-            <a:ext cx="5486400" cy="1944053"/>
+            <a:off x="1693651" y="193054"/>
+            <a:ext cx="5184458" cy="1296353"/>
           </a:xfrm>
         </p:spPr>
         <p:txBody>
@@ -2882,39 +2883,39 @@
           <a:lstStyle>
             <a:lvl1pPr marL="0" indent="0">
               <a:buNone/>
-              <a:defRPr sz="3200"/>
+              <a:defRPr sz="3000"/>
             </a:lvl1pPr>
-            <a:lvl2pPr marL="457023" indent="0">
+            <a:lvl2pPr marL="431064" indent="0">
               <a:buNone/>
-              <a:defRPr sz="2800"/>
+              <a:defRPr sz="2600"/>
             </a:lvl2pPr>
-            <a:lvl3pPr marL="914046" indent="0">
+            <a:lvl3pPr marL="862128" indent="0">
               <a:buNone/>
-              <a:defRPr sz="2400"/>
+              <a:defRPr sz="2300"/>
             </a:lvl3pPr>
-            <a:lvl4pPr marL="1371070" indent="0">
+            <a:lvl4pPr marL="1293193" indent="0">
               <a:buNone/>
-              <a:defRPr sz="2000"/>
+              <a:defRPr sz="1900"/>
             </a:lvl4pPr>
-            <a:lvl5pPr marL="1828093" indent="0">
+            <a:lvl5pPr marL="1724257" indent="0">
               <a:buNone/>
-              <a:defRPr sz="2000"/>
+              <a:defRPr sz="1900"/>
             </a:lvl5pPr>
-            <a:lvl6pPr marL="2285116" indent="0">
+            <a:lvl6pPr marL="2155321" indent="0">
               <a:buNone/>
-              <a:defRPr sz="2000"/>
+              <a:defRPr sz="1900"/>
             </a:lvl6pPr>
-            <a:lvl7pPr marL="2742139" indent="0">
+            <a:lvl7pPr marL="2586386" indent="0">
               <a:buNone/>
-              <a:defRPr sz="2000"/>
+              <a:defRPr sz="1900"/>
             </a:lvl7pPr>
-            <a:lvl8pPr marL="3199161" indent="0">
+            <a:lvl8pPr marL="3017449" indent="0">
               <a:buNone/>
-              <a:defRPr sz="2000"/>
+              <a:defRPr sz="1900"/>
             </a:lvl8pPr>
-            <a:lvl9pPr marL="3656185" indent="0">
+            <a:lvl9pPr marL="3448514" indent="0">
               <a:buNone/>
-              <a:defRPr sz="2000"/>
+              <a:defRPr sz="1900"/>
             </a:lvl9pPr>
           </a:lstStyle>
           <a:p>
@@ -2934,8 +2935,8 @@
         </p:nvSpPr>
         <p:spPr>
           <a:xfrm>
-            <a:off x="1792289" y="2535820"/>
-            <a:ext cx="5486400" cy="380260"/>
+            <a:off x="1693651" y="1690962"/>
+            <a:ext cx="5184458" cy="253569"/>
           </a:xfrm>
         </p:spPr>
         <p:txBody>
@@ -2943,39 +2944,39 @@
           <a:lstStyle>
             <a:lvl1pPr marL="0" indent="0">
               <a:buNone/>
-              <a:defRPr sz="1400"/>
+              <a:defRPr sz="1300"/>
             </a:lvl1pPr>
-            <a:lvl2pPr marL="457023" indent="0">
+            <a:lvl2pPr marL="431064" indent="0">
               <a:buNone/>
-              <a:defRPr sz="1200"/>
+              <a:defRPr sz="1100"/>
             </a:lvl2pPr>
-            <a:lvl3pPr marL="914046" indent="0">
-              <a:buNone/>
-              <a:defRPr sz="1000"/>
-            </a:lvl3pPr>
-            <a:lvl4pPr marL="1371070" indent="0">
+            <a:lvl3pPr marL="862128" indent="0">
               <a:buNone/>
               <a:defRPr sz="900"/>
+            </a:lvl3pPr>
+            <a:lvl4pPr marL="1293193" indent="0">
+              <a:buNone/>
+              <a:defRPr sz="800"/>
             </a:lvl4pPr>
-            <a:lvl5pPr marL="1828093" indent="0">
+            <a:lvl5pPr marL="1724257" indent="0">
               <a:buNone/>
-              <a:defRPr sz="900"/>
+              <a:defRPr sz="800"/>
             </a:lvl5pPr>
-            <a:lvl6pPr marL="2285116" indent="0">
+            <a:lvl6pPr marL="2155321" indent="0">
               <a:buNone/>
-              <a:defRPr sz="900"/>
+              <a:defRPr sz="800"/>
             </a:lvl6pPr>
-            <a:lvl7pPr marL="2742139" indent="0">
+            <a:lvl7pPr marL="2586386" indent="0">
               <a:buNone/>
-              <a:defRPr sz="900"/>
+              <a:defRPr sz="800"/>
             </a:lvl7pPr>
-            <a:lvl8pPr marL="3199161" indent="0">
+            <a:lvl8pPr marL="3017449" indent="0">
               <a:buNone/>
-              <a:defRPr sz="900"/>
+              <a:defRPr sz="800"/>
             </a:lvl8pPr>
-            <a:lvl9pPr marL="3656185" indent="0">
+            <a:lvl9pPr marL="3448514" indent="0">
               <a:buNone/>
-              <a:defRPr sz="900"/>
+              <a:defRPr sz="800"/>
             </a:lvl9pPr>
           </a:lstStyle>
           <a:p>
@@ -3005,7 +3006,7 @@
             <a:fld id="{1D8BD707-D9CF-40AE-B4C6-C98DA3205C09}" type="datetimeFigureOut">
               <a:rPr lang="en-US" smtClean="0"/>
               <a:pPr/>
-              <a:t>4/1/2013</a:t>
+              <a:t>1/4/2014</a:t>
             </a:fld>
             <a:endParaRPr lang="en-US"/>
           </a:p>
@@ -3096,15 +3097,15 @@
         </p:nvSpPr>
         <p:spPr>
           <a:xfrm>
-            <a:off x="457200" y="129754"/>
-            <a:ext cx="8229600" cy="540016"/>
+            <a:off x="432040" y="86526"/>
+            <a:ext cx="7776687" cy="360099"/>
           </a:xfrm>
           <a:prstGeom prst="rect">
             <a:avLst/>
           </a:prstGeom>
         </p:spPr>
         <p:txBody>
-          <a:bodyPr vert="horz" lIns="91405" tIns="45702" rIns="91405" bIns="45702" rtlCol="0" anchor="ctr">
+          <a:bodyPr vert="horz" lIns="86213" tIns="43106" rIns="86213" bIns="43106" rtlCol="0" anchor="ctr">
             <a:normAutofit/>
           </a:bodyPr>
           <a:lstStyle/>
@@ -3129,15 +3130,15 @@
         </p:nvSpPr>
         <p:spPr>
           <a:xfrm>
-            <a:off x="457200" y="756024"/>
-            <a:ext cx="8229600" cy="2138309"/>
+            <a:off x="432040" y="504140"/>
+            <a:ext cx="7776687" cy="1425889"/>
           </a:xfrm>
           <a:prstGeom prst="rect">
             <a:avLst/>
           </a:prstGeom>
         </p:spPr>
         <p:txBody>
-          <a:bodyPr vert="horz" lIns="91405" tIns="45702" rIns="91405" bIns="45702" rtlCol="0">
+          <a:bodyPr vert="horz" lIns="86213" tIns="43106" rIns="86213" bIns="43106" rtlCol="0">
             <a:normAutofit/>
           </a:bodyPr>
           <a:lstStyle/>
@@ -3191,18 +3192,18 @@
         </p:nvSpPr>
         <p:spPr>
           <a:xfrm>
-            <a:off x="457200" y="3003085"/>
-            <a:ext cx="2133600" cy="172505"/>
+            <a:off x="432038" y="2002549"/>
+            <a:ext cx="2016178" cy="115031"/>
           </a:xfrm>
           <a:prstGeom prst="rect">
             <a:avLst/>
           </a:prstGeom>
         </p:spPr>
         <p:txBody>
-          <a:bodyPr vert="horz" lIns="91405" tIns="45702" rIns="91405" bIns="45702" rtlCol="0" anchor="ctr"/>
+          <a:bodyPr vert="horz" lIns="86213" tIns="43106" rIns="86213" bIns="43106" rtlCol="0" anchor="ctr"/>
           <a:lstStyle>
             <a:lvl1pPr algn="l">
-              <a:defRPr sz="1200">
+              <a:defRPr sz="1100">
                 <a:solidFill>
                   <a:schemeClr val="tx1">
                     <a:tint val="75000"/>
@@ -3215,7 +3216,7 @@
             <a:fld id="{1D8BD707-D9CF-40AE-B4C6-C98DA3205C09}" type="datetimeFigureOut">
               <a:rPr lang="en-US" smtClean="0"/>
               <a:pPr/>
-              <a:t>4/1/2013</a:t>
+              <a:t>1/4/2014</a:t>
             </a:fld>
             <a:endParaRPr lang="en-US"/>
           </a:p>
@@ -3233,18 +3234,18 @@
         </p:nvSpPr>
         <p:spPr>
           <a:xfrm>
-            <a:off x="3124201" y="3003085"/>
-            <a:ext cx="2895600" cy="172505"/>
+            <a:off x="2952261" y="2002549"/>
+            <a:ext cx="2736242" cy="115031"/>
           </a:xfrm>
           <a:prstGeom prst="rect">
             <a:avLst/>
           </a:prstGeom>
         </p:spPr>
         <p:txBody>
-          <a:bodyPr vert="horz" lIns="91405" tIns="45702" rIns="91405" bIns="45702" rtlCol="0" anchor="ctr"/>
+          <a:bodyPr vert="horz" lIns="86213" tIns="43106" rIns="86213" bIns="43106" rtlCol="0" anchor="ctr"/>
           <a:lstStyle>
             <a:lvl1pPr algn="ctr">
-              <a:defRPr sz="1200">
+              <a:defRPr sz="1100">
                 <a:solidFill>
                   <a:schemeClr val="tx1">
                     <a:tint val="75000"/>
@@ -3270,18 +3271,18 @@
         </p:nvSpPr>
         <p:spPr>
           <a:xfrm>
-            <a:off x="6553200" y="3003085"/>
-            <a:ext cx="2133600" cy="172505"/>
+            <a:off x="6192547" y="2002549"/>
+            <a:ext cx="2016178" cy="115031"/>
           </a:xfrm>
           <a:prstGeom prst="rect">
             <a:avLst/>
           </a:prstGeom>
         </p:spPr>
         <p:txBody>
-          <a:bodyPr vert="horz" lIns="91405" tIns="45702" rIns="91405" bIns="45702" rtlCol="0" anchor="ctr"/>
+          <a:bodyPr vert="horz" lIns="86213" tIns="43106" rIns="86213" bIns="43106" rtlCol="0" anchor="ctr"/>
           <a:lstStyle>
             <a:lvl1pPr algn="r">
-              <a:defRPr sz="1200">
+              <a:defRPr sz="1100">
                 <a:solidFill>
                   <a:schemeClr val="tx1">
                     <a:tint val="75000"/>
@@ -3318,12 +3319,12 @@
   </p:sldLayoutIdLst>
   <p:txStyles>
     <p:titleStyle>
-      <a:lvl1pPr algn="ctr" defTabSz="914046" rtl="0" eaLnBrk="1" latinLnBrk="0" hangingPunct="1">
+      <a:lvl1pPr algn="ctr" defTabSz="862128" rtl="0" eaLnBrk="1" latinLnBrk="0" hangingPunct="1">
         <a:spcBef>
           <a:spcPct val="0"/>
         </a:spcBef>
         <a:buNone/>
-        <a:defRPr sz="4400" kern="1200">
+        <a:defRPr sz="4200" kern="1200">
           <a:solidFill>
             <a:schemeClr val="tx1"/>
           </a:solidFill>
@@ -3334,13 +3335,13 @@
       </a:lvl1pPr>
     </p:titleStyle>
     <p:bodyStyle>
-      <a:lvl1pPr marL="342767" indent="-342767" algn="l" defTabSz="914046" rtl="0" eaLnBrk="1" latinLnBrk="0" hangingPunct="1">
+      <a:lvl1pPr marL="323298" indent="-323298" algn="l" defTabSz="862128" rtl="0" eaLnBrk="1" latinLnBrk="0" hangingPunct="1">
         <a:spcBef>
           <a:spcPct val="20000"/>
         </a:spcBef>
         <a:buFont typeface="Arial" pitchFamily="34" charset="0"/>
         <a:buChar char="•"/>
-        <a:defRPr sz="3200" kern="1200">
+        <a:defRPr sz="3000" kern="1200">
           <a:solidFill>
             <a:schemeClr val="tx1"/>
           </a:solidFill>
@@ -3349,13 +3350,13 @@
           <a:cs typeface="+mn-cs"/>
         </a:defRPr>
       </a:lvl1pPr>
-      <a:lvl2pPr marL="742663" indent="-285640" algn="l" defTabSz="914046" rtl="0" eaLnBrk="1" latinLnBrk="0" hangingPunct="1">
+      <a:lvl2pPr marL="700480" indent="-269416" algn="l" defTabSz="862128" rtl="0" eaLnBrk="1" latinLnBrk="0" hangingPunct="1">
         <a:spcBef>
           <a:spcPct val="20000"/>
         </a:spcBef>
         <a:buFont typeface="Arial" pitchFamily="34" charset="0"/>
         <a:buChar char="–"/>
-        <a:defRPr sz="2800" kern="1200">
+        <a:defRPr sz="2600" kern="1200">
           <a:solidFill>
             <a:schemeClr val="tx1"/>
           </a:solidFill>
@@ -3364,13 +3365,13 @@
           <a:cs typeface="+mn-cs"/>
         </a:defRPr>
       </a:lvl2pPr>
-      <a:lvl3pPr marL="1142558" indent="-228510" algn="l" defTabSz="914046" rtl="0" eaLnBrk="1" latinLnBrk="0" hangingPunct="1">
+      <a:lvl3pPr marL="1077661" indent="-215531" algn="l" defTabSz="862128" rtl="0" eaLnBrk="1" latinLnBrk="0" hangingPunct="1">
         <a:spcBef>
           <a:spcPct val="20000"/>
         </a:spcBef>
         <a:buFont typeface="Arial" pitchFamily="34" charset="0"/>
         <a:buChar char="•"/>
-        <a:defRPr sz="2400" kern="1200">
+        <a:defRPr sz="2300" kern="1200">
           <a:solidFill>
             <a:schemeClr val="tx1"/>
           </a:solidFill>
@@ -3379,13 +3380,13 @@
           <a:cs typeface="+mn-cs"/>
         </a:defRPr>
       </a:lvl3pPr>
-      <a:lvl4pPr marL="1599580" indent="-228510" algn="l" defTabSz="914046" rtl="0" eaLnBrk="1" latinLnBrk="0" hangingPunct="1">
+      <a:lvl4pPr marL="1508724" indent="-215531" algn="l" defTabSz="862128" rtl="0" eaLnBrk="1" latinLnBrk="0" hangingPunct="1">
         <a:spcBef>
           <a:spcPct val="20000"/>
         </a:spcBef>
         <a:buFont typeface="Arial" pitchFamily="34" charset="0"/>
         <a:buChar char="–"/>
-        <a:defRPr sz="2000" kern="1200">
+        <a:defRPr sz="1900" kern="1200">
           <a:solidFill>
             <a:schemeClr val="tx1"/>
           </a:solidFill>
@@ -3394,13 +3395,13 @@
           <a:cs typeface="+mn-cs"/>
         </a:defRPr>
       </a:lvl4pPr>
-      <a:lvl5pPr marL="2056603" indent="-228510" algn="l" defTabSz="914046" rtl="0" eaLnBrk="1" latinLnBrk="0" hangingPunct="1">
+      <a:lvl5pPr marL="1939788" indent="-215531" algn="l" defTabSz="862128" rtl="0" eaLnBrk="1" latinLnBrk="0" hangingPunct="1">
         <a:spcBef>
           <a:spcPct val="20000"/>
         </a:spcBef>
         <a:buFont typeface="Arial" pitchFamily="34" charset="0"/>
         <a:buChar char="»"/>
-        <a:defRPr sz="2000" kern="1200">
+        <a:defRPr sz="1900" kern="1200">
           <a:solidFill>
             <a:schemeClr val="tx1"/>
           </a:solidFill>
@@ -3409,13 +3410,13 @@
           <a:cs typeface="+mn-cs"/>
         </a:defRPr>
       </a:lvl5pPr>
-      <a:lvl6pPr marL="2513626" indent="-228510" algn="l" defTabSz="914046" rtl="0" eaLnBrk="1" latinLnBrk="0" hangingPunct="1">
+      <a:lvl6pPr marL="2370852" indent="-215531" algn="l" defTabSz="862128" rtl="0" eaLnBrk="1" latinLnBrk="0" hangingPunct="1">
         <a:spcBef>
           <a:spcPct val="20000"/>
         </a:spcBef>
         <a:buFont typeface="Arial" pitchFamily="34" charset="0"/>
         <a:buChar char="•"/>
-        <a:defRPr sz="2000" kern="1200">
+        <a:defRPr sz="1900" kern="1200">
           <a:solidFill>
             <a:schemeClr val="tx1"/>
           </a:solidFill>
@@ -3424,13 +3425,13 @@
           <a:cs typeface="+mn-cs"/>
         </a:defRPr>
       </a:lvl6pPr>
-      <a:lvl7pPr marL="2970649" indent="-228510" algn="l" defTabSz="914046" rtl="0" eaLnBrk="1" latinLnBrk="0" hangingPunct="1">
+      <a:lvl7pPr marL="2801916" indent="-215531" algn="l" defTabSz="862128" rtl="0" eaLnBrk="1" latinLnBrk="0" hangingPunct="1">
         <a:spcBef>
           <a:spcPct val="20000"/>
         </a:spcBef>
         <a:buFont typeface="Arial" pitchFamily="34" charset="0"/>
         <a:buChar char="•"/>
-        <a:defRPr sz="2000" kern="1200">
+        <a:defRPr sz="1900" kern="1200">
           <a:solidFill>
             <a:schemeClr val="tx1"/>
           </a:solidFill>
@@ -3439,13 +3440,13 @@
           <a:cs typeface="+mn-cs"/>
         </a:defRPr>
       </a:lvl7pPr>
-      <a:lvl8pPr marL="3427673" indent="-228510" algn="l" defTabSz="914046" rtl="0" eaLnBrk="1" latinLnBrk="0" hangingPunct="1">
+      <a:lvl8pPr marL="3232981" indent="-215531" algn="l" defTabSz="862128" rtl="0" eaLnBrk="1" latinLnBrk="0" hangingPunct="1">
         <a:spcBef>
           <a:spcPct val="20000"/>
         </a:spcBef>
         <a:buFont typeface="Arial" pitchFamily="34" charset="0"/>
         <a:buChar char="•"/>
-        <a:defRPr sz="2000" kern="1200">
+        <a:defRPr sz="1900" kern="1200">
           <a:solidFill>
             <a:schemeClr val="tx1"/>
           </a:solidFill>
@@ -3454,13 +3455,13 @@
           <a:cs typeface="+mn-cs"/>
         </a:defRPr>
       </a:lvl8pPr>
-      <a:lvl9pPr marL="3884696" indent="-228510" algn="l" defTabSz="914046" rtl="0" eaLnBrk="1" latinLnBrk="0" hangingPunct="1">
+      <a:lvl9pPr marL="3664045" indent="-215531" algn="l" defTabSz="862128" rtl="0" eaLnBrk="1" latinLnBrk="0" hangingPunct="1">
         <a:spcBef>
           <a:spcPct val="20000"/>
         </a:spcBef>
         <a:buFont typeface="Arial" pitchFamily="34" charset="0"/>
         <a:buChar char="•"/>
-        <a:defRPr sz="2000" kern="1200">
+        <a:defRPr sz="1900" kern="1200">
           <a:solidFill>
             <a:schemeClr val="tx1"/>
           </a:solidFill>
@@ -3474,8 +3475,8 @@
       <a:defPPr>
         <a:defRPr lang="en-US"/>
       </a:defPPr>
-      <a:lvl1pPr marL="0" algn="l" defTabSz="914046" rtl="0" eaLnBrk="1" latinLnBrk="0" hangingPunct="1">
-        <a:defRPr sz="1800" kern="1200">
+      <a:lvl1pPr marL="0" algn="l" defTabSz="862128" rtl="0" eaLnBrk="1" latinLnBrk="0" hangingPunct="1">
+        <a:defRPr sz="1700" kern="1200">
           <a:solidFill>
             <a:schemeClr val="tx1"/>
           </a:solidFill>
@@ -3484,8 +3485,8 @@
           <a:cs typeface="+mn-cs"/>
         </a:defRPr>
       </a:lvl1pPr>
-      <a:lvl2pPr marL="457023" algn="l" defTabSz="914046" rtl="0" eaLnBrk="1" latinLnBrk="0" hangingPunct="1">
-        <a:defRPr sz="1800" kern="1200">
+      <a:lvl2pPr marL="431064" algn="l" defTabSz="862128" rtl="0" eaLnBrk="1" latinLnBrk="0" hangingPunct="1">
+        <a:defRPr sz="1700" kern="1200">
           <a:solidFill>
             <a:schemeClr val="tx1"/>
           </a:solidFill>
@@ -3494,8 +3495,8 @@
           <a:cs typeface="+mn-cs"/>
         </a:defRPr>
       </a:lvl2pPr>
-      <a:lvl3pPr marL="914046" algn="l" defTabSz="914046" rtl="0" eaLnBrk="1" latinLnBrk="0" hangingPunct="1">
-        <a:defRPr sz="1800" kern="1200">
+      <a:lvl3pPr marL="862128" algn="l" defTabSz="862128" rtl="0" eaLnBrk="1" latinLnBrk="0" hangingPunct="1">
+        <a:defRPr sz="1700" kern="1200">
           <a:solidFill>
             <a:schemeClr val="tx1"/>
           </a:solidFill>
@@ -3504,8 +3505,8 @@
           <a:cs typeface="+mn-cs"/>
         </a:defRPr>
       </a:lvl3pPr>
-      <a:lvl4pPr marL="1371070" algn="l" defTabSz="914046" rtl="0" eaLnBrk="1" latinLnBrk="0" hangingPunct="1">
-        <a:defRPr sz="1800" kern="1200">
+      <a:lvl4pPr marL="1293193" algn="l" defTabSz="862128" rtl="0" eaLnBrk="1" latinLnBrk="0" hangingPunct="1">
+        <a:defRPr sz="1700" kern="1200">
           <a:solidFill>
             <a:schemeClr val="tx1"/>
           </a:solidFill>
@@ -3514,8 +3515,8 @@
           <a:cs typeface="+mn-cs"/>
         </a:defRPr>
       </a:lvl4pPr>
-      <a:lvl5pPr marL="1828093" algn="l" defTabSz="914046" rtl="0" eaLnBrk="1" latinLnBrk="0" hangingPunct="1">
-        <a:defRPr sz="1800" kern="1200">
+      <a:lvl5pPr marL="1724257" algn="l" defTabSz="862128" rtl="0" eaLnBrk="1" latinLnBrk="0" hangingPunct="1">
+        <a:defRPr sz="1700" kern="1200">
           <a:solidFill>
             <a:schemeClr val="tx1"/>
           </a:solidFill>
@@ -3524,8 +3525,8 @@
           <a:cs typeface="+mn-cs"/>
         </a:defRPr>
       </a:lvl5pPr>
-      <a:lvl6pPr marL="2285116" algn="l" defTabSz="914046" rtl="0" eaLnBrk="1" latinLnBrk="0" hangingPunct="1">
-        <a:defRPr sz="1800" kern="1200">
+      <a:lvl6pPr marL="2155321" algn="l" defTabSz="862128" rtl="0" eaLnBrk="1" latinLnBrk="0" hangingPunct="1">
+        <a:defRPr sz="1700" kern="1200">
           <a:solidFill>
             <a:schemeClr val="tx1"/>
           </a:solidFill>
@@ -3534,8 +3535,8 @@
           <a:cs typeface="+mn-cs"/>
         </a:defRPr>
       </a:lvl6pPr>
-      <a:lvl7pPr marL="2742139" algn="l" defTabSz="914046" rtl="0" eaLnBrk="1" latinLnBrk="0" hangingPunct="1">
-        <a:defRPr sz="1800" kern="1200">
+      <a:lvl7pPr marL="2586386" algn="l" defTabSz="862128" rtl="0" eaLnBrk="1" latinLnBrk="0" hangingPunct="1">
+        <a:defRPr sz="1700" kern="1200">
           <a:solidFill>
             <a:schemeClr val="tx1"/>
           </a:solidFill>
@@ -3544,8 +3545,8 @@
           <a:cs typeface="+mn-cs"/>
         </a:defRPr>
       </a:lvl7pPr>
-      <a:lvl8pPr marL="3199161" algn="l" defTabSz="914046" rtl="0" eaLnBrk="1" latinLnBrk="0" hangingPunct="1">
-        <a:defRPr sz="1800" kern="1200">
+      <a:lvl8pPr marL="3017449" algn="l" defTabSz="862128" rtl="0" eaLnBrk="1" latinLnBrk="0" hangingPunct="1">
+        <a:defRPr sz="1700" kern="1200">
           <a:solidFill>
             <a:schemeClr val="tx1"/>
           </a:solidFill>
@@ -3554,8 +3555,8 @@
           <a:cs typeface="+mn-cs"/>
         </a:defRPr>
       </a:lvl8pPr>
-      <a:lvl9pPr marL="3656185" algn="l" defTabSz="914046" rtl="0" eaLnBrk="1" latinLnBrk="0" hangingPunct="1">
-        <a:defRPr sz="1800" kern="1200">
+      <a:lvl9pPr marL="3448514" algn="l" defTabSz="862128" rtl="0" eaLnBrk="1" latinLnBrk="0" hangingPunct="1">
+        <a:defRPr sz="1700" kern="1200">
           <a:solidFill>
             <a:schemeClr val="tx1"/>
           </a:solidFill>
@@ -3586,157 +3587,16 @@
           <a:chExt cx="0" cy="0"/>
         </a:xfrm>
       </p:grpSpPr>
-      <p:pic>
-        <p:nvPicPr>
-          <p:cNvPr id="30" name="Picture 4"/>
-          <p:cNvPicPr>
-            <a:picLocks noChangeAspect="1" noChangeArrowheads="1"/>
-          </p:cNvPicPr>
-          <p:nvPr/>
-        </p:nvPicPr>
-        <p:blipFill>
-          <a:blip r:embed="rId2" cstate="print">
-            <a:grayscl/>
-          </a:blip>
-          <a:srcRect/>
-          <a:stretch>
-            <a:fillRect/>
-          </a:stretch>
-        </p:blipFill>
-        <p:spPr bwMode="auto">
-          <a:xfrm>
-            <a:off x="533401" y="1371601"/>
-            <a:ext cx="2873160" cy="990117"/>
-          </a:xfrm>
-          <a:prstGeom prst="rect">
-            <a:avLst/>
-          </a:prstGeom>
-          <a:noFill/>
-          <a:ln w="9525">
-            <a:noFill/>
-            <a:miter lim="800000"/>
-            <a:headEnd/>
-            <a:tailEnd/>
-          </a:ln>
-        </p:spPr>
-      </p:pic>
-      <p:pic>
-        <p:nvPicPr>
-          <p:cNvPr id="31" name="Picture 3"/>
-          <p:cNvPicPr>
-            <a:picLocks noChangeAspect="1" noChangeArrowheads="1"/>
-          </p:cNvPicPr>
-          <p:nvPr/>
-        </p:nvPicPr>
-        <p:blipFill>
-          <a:blip r:embed="rId3" cstate="print">
-            <a:grayscl/>
-          </a:blip>
-          <a:srcRect/>
-          <a:stretch>
-            <a:fillRect/>
-          </a:stretch>
-        </p:blipFill>
-        <p:spPr bwMode="auto">
-          <a:xfrm>
-            <a:off x="2590801" y="1066802"/>
-            <a:ext cx="2929175" cy="914399"/>
-          </a:xfrm>
-          <a:prstGeom prst="rect">
-            <a:avLst/>
-          </a:prstGeom>
-          <a:noFill/>
-          <a:ln w="9525">
-            <a:noFill/>
-            <a:miter lim="800000"/>
-            <a:headEnd/>
-            <a:tailEnd/>
-          </a:ln>
-        </p:spPr>
-      </p:pic>
-      <p:pic>
-        <p:nvPicPr>
-          <p:cNvPr id="32" name="Picture 5"/>
-          <p:cNvPicPr>
-            <a:picLocks noChangeAspect="1" noChangeArrowheads="1"/>
-          </p:cNvPicPr>
-          <p:nvPr/>
-        </p:nvPicPr>
-        <p:blipFill>
-          <a:blip r:embed="rId4" cstate="print">
-            <a:grayscl/>
-          </a:blip>
-          <a:srcRect/>
-          <a:stretch>
-            <a:fillRect/>
-          </a:stretch>
-        </p:blipFill>
-        <p:spPr bwMode="auto">
-          <a:xfrm>
-            <a:off x="5791201" y="1066800"/>
-            <a:ext cx="2895600" cy="845717"/>
-          </a:xfrm>
-          <a:prstGeom prst="rect">
-            <a:avLst/>
-          </a:prstGeom>
-          <a:noFill/>
-          <a:ln w="9525">
-            <a:noFill/>
-            <a:miter lim="800000"/>
-            <a:headEnd/>
-            <a:tailEnd/>
-          </a:ln>
-        </p:spPr>
-      </p:pic>
-      <p:cxnSp>
-        <p:nvCxnSpPr>
-          <p:cNvPr id="33" name="Straight Connector 32"/>
-          <p:cNvCxnSpPr/>
-          <p:nvPr/>
-        </p:nvCxnSpPr>
-        <p:spPr>
-          <a:xfrm flipH="1">
-            <a:off x="5638801" y="1049869"/>
-            <a:ext cx="1" cy="1311851"/>
-          </a:xfrm>
-          <a:prstGeom prst="line">
-            <a:avLst/>
-          </a:prstGeom>
-          <a:ln w="12700">
-            <a:solidFill>
-              <a:schemeClr val="bg1">
-                <a:lumMod val="85000"/>
-              </a:schemeClr>
-            </a:solidFill>
-            <a:prstDash val="sysDash"/>
-          </a:ln>
-          <a:effectLst/>
-        </p:spPr>
-        <p:style>
-          <a:lnRef idx="1">
-            <a:schemeClr val="accent1"/>
-          </a:lnRef>
-          <a:fillRef idx="0">
-            <a:schemeClr val="accent1"/>
-          </a:fillRef>
-          <a:effectRef idx="0">
-            <a:schemeClr val="accent1"/>
-          </a:effectRef>
-          <a:fontRef idx="minor">
-            <a:schemeClr val="tx1"/>
-          </a:fontRef>
-        </p:style>
-      </p:cxnSp>
-      <p:sp>
-        <p:nvSpPr>
-          <p:cNvPr id="35" name="Rounded Rectangle 34"/>
+      <p:sp>
+        <p:nvSpPr>
+          <p:cNvPr id="90" name="Rounded Rectangle 89"/>
           <p:cNvSpPr/>
           <p:nvPr/>
         </p:nvSpPr>
         <p:spPr>
           <a:xfrm>
-            <a:off x="304800" y="228600"/>
-            <a:ext cx="8534400" cy="2667001"/>
+            <a:off x="60832" y="68263"/>
+            <a:ext cx="8534400" cy="2009717"/>
           </a:xfrm>
           <a:prstGeom prst="roundRect">
             <a:avLst>
@@ -3779,115 +3639,810 @@
       </p:sp>
       <p:sp>
         <p:nvSpPr>
-          <p:cNvPr id="37" name="Down Arrow 3"/>
+          <p:cNvPr id="91" name="TextBox 90"/>
+          <p:cNvSpPr txBox="1"/>
+          <p:nvPr/>
+        </p:nvSpPr>
+        <p:spPr>
+          <a:xfrm>
+            <a:off x="326796" y="1346"/>
+            <a:ext cx="869385" cy="169277"/>
+          </a:xfrm>
+          <a:prstGeom prst="rect">
+            <a:avLst/>
+          </a:prstGeom>
+          <a:solidFill>
+            <a:schemeClr val="bg1"/>
+          </a:solidFill>
+        </p:spPr>
+        <p:txBody>
+          <a:bodyPr wrap="square" lIns="0" tIns="0" rIns="0" bIns="0" rtlCol="0">
+            <a:spAutoFit/>
+          </a:bodyPr>
+          <a:lstStyle/>
+          <a:p>
+            <a:r>
+              <a:rPr lang="en-US" sz="1100" dirty="0" smtClean="0">
+                <a:solidFill>
+                  <a:schemeClr val="bg1">
+                    <a:lumMod val="75000"/>
+                  </a:schemeClr>
+                </a:solidFill>
+              </a:rPr>
+              <a:t>[How to enroll]</a:t>
+            </a:r>
+            <a:endParaRPr lang="en-SG" sz="1100" dirty="0">
+              <a:solidFill>
+                <a:schemeClr val="bg1">
+                  <a:lumMod val="75000"/>
+                </a:schemeClr>
+              </a:solidFill>
+            </a:endParaRPr>
+          </a:p>
+        </p:txBody>
+      </p:sp>
+      <p:sp>
+        <p:nvSpPr>
+          <p:cNvPr id="92" name="TextBox 91"/>
+          <p:cNvSpPr txBox="1"/>
+          <p:nvPr/>
+        </p:nvSpPr>
+        <p:spPr>
+          <a:xfrm>
+            <a:off x="388823" y="193675"/>
+            <a:ext cx="2819400" cy="276999"/>
+          </a:xfrm>
+          <a:prstGeom prst="rect">
+            <a:avLst/>
+          </a:prstGeom>
+          <a:noFill/>
+        </p:spPr>
+        <p:txBody>
+          <a:bodyPr wrap="square" rtlCol="0">
+            <a:spAutoFit/>
+          </a:bodyPr>
+          <a:lstStyle>
+            <a:defPPr>
+              <a:defRPr lang="en-US"/>
+            </a:defPPr>
+            <a:lvl1pPr>
+              <a:defRPr sz="1400" b="1">
+                <a:solidFill>
+                  <a:schemeClr val="bg1">
+                    <a:lumMod val="65000"/>
+                  </a:schemeClr>
+                </a:solidFill>
+              </a:defRPr>
+            </a:lvl1pPr>
+          </a:lstStyle>
+          <a:p>
+            <a:r>
+              <a:rPr lang="en-US" sz="1200" b="0" dirty="0">
+                <a:solidFill>
+                  <a:srgbClr val="0070C0"/>
+                </a:solidFill>
+              </a:rPr>
+              <a:t>1. Copy data from a spreadsheet</a:t>
+            </a:r>
+            <a:endParaRPr lang="en-SG" sz="1200" b="0" dirty="0">
+              <a:solidFill>
+                <a:srgbClr val="0070C0"/>
+              </a:solidFill>
+            </a:endParaRPr>
+          </a:p>
+        </p:txBody>
+      </p:sp>
+      <p:sp>
+        <p:nvSpPr>
+          <p:cNvPr id="93" name="TextBox 92"/>
+          <p:cNvSpPr txBox="1"/>
+          <p:nvPr/>
+        </p:nvSpPr>
+        <p:spPr>
+          <a:xfrm>
+            <a:off x="4323878" y="193675"/>
+            <a:ext cx="4118953" cy="276999"/>
+          </a:xfrm>
+          <a:prstGeom prst="rect">
+            <a:avLst/>
+          </a:prstGeom>
+          <a:noFill/>
+        </p:spPr>
+        <p:txBody>
+          <a:bodyPr wrap="square" rtlCol="0">
+            <a:spAutoFit/>
+          </a:bodyPr>
+          <a:lstStyle>
+            <a:defPPr>
+              <a:defRPr lang="en-US"/>
+            </a:defPPr>
+            <a:lvl1pPr>
+              <a:defRPr sz="1400" b="1">
+                <a:solidFill>
+                  <a:schemeClr val="bg1">
+                    <a:lumMod val="65000"/>
+                  </a:schemeClr>
+                </a:solidFill>
+              </a:defRPr>
+            </a:lvl1pPr>
+          </a:lstStyle>
+          <a:p>
+            <a:r>
+              <a:rPr lang="en-US" sz="1200" b="0" dirty="0" smtClean="0">
+                <a:solidFill>
+                  <a:srgbClr val="7F7F7F"/>
+                </a:solidFill>
+              </a:rPr>
+              <a:t>2. Paste in the text box below and click ‘Enroll students’ button </a:t>
+            </a:r>
+            <a:endParaRPr lang="en-SG" sz="1200" b="0" dirty="0">
+              <a:solidFill>
+                <a:srgbClr val="7F7F7F"/>
+              </a:solidFill>
+            </a:endParaRPr>
+          </a:p>
+        </p:txBody>
+      </p:sp>
+      <p:pic>
+        <p:nvPicPr>
+          <p:cNvPr id="94" name="Picture 4"/>
+          <p:cNvPicPr>
+            <a:picLocks noChangeAspect="1" noChangeArrowheads="1"/>
+          </p:cNvPicPr>
+          <p:nvPr/>
+        </p:nvPicPr>
+        <p:blipFill>
+          <a:blip r:embed="rId3">
+            <a:extLst>
+              <a:ext uri="{BEBA8EAE-BF5A-486C-A8C5-ECC9F3942E4B}">
+                <a14:imgProps xmlns:a14="http://schemas.microsoft.com/office/drawing/2010/main">
+                  <a14:imgLayer r:embed="rId4">
+                    <a14:imgEffect>
+                      <a14:saturation sat="0"/>
+                    </a14:imgEffect>
+                  </a14:imgLayer>
+                </a14:imgProps>
+              </a:ext>
+              <a:ext uri="{28A0092B-C50C-407E-A947-70E740481C1C}">
+                <a14:useLocalDpi xmlns:a14="http://schemas.microsoft.com/office/drawing/2010/main" val="0"/>
+              </a:ext>
+            </a:extLst>
+          </a:blip>
+          <a:srcRect/>
+          <a:stretch>
+            <a:fillRect/>
+          </a:stretch>
+        </p:blipFill>
+        <p:spPr bwMode="auto">
+          <a:xfrm>
+            <a:off x="4251832" y="463948"/>
+            <a:ext cx="4339247" cy="1265255"/>
+          </a:xfrm>
+          <a:prstGeom prst="rect">
+            <a:avLst/>
+          </a:prstGeom>
+          <a:noFill/>
+          <a:ln>
+            <a:noFill/>
+          </a:ln>
+          <a:extLst>
+            <a:ext uri="{909E8E84-426E-40DD-AFC4-6F175D3DCCD1}">
+              <a14:hiddenFill xmlns:a14="http://schemas.microsoft.com/office/drawing/2010/main">
+                <a:solidFill>
+                  <a:schemeClr val="accent1"/>
+                </a:solidFill>
+              </a14:hiddenFill>
+            </a:ext>
+            <a:ext uri="{91240B29-F687-4F45-9708-019B960494DF}">
+              <a14:hiddenLine xmlns:a14="http://schemas.microsoft.com/office/drawing/2010/main" w="9525">
+                <a:solidFill>
+                  <a:schemeClr val="tx1"/>
+                </a:solidFill>
+                <a:miter lim="800000"/>
+                <a:headEnd/>
+                <a:tailEnd/>
+              </a14:hiddenLine>
+            </a:ext>
+          </a:extLst>
+        </p:spPr>
+      </p:pic>
+      <p:sp>
+        <p:nvSpPr>
+          <p:cNvPr id="95" name="TextBox 94"/>
+          <p:cNvSpPr txBox="1"/>
+          <p:nvPr/>
+        </p:nvSpPr>
+        <p:spPr>
+          <a:xfrm>
+            <a:off x="5021425" y="588601"/>
+            <a:ext cx="3513332" cy="1169551"/>
+          </a:xfrm>
+          <a:prstGeom prst="rect">
+            <a:avLst/>
+          </a:prstGeom>
+          <a:noFill/>
+        </p:spPr>
+        <p:txBody>
+          <a:bodyPr wrap="square" rtlCol="0">
+            <a:spAutoFit/>
+          </a:bodyPr>
+          <a:lstStyle/>
+          <a:p>
+            <a:r>
+              <a:rPr lang="en-US" sz="1000" b="1" dirty="0" smtClean="0">
+                <a:solidFill>
+                  <a:schemeClr val="tx2">
+                    <a:lumMod val="60000"/>
+                    <a:lumOff val="40000"/>
+                  </a:schemeClr>
+                </a:solidFill>
+                <a:latin typeface="Consolas" panose="020B0609020204030204" pitchFamily="49" charset="0"/>
+                <a:cs typeface="Consolas" panose="020B0609020204030204" pitchFamily="49" charset="0"/>
+              </a:rPr>
+              <a:t>Team    Name         Email             Comments</a:t>
+            </a:r>
+          </a:p>
+          <a:p>
+            <a:r>
+              <a:rPr lang="en-SG" sz="1000" dirty="0" smtClean="0">
+                <a:solidFill>
+                  <a:schemeClr val="tx2">
+                    <a:lumMod val="60000"/>
+                    <a:lumOff val="40000"/>
+                  </a:schemeClr>
+                </a:solidFill>
+                <a:latin typeface="Consolas" panose="020B0609020204030204" pitchFamily="49" charset="0"/>
+                <a:cs typeface="Consolas" panose="020B0609020204030204" pitchFamily="49" charset="0"/>
+              </a:rPr>
+              <a:t>Team 1  Tom Jacobs   tom@email.com	</a:t>
+            </a:r>
+          </a:p>
+          <a:p>
+            <a:r>
+              <a:rPr lang="en-SG" sz="1000" dirty="0" smtClean="0">
+                <a:solidFill>
+                  <a:schemeClr val="tx2">
+                    <a:lumMod val="60000"/>
+                    <a:lumOff val="40000"/>
+                  </a:schemeClr>
+                </a:solidFill>
+                <a:latin typeface="Consolas" panose="020B0609020204030204" pitchFamily="49" charset="0"/>
+                <a:cs typeface="Consolas" panose="020B0609020204030204" pitchFamily="49" charset="0"/>
+              </a:rPr>
+              <a:t>Team 1  Jean Wong    jean@email.com    Exchange</a:t>
+            </a:r>
+          </a:p>
+          <a:p>
+            <a:r>
+              <a:rPr lang="en-SG" sz="1000" dirty="0" smtClean="0">
+                <a:solidFill>
+                  <a:schemeClr val="tx2">
+                    <a:lumMod val="60000"/>
+                    <a:lumOff val="40000"/>
+                  </a:schemeClr>
+                </a:solidFill>
+                <a:latin typeface="Consolas" panose="020B0609020204030204" pitchFamily="49" charset="0"/>
+                <a:cs typeface="Consolas" panose="020B0609020204030204" pitchFamily="49" charset="0"/>
+              </a:rPr>
+              <a:t>Team 1  Ravi Kumar   ravi@email.com	</a:t>
+            </a:r>
+          </a:p>
+          <a:p>
+            <a:r>
+              <a:rPr lang="en-SG" sz="1000" dirty="0" smtClean="0">
+                <a:solidFill>
+                  <a:schemeClr val="tx2">
+                    <a:lumMod val="60000"/>
+                    <a:lumOff val="40000"/>
+                  </a:schemeClr>
+                </a:solidFill>
+                <a:latin typeface="Consolas" panose="020B0609020204030204" pitchFamily="49" charset="0"/>
+                <a:cs typeface="Consolas" panose="020B0609020204030204" pitchFamily="49" charset="0"/>
+              </a:rPr>
+              <a:t>Team 2  Chun Ling    ling@coolmai.com</a:t>
+            </a:r>
+            <a:r>
+              <a:rPr lang="en-SG" sz="1000" dirty="0">
+                <a:solidFill>
+                  <a:schemeClr val="tx2">
+                    <a:lumMod val="60000"/>
+                    <a:lumOff val="40000"/>
+                  </a:schemeClr>
+                </a:solidFill>
+                <a:latin typeface="Consolas" panose="020B0609020204030204" pitchFamily="49" charset="0"/>
+                <a:cs typeface="Consolas" panose="020B0609020204030204" pitchFamily="49" charset="0"/>
+              </a:rPr>
+              <a:t>	</a:t>
+            </a:r>
+          </a:p>
+          <a:p>
+            <a:r>
+              <a:rPr lang="en-SG" sz="1000" dirty="0">
+                <a:solidFill>
+                  <a:schemeClr val="tx2">
+                    <a:lumMod val="60000"/>
+                    <a:lumOff val="40000"/>
+                  </a:schemeClr>
+                </a:solidFill>
+                <a:latin typeface="Consolas" panose="020B0609020204030204" pitchFamily="49" charset="0"/>
+                <a:cs typeface="Consolas" panose="020B0609020204030204" pitchFamily="49" charset="0"/>
+              </a:rPr>
+              <a:t>Team </a:t>
+            </a:r>
+            <a:r>
+              <a:rPr lang="en-SG" sz="1000" dirty="0" smtClean="0">
+                <a:solidFill>
+                  <a:schemeClr val="tx2">
+                    <a:lumMod val="60000"/>
+                    <a:lumOff val="40000"/>
+                  </a:schemeClr>
+                </a:solidFill>
+                <a:latin typeface="Consolas" panose="020B0609020204030204" pitchFamily="49" charset="0"/>
+                <a:cs typeface="Consolas" panose="020B0609020204030204" pitchFamily="49" charset="0"/>
+              </a:rPr>
+              <a:t>2  Desmond Wu   desmond@email.com</a:t>
+            </a:r>
+          </a:p>
+          <a:p>
+            <a:r>
+              <a:rPr lang="en-US" sz="1000" dirty="0" smtClean="0">
+                <a:solidFill>
+                  <a:schemeClr val="tx2">
+                    <a:lumMod val="60000"/>
+                    <a:lumOff val="40000"/>
+                  </a:schemeClr>
+                </a:solidFill>
+                <a:latin typeface="Consolas" panose="020B0609020204030204" pitchFamily="49" charset="0"/>
+                <a:cs typeface="Consolas" panose="020B0609020204030204" pitchFamily="49" charset="0"/>
+              </a:rPr>
+              <a:t>Team 2  </a:t>
+            </a:r>
+            <a:r>
+              <a:rPr lang="en-US" sz="1000" dirty="0" err="1" smtClean="0">
+                <a:solidFill>
+                  <a:schemeClr val="tx2">
+                    <a:lumMod val="60000"/>
+                    <a:lumOff val="40000"/>
+                  </a:schemeClr>
+                </a:solidFill>
+                <a:latin typeface="Consolas" panose="020B0609020204030204" pitchFamily="49" charset="0"/>
+                <a:cs typeface="Consolas" panose="020B0609020204030204" pitchFamily="49" charset="0"/>
+              </a:rPr>
+              <a:t>Harsha</a:t>
+            </a:r>
+            <a:r>
+              <a:rPr lang="en-US" sz="1000" dirty="0" smtClean="0">
+                <a:solidFill>
+                  <a:schemeClr val="tx2">
+                    <a:lumMod val="60000"/>
+                    <a:lumOff val="40000"/>
+                  </a:schemeClr>
+                </a:solidFill>
+                <a:latin typeface="Consolas" panose="020B0609020204030204" pitchFamily="49" charset="0"/>
+                <a:cs typeface="Consolas" panose="020B0609020204030204" pitchFamily="49" charset="0"/>
+              </a:rPr>
+              <a:t> Silva harsha@school.com</a:t>
+            </a:r>
+            <a:endParaRPr lang="en-SG" sz="1000" dirty="0">
+              <a:solidFill>
+                <a:schemeClr val="tx2">
+                  <a:lumMod val="60000"/>
+                  <a:lumOff val="40000"/>
+                </a:schemeClr>
+              </a:solidFill>
+              <a:latin typeface="Consolas" panose="020B0609020204030204" pitchFamily="49" charset="0"/>
+              <a:cs typeface="Consolas" panose="020B0609020204030204" pitchFamily="49" charset="0"/>
+            </a:endParaRPr>
+          </a:p>
+        </p:txBody>
+      </p:sp>
+      <p:pic>
+        <p:nvPicPr>
+          <p:cNvPr id="96" name="Picture 5"/>
+          <p:cNvPicPr>
+            <a:picLocks noChangeAspect="1" noChangeArrowheads="1"/>
+          </p:cNvPicPr>
+          <p:nvPr/>
+        </p:nvPicPr>
+        <p:blipFill>
+          <a:blip r:embed="rId5">
+            <a:duotone>
+              <a:schemeClr val="bg2">
+                <a:shade val="45000"/>
+                <a:satMod val="135000"/>
+              </a:schemeClr>
+              <a:prstClr val="white"/>
+            </a:duotone>
+            <a:extLst>
+              <a:ext uri="{28A0092B-C50C-407E-A947-70E740481C1C}">
+                <a14:useLocalDpi xmlns:a14="http://schemas.microsoft.com/office/drawing/2010/main" val="0"/>
+              </a:ext>
+            </a:extLst>
+          </a:blip>
+          <a:srcRect/>
+          <a:stretch>
+            <a:fillRect/>
+          </a:stretch>
+        </p:blipFill>
+        <p:spPr bwMode="auto">
+          <a:xfrm>
+            <a:off x="372258" y="501452"/>
+            <a:ext cx="3803374" cy="1443797"/>
+          </a:xfrm>
+          <a:prstGeom prst="rect">
+            <a:avLst/>
+          </a:prstGeom>
+          <a:noFill/>
+          <a:ln>
+            <a:noFill/>
+          </a:ln>
+          <a:extLst>
+            <a:ext uri="{909E8E84-426E-40DD-AFC4-6F175D3DCCD1}">
+              <a14:hiddenFill xmlns:a14="http://schemas.microsoft.com/office/drawing/2010/main">
+                <a:solidFill>
+                  <a:schemeClr val="accent1"/>
+                </a:solidFill>
+              </a14:hiddenFill>
+            </a:ext>
+            <a:ext uri="{91240B29-F687-4F45-9708-019B960494DF}">
+              <a14:hiddenLine xmlns:a14="http://schemas.microsoft.com/office/drawing/2010/main" w="9525">
+                <a:solidFill>
+                  <a:schemeClr val="tx1"/>
+                </a:solidFill>
+                <a:miter lim="800000"/>
+                <a:headEnd/>
+                <a:tailEnd/>
+              </a14:hiddenLine>
+            </a:ext>
+          </a:extLst>
+        </p:spPr>
+      </p:pic>
+      <p:pic>
+        <p:nvPicPr>
+          <p:cNvPr id="97" name="Picture 6"/>
+          <p:cNvPicPr>
+            <a:picLocks noChangeAspect="1" noChangeArrowheads="1"/>
+          </p:cNvPicPr>
+          <p:nvPr/>
+        </p:nvPicPr>
+        <p:blipFill>
+          <a:blip r:embed="rId6">
+            <a:extLst>
+              <a:ext uri="{28A0092B-C50C-407E-A947-70E740481C1C}">
+                <a14:useLocalDpi xmlns:a14="http://schemas.microsoft.com/office/drawing/2010/main" val="0"/>
+              </a:ext>
+            </a:extLst>
+          </a:blip>
+          <a:srcRect/>
+          <a:stretch>
+            <a:fillRect/>
+          </a:stretch>
+        </p:blipFill>
+        <p:spPr bwMode="auto">
+          <a:xfrm>
+            <a:off x="372258" y="501452"/>
+            <a:ext cx="3803374" cy="1443797"/>
+          </a:xfrm>
+          <a:prstGeom prst="rect">
+            <a:avLst/>
+          </a:prstGeom>
+          <a:noFill/>
+          <a:ln>
+            <a:noFill/>
+          </a:ln>
+          <a:extLst>
+            <a:ext uri="{909E8E84-426E-40DD-AFC4-6F175D3DCCD1}">
+              <a14:hiddenFill xmlns:a14="http://schemas.microsoft.com/office/drawing/2010/main">
+                <a:solidFill>
+                  <a:schemeClr val="accent1"/>
+                </a:solidFill>
+              </a14:hiddenFill>
+            </a:ext>
+            <a:ext uri="{91240B29-F687-4F45-9708-019B960494DF}">
+              <a14:hiddenLine xmlns:a14="http://schemas.microsoft.com/office/drawing/2010/main" w="9525">
+                <a:solidFill>
+                  <a:schemeClr val="tx1"/>
+                </a:solidFill>
+                <a:miter lim="800000"/>
+                <a:headEnd/>
+                <a:tailEnd/>
+              </a14:hiddenLine>
+            </a:ext>
+          </a:extLst>
+        </p:spPr>
+      </p:pic>
+      <p:pic>
+        <p:nvPicPr>
+          <p:cNvPr id="98" name="Picture 7"/>
+          <p:cNvPicPr>
+            <a:picLocks noChangeAspect="1" noChangeArrowheads="1"/>
+          </p:cNvPicPr>
+          <p:nvPr/>
+        </p:nvPicPr>
+        <p:blipFill>
+          <a:blip r:embed="rId7">
+            <a:extLst>
+              <a:ext uri="{28A0092B-C50C-407E-A947-70E740481C1C}">
+                <a14:useLocalDpi xmlns:a14="http://schemas.microsoft.com/office/drawing/2010/main" val="0"/>
+              </a:ext>
+            </a:extLst>
+          </a:blip>
+          <a:srcRect/>
+          <a:stretch>
+            <a:fillRect/>
+          </a:stretch>
+        </p:blipFill>
+        <p:spPr bwMode="auto">
+          <a:xfrm>
+            <a:off x="372258" y="501452"/>
+            <a:ext cx="3803374" cy="1443797"/>
+          </a:xfrm>
+          <a:prstGeom prst="rect">
+            <a:avLst/>
+          </a:prstGeom>
+          <a:noFill/>
+          <a:ln>
+            <a:noFill/>
+          </a:ln>
+          <a:extLst>
+            <a:ext uri="{909E8E84-426E-40DD-AFC4-6F175D3DCCD1}">
+              <a14:hiddenFill xmlns:a14="http://schemas.microsoft.com/office/drawing/2010/main">
+                <a:solidFill>
+                  <a:schemeClr val="accent1"/>
+                </a:solidFill>
+              </a14:hiddenFill>
+            </a:ext>
+            <a:ext uri="{91240B29-F687-4F45-9708-019B960494DF}">
+              <a14:hiddenLine xmlns:a14="http://schemas.microsoft.com/office/drawing/2010/main" w="9525">
+                <a:solidFill>
+                  <a:schemeClr val="tx1"/>
+                </a:solidFill>
+                <a:miter lim="800000"/>
+                <a:headEnd/>
+                <a:tailEnd/>
+              </a14:hiddenLine>
+            </a:ext>
+          </a:extLst>
+        </p:spPr>
+      </p:pic>
+      <p:pic>
+        <p:nvPicPr>
+          <p:cNvPr id="99" name="Picture 8"/>
+          <p:cNvPicPr>
+            <a:picLocks noChangeAspect="1" noChangeArrowheads="1"/>
+          </p:cNvPicPr>
+          <p:nvPr/>
+        </p:nvPicPr>
+        <p:blipFill>
+          <a:blip r:embed="rId8">
+            <a:extLst>
+              <a:ext uri="{28A0092B-C50C-407E-A947-70E740481C1C}">
+                <a14:useLocalDpi xmlns:a14="http://schemas.microsoft.com/office/drawing/2010/main" val="0"/>
+              </a:ext>
+            </a:extLst>
+          </a:blip>
+          <a:srcRect/>
+          <a:stretch>
+            <a:fillRect/>
+          </a:stretch>
+        </p:blipFill>
+        <p:spPr bwMode="auto">
+          <a:xfrm>
+            <a:off x="372258" y="501452"/>
+            <a:ext cx="3803374" cy="1443797"/>
+          </a:xfrm>
+          <a:prstGeom prst="rect">
+            <a:avLst/>
+          </a:prstGeom>
+          <a:noFill/>
+          <a:ln>
+            <a:noFill/>
+          </a:ln>
+          <a:extLst>
+            <a:ext uri="{909E8E84-426E-40DD-AFC4-6F175D3DCCD1}">
+              <a14:hiddenFill xmlns:a14="http://schemas.microsoft.com/office/drawing/2010/main">
+                <a:solidFill>
+                  <a:schemeClr val="accent1"/>
+                </a:solidFill>
+              </a14:hiddenFill>
+            </a:ext>
+            <a:ext uri="{91240B29-F687-4F45-9708-019B960494DF}">
+              <a14:hiddenLine xmlns:a14="http://schemas.microsoft.com/office/drawing/2010/main" w="9525">
+                <a:solidFill>
+                  <a:schemeClr val="tx1"/>
+                </a:solidFill>
+                <a:miter lim="800000"/>
+                <a:headEnd/>
+                <a:tailEnd/>
+              </a14:hiddenLine>
+            </a:ext>
+          </a:extLst>
+        </p:spPr>
+      </p:pic>
+      <p:pic>
+        <p:nvPicPr>
+          <p:cNvPr id="100" name="Picture 9"/>
+          <p:cNvPicPr>
+            <a:picLocks noChangeAspect="1" noChangeArrowheads="1"/>
+          </p:cNvPicPr>
+          <p:nvPr/>
+        </p:nvPicPr>
+        <p:blipFill>
+          <a:blip r:embed="rId9">
+            <a:extLst>
+              <a:ext uri="{28A0092B-C50C-407E-A947-70E740481C1C}">
+                <a14:useLocalDpi xmlns:a14="http://schemas.microsoft.com/office/drawing/2010/main" val="0"/>
+              </a:ext>
+            </a:extLst>
+          </a:blip>
+          <a:srcRect/>
+          <a:stretch>
+            <a:fillRect/>
+          </a:stretch>
+        </p:blipFill>
+        <p:spPr bwMode="auto">
+          <a:xfrm>
+            <a:off x="372258" y="501452"/>
+            <a:ext cx="3803374" cy="1443797"/>
+          </a:xfrm>
+          <a:prstGeom prst="rect">
+            <a:avLst/>
+          </a:prstGeom>
+          <a:noFill/>
+          <a:ln>
+            <a:noFill/>
+          </a:ln>
+          <a:extLst>
+            <a:ext uri="{909E8E84-426E-40DD-AFC4-6F175D3DCCD1}">
+              <a14:hiddenFill xmlns:a14="http://schemas.microsoft.com/office/drawing/2010/main">
+                <a:solidFill>
+                  <a:schemeClr val="accent1"/>
+                </a:solidFill>
+              </a14:hiddenFill>
+            </a:ext>
+            <a:ext uri="{91240B29-F687-4F45-9708-019B960494DF}">
+              <a14:hiddenLine xmlns:a14="http://schemas.microsoft.com/office/drawing/2010/main" w="9525">
+                <a:solidFill>
+                  <a:schemeClr val="tx1"/>
+                </a:solidFill>
+                <a:miter lim="800000"/>
+                <a:headEnd/>
+                <a:tailEnd/>
+              </a14:hiddenLine>
+            </a:ext>
+          </a:extLst>
+        </p:spPr>
+      </p:pic>
+      <p:sp>
+        <p:nvSpPr>
+          <p:cNvPr id="101" name="TextBox 100"/>
+          <p:cNvSpPr txBox="1"/>
+          <p:nvPr/>
+        </p:nvSpPr>
+        <p:spPr>
+          <a:xfrm>
+            <a:off x="5090032" y="602575"/>
+            <a:ext cx="3513332" cy="246221"/>
+          </a:xfrm>
+          <a:prstGeom prst="rect">
+            <a:avLst/>
+          </a:prstGeom>
+          <a:noFill/>
+        </p:spPr>
+        <p:txBody>
+          <a:bodyPr wrap="square" rtlCol="0">
+            <a:spAutoFit/>
+          </a:bodyPr>
+          <a:lstStyle/>
+          <a:p>
+            <a:r>
+              <a:rPr lang="en-US" sz="1000" dirty="0" smtClean="0">
+                <a:solidFill>
+                  <a:schemeClr val="bg1">
+                    <a:lumMod val="65000"/>
+                  </a:schemeClr>
+                </a:solidFill>
+                <a:latin typeface="Consolas" panose="020B0609020204030204" pitchFamily="49" charset="0"/>
+                <a:cs typeface="Consolas" panose="020B0609020204030204" pitchFamily="49" charset="0"/>
+              </a:rPr>
+              <a:t>Paste student data here ...</a:t>
+            </a:r>
+            <a:endParaRPr lang="en-SG" sz="1000" dirty="0">
+              <a:solidFill>
+                <a:schemeClr val="bg1">
+                  <a:lumMod val="65000"/>
+                </a:schemeClr>
+              </a:solidFill>
+              <a:latin typeface="Consolas" panose="020B0609020204030204" pitchFamily="49" charset="0"/>
+              <a:cs typeface="Consolas" panose="020B0609020204030204" pitchFamily="49" charset="0"/>
+            </a:endParaRPr>
+          </a:p>
+        </p:txBody>
+      </p:sp>
+      <p:pic>
+        <p:nvPicPr>
+          <p:cNvPr id="102" name="Picture 9"/>
+          <p:cNvPicPr>
+            <a:picLocks noChangeAspect="1" noChangeArrowheads="1"/>
+          </p:cNvPicPr>
+          <p:nvPr/>
+        </p:nvPicPr>
+        <p:blipFill>
+          <a:blip r:embed="rId9">
+            <a:duotone>
+              <a:schemeClr val="bg2">
+                <a:shade val="45000"/>
+                <a:satMod val="135000"/>
+              </a:schemeClr>
+              <a:prstClr val="white"/>
+            </a:duotone>
+            <a:extLst>
+              <a:ext uri="{28A0092B-C50C-407E-A947-70E740481C1C}">
+                <a14:useLocalDpi xmlns:a14="http://schemas.microsoft.com/office/drawing/2010/main" val="0"/>
+              </a:ext>
+            </a:extLst>
+          </a:blip>
+          <a:srcRect/>
+          <a:stretch>
+            <a:fillRect/>
+          </a:stretch>
+        </p:blipFill>
+        <p:spPr bwMode="auto">
+          <a:xfrm>
+            <a:off x="372258" y="501452"/>
+            <a:ext cx="3803374" cy="1443797"/>
+          </a:xfrm>
+          <a:prstGeom prst="rect">
+            <a:avLst/>
+          </a:prstGeom>
+          <a:noFill/>
+          <a:ln>
+            <a:noFill/>
+          </a:ln>
+          <a:extLst>
+            <a:ext uri="{909E8E84-426E-40DD-AFC4-6F175D3DCCD1}">
+              <a14:hiddenFill xmlns:a14="http://schemas.microsoft.com/office/drawing/2010/main">
+                <a:solidFill>
+                  <a:schemeClr val="accent1"/>
+                </a:solidFill>
+              </a14:hiddenFill>
+            </a:ext>
+            <a:ext uri="{91240B29-F687-4F45-9708-019B960494DF}">
+              <a14:hiddenLine xmlns:a14="http://schemas.microsoft.com/office/drawing/2010/main" w="9525">
+                <a:solidFill>
+                  <a:schemeClr val="tx1"/>
+                </a:solidFill>
+                <a:miter lim="800000"/>
+                <a:headEnd/>
+                <a:tailEnd/>
+              </a14:hiddenLine>
+            </a:ext>
+          </a:extLst>
+        </p:spPr>
+      </p:pic>
+      <p:sp>
+        <p:nvSpPr>
+          <p:cNvPr id="103" name="Rounded Rectangle 102"/>
           <p:cNvSpPr/>
           <p:nvPr/>
         </p:nvSpPr>
         <p:spPr>
           <a:xfrm>
-            <a:off x="533400" y="614962"/>
-            <a:ext cx="8153400" cy="434907"/>
+            <a:off x="4175632" y="1442237"/>
+            <a:ext cx="4415447" cy="475616"/>
           </a:xfrm>
-          <a:custGeom>
+          <a:prstGeom prst="roundRect">
             <a:avLst/>
-            <a:gdLst/>
-            <a:ahLst/>
-            <a:cxnLst/>
-            <a:rect l="l" t="t" r="r" b="b"/>
-            <a:pathLst>
-              <a:path w="8153400" h="434907">
-                <a:moveTo>
-                  <a:pt x="50801" y="0"/>
-                </a:moveTo>
-                <a:lnTo>
-                  <a:pt x="8102599" y="0"/>
-                </a:lnTo>
-                <a:cubicBezTo>
-                  <a:pt x="8130656" y="0"/>
-                  <a:pt x="8153400" y="22744"/>
-                  <a:pt x="8153400" y="50801"/>
-                </a:cubicBezTo>
-                <a:lnTo>
-                  <a:pt x="8153400" y="253999"/>
-                </a:lnTo>
-                <a:cubicBezTo>
-                  <a:pt x="8153400" y="282056"/>
-                  <a:pt x="8130656" y="304800"/>
-                  <a:pt x="8102599" y="304800"/>
-                </a:cubicBezTo>
-                <a:lnTo>
-                  <a:pt x="6788150" y="304800"/>
-                </a:lnTo>
-                <a:lnTo>
-                  <a:pt x="6788150" y="367173"/>
-                </a:lnTo>
-                <a:lnTo>
-                  <a:pt x="6819900" y="367173"/>
-                </a:lnTo>
-                <a:lnTo>
-                  <a:pt x="6705600" y="434907"/>
-                </a:lnTo>
-                <a:lnTo>
-                  <a:pt x="6591300" y="367173"/>
-                </a:lnTo>
-                <a:lnTo>
-                  <a:pt x="6623050" y="367173"/>
-                </a:lnTo>
-                <a:lnTo>
-                  <a:pt x="6623050" y="304800"/>
-                </a:lnTo>
-                <a:lnTo>
-                  <a:pt x="2635250" y="304800"/>
-                </a:lnTo>
-                <a:lnTo>
-                  <a:pt x="2635250" y="367173"/>
-                </a:lnTo>
-                <a:lnTo>
-                  <a:pt x="2667000" y="367173"/>
-                </a:lnTo>
-                <a:lnTo>
-                  <a:pt x="2552700" y="434907"/>
-                </a:lnTo>
-                <a:lnTo>
-                  <a:pt x="2438400" y="367173"/>
-                </a:lnTo>
-                <a:lnTo>
-                  <a:pt x="2470150" y="367173"/>
-                </a:lnTo>
-                <a:lnTo>
-                  <a:pt x="2470150" y="304800"/>
-                </a:lnTo>
-                <a:lnTo>
-                  <a:pt x="50801" y="304800"/>
-                </a:lnTo>
-                <a:cubicBezTo>
-                  <a:pt x="22744" y="304800"/>
-                  <a:pt x="0" y="282056"/>
-                  <a:pt x="0" y="253999"/>
-                </a:cubicBezTo>
-                <a:lnTo>
-                  <a:pt x="0" y="50801"/>
-                </a:lnTo>
-                <a:cubicBezTo>
-                  <a:pt x="0" y="22744"/>
-                  <a:pt x="22744" y="0"/>
-                  <a:pt x="50801" y="0"/>
-                </a:cubicBezTo>
-                <a:close/>
-              </a:path>
-            </a:pathLst>
-          </a:custGeom>
+          </a:prstGeom>
           <a:solidFill>
-            <a:srgbClr val="FFFFDD"/>
+            <a:schemeClr val="bg1"/>
           </a:solidFill>
-          <a:ln w="9525">
-            <a:solidFill>
-              <a:schemeClr val="bg1">
-                <a:lumMod val="50000"/>
-              </a:schemeClr>
-            </a:solidFill>
+          <a:ln>
+            <a:noFill/>
           </a:ln>
-          <a:effectLst/>
+          <a:effectLst>
+            <a:softEdge rad="63500"/>
+          </a:effectLst>
         </p:spPr>
         <p:style>
           <a:lnRef idx="2">
@@ -3906,77 +4461,129 @@
           </a:fontRef>
         </p:style>
         <p:txBody>
-          <a:bodyPr wrap="square" lIns="91429" tIns="45715" rIns="91429" bIns="45715" rtlCol="0" anchor="t" anchorCtr="0">
-            <a:noAutofit/>
-          </a:bodyPr>
+          <a:bodyPr rtlCol="0" anchor="ctr"/>
           <a:lstStyle/>
           <a:p>
-            <a:pPr marL="228600"/>
-            <a:r>
-              <a:rPr lang="en-US" sz="1100" dirty="0">
-                <a:solidFill>
-                  <a:schemeClr val="tx1"/>
-                </a:solidFill>
-              </a:rPr>
-              <a:t>You can simply copy-paste from existing spreadsheets </a:t>
-            </a:r>
-            <a:r>
-              <a:rPr lang="en-US" sz="1100" dirty="0" smtClean="0">
-                <a:solidFill>
-                  <a:schemeClr val="tx1"/>
-                </a:solidFill>
-              </a:rPr>
-              <a:t>…                                                                     </a:t>
-            </a:r>
-            <a:r>
-              <a:rPr lang="en-US" sz="1100" dirty="0">
-                <a:solidFill>
-                  <a:schemeClr val="tx1"/>
-                </a:solidFill>
-              </a:rPr>
-              <a:t>… type directly in the text </a:t>
-            </a:r>
-            <a:r>
-              <a:rPr lang="en-US" sz="1100" dirty="0" smtClean="0">
-                <a:solidFill>
-                  <a:schemeClr val="tx1"/>
-                </a:solidFill>
-              </a:rPr>
-              <a:t>box</a:t>
-            </a:r>
-            <a:endParaRPr lang="en-US" sz="1100" dirty="0">
-              <a:solidFill>
-                <a:schemeClr val="tx1"/>
-              </a:solidFill>
-            </a:endParaRPr>
-          </a:p>
-        </p:txBody>
-      </p:sp>
-      <p:sp>
-        <p:nvSpPr>
-          <p:cNvPr id="38" name="Flowchart: Connector 37"/>
-          <p:cNvSpPr/>
+            <a:pPr algn="ctr"/>
+            <a:endParaRPr lang="en-SG"/>
+          </a:p>
+        </p:txBody>
+      </p:sp>
+      <p:pic>
+        <p:nvPicPr>
+          <p:cNvPr id="104" name="Picture 11"/>
+          <p:cNvPicPr>
+            <a:picLocks noChangeAspect="1" noChangeArrowheads="1"/>
+          </p:cNvPicPr>
           <p:nvPr/>
-        </p:nvSpPr>
-        <p:spPr>
+        </p:nvPicPr>
+        <p:blipFill>
+          <a:blip r:embed="rId10">
+            <a:extLst>
+              <a:ext uri="{28A0092B-C50C-407E-A947-70E740481C1C}">
+                <a14:useLocalDpi xmlns:a14="http://schemas.microsoft.com/office/drawing/2010/main" val="0"/>
+              </a:ext>
+            </a:extLst>
+          </a:blip>
+          <a:srcRect/>
+          <a:stretch>
+            <a:fillRect/>
+          </a:stretch>
+        </p:blipFill>
+        <p:spPr bwMode="auto">
           <a:xfrm>
-            <a:off x="5410200" y="533401"/>
-            <a:ext cx="457200" cy="457200"/>
+            <a:off x="5874153" y="1622789"/>
+            <a:ext cx="1019175" cy="285750"/>
           </a:xfrm>
-          <a:prstGeom prst="flowChartConnector">
+          <a:prstGeom prst="rect">
             <a:avLst/>
           </a:prstGeom>
+          <a:noFill/>
+          <a:ln>
+            <a:noFill/>
+          </a:ln>
+          <a:extLst>
+            <a:ext uri="{909E8E84-426E-40DD-AFC4-6F175D3DCCD1}">
+              <a14:hiddenFill xmlns:a14="http://schemas.microsoft.com/office/drawing/2010/main">
+                <a:solidFill>
+                  <a:schemeClr val="accent1"/>
+                </a:solidFill>
+              </a14:hiddenFill>
+            </a:ext>
+            <a:ext uri="{91240B29-F687-4F45-9708-019B960494DF}">
+              <a14:hiddenLine xmlns:a14="http://schemas.microsoft.com/office/drawing/2010/main" w="9525">
+                <a:solidFill>
+                  <a:schemeClr val="tx1"/>
+                </a:solidFill>
+                <a:miter lim="800000"/>
+                <a:headEnd/>
+                <a:tailEnd/>
+              </a14:hiddenLine>
+            </a:ext>
+          </a:extLst>
+        </p:spPr>
+      </p:pic>
+      <p:sp>
+        <p:nvSpPr>
+          <p:cNvPr id="105" name="Flowchart: Extract 4"/>
+          <p:cNvSpPr>
+            <a:spLocks noChangeAspect="1"/>
+          </p:cNvSpPr>
+          <p:nvPr/>
+        </p:nvSpPr>
+        <p:spPr>
+          <a:xfrm rot="20042488">
+            <a:off x="6411863" y="2055719"/>
+            <a:ext cx="120505" cy="178712"/>
+          </a:xfrm>
+          <a:custGeom>
+            <a:avLst/>
+            <a:gdLst/>
+            <a:ahLst/>
+            <a:cxnLst/>
+            <a:rect l="l" t="t" r="r" b="b"/>
+            <a:pathLst>
+              <a:path w="457618" h="678657">
+                <a:moveTo>
+                  <a:pt x="228809" y="0"/>
+                </a:moveTo>
+                <a:lnTo>
+                  <a:pt x="457618" y="533400"/>
+                </a:lnTo>
+                <a:lnTo>
+                  <a:pt x="283825" y="472061"/>
+                </a:lnTo>
+                <a:lnTo>
+                  <a:pt x="283825" y="678657"/>
+                </a:lnTo>
+                <a:lnTo>
+                  <a:pt x="173793" y="678657"/>
+                </a:lnTo>
+                <a:lnTo>
+                  <a:pt x="173793" y="472061"/>
+                </a:lnTo>
+                <a:lnTo>
+                  <a:pt x="0" y="533400"/>
+                </a:lnTo>
+                <a:close/>
+              </a:path>
+            </a:pathLst>
+          </a:custGeom>
           <a:solidFill>
             <a:schemeClr val="bg1"/>
           </a:solidFill>
-          <a:ln>
+          <a:ln w="12700" cap="rnd">
             <a:solidFill>
-              <a:schemeClr val="bg1">
-                <a:lumMod val="85000"/>
-              </a:schemeClr>
+              <a:schemeClr val="tx1"/>
             </a:solidFill>
           </a:ln>
-          <a:effectLst/>
+          <a:effectLst>
+            <a:outerShdw blurRad="63500" sx="102000" sy="102000" algn="ctr" rotWithShape="0">
+              <a:prstClr val="black">
+                <a:alpha val="40000"/>
+              </a:prstClr>
+            </a:outerShdw>
+          </a:effectLst>
         </p:spPr>
         <p:style>
           <a:lnRef idx="2">
@@ -3995,119 +4602,37 @@
           </a:fontRef>
         </p:style>
         <p:txBody>
-          <a:bodyPr lIns="0" tIns="0" rIns="0" bIns="0" rtlCol="0" anchor="ctr"/>
+          <a:bodyPr rtlCol="0" anchor="ctr"/>
           <a:lstStyle/>
           <a:p>
             <a:pPr algn="ctr"/>
-            <a:r>
-              <a:rPr lang="en-US" sz="1600" b="1" dirty="0" smtClean="0">
-                <a:solidFill>
-                  <a:schemeClr val="tx1">
-                    <a:lumMod val="50000"/>
-                    <a:lumOff val="50000"/>
-                  </a:schemeClr>
-                </a:solidFill>
-              </a:rPr>
-              <a:t>OR</a:t>
-            </a:r>
-            <a:endParaRPr lang="en-US" sz="1600" b="1" dirty="0">
-              <a:solidFill>
-                <a:schemeClr val="tx1">
-                  <a:lumMod val="50000"/>
-                  <a:lumOff val="50000"/>
-                </a:schemeClr>
-              </a:solidFill>
-            </a:endParaRPr>
-          </a:p>
-        </p:txBody>
-      </p:sp>
-      <p:sp>
-        <p:nvSpPr>
-          <p:cNvPr id="39" name="Up Arrow 25"/>
+            <a:endParaRPr lang="en-SG"/>
+          </a:p>
+        </p:txBody>
+      </p:sp>
+      <p:sp>
+        <p:nvSpPr>
+          <p:cNvPr id="106" name="Donut 105"/>
           <p:cNvSpPr/>
           <p:nvPr/>
         </p:nvSpPr>
         <p:spPr>
           <a:xfrm>
-            <a:off x="6781800" y="1702286"/>
-            <a:ext cx="1252774" cy="507514"/>
+            <a:off x="5936364" y="1442237"/>
+            <a:ext cx="1061882" cy="1061882"/>
           </a:xfrm>
-          <a:custGeom>
+          <a:prstGeom prst="donut">
             <a:avLst/>
-            <a:gdLst/>
-            <a:ahLst/>
-            <a:cxnLst/>
-            <a:rect l="l" t="t" r="r" b="b"/>
-            <a:pathLst>
-              <a:path w="1802209" h="787886">
-                <a:moveTo>
-                  <a:pt x="495301" y="0"/>
-                </a:moveTo>
-                <a:lnTo>
-                  <a:pt x="609601" y="114300"/>
-                </a:lnTo>
-                <a:lnTo>
-                  <a:pt x="552451" y="114300"/>
-                </a:lnTo>
-                <a:lnTo>
-                  <a:pt x="552451" y="178286"/>
-                </a:lnTo>
-                <a:lnTo>
-                  <a:pt x="1700607" y="178286"/>
-                </a:lnTo>
-                <a:cubicBezTo>
-                  <a:pt x="1756720" y="178286"/>
-                  <a:pt x="1802209" y="223775"/>
-                  <a:pt x="1802209" y="279888"/>
-                </a:cubicBezTo>
-                <a:lnTo>
-                  <a:pt x="1802209" y="686284"/>
-                </a:lnTo>
-                <a:cubicBezTo>
-                  <a:pt x="1802209" y="742397"/>
-                  <a:pt x="1756720" y="787886"/>
-                  <a:pt x="1700607" y="787886"/>
-                </a:cubicBezTo>
-                <a:lnTo>
-                  <a:pt x="101602" y="787886"/>
-                </a:lnTo>
-                <a:cubicBezTo>
-                  <a:pt x="45489" y="787886"/>
-                  <a:pt x="0" y="742397"/>
-                  <a:pt x="0" y="686284"/>
-                </a:cubicBezTo>
-                <a:lnTo>
-                  <a:pt x="0" y="279888"/>
-                </a:lnTo>
-                <a:cubicBezTo>
-                  <a:pt x="0" y="223775"/>
-                  <a:pt x="45489" y="178286"/>
-                  <a:pt x="101602" y="178286"/>
-                </a:cubicBezTo>
-                <a:lnTo>
-                  <a:pt x="438150" y="178286"/>
-                </a:lnTo>
-                <a:lnTo>
-                  <a:pt x="438150" y="114300"/>
-                </a:lnTo>
-                <a:lnTo>
-                  <a:pt x="381000" y="114300"/>
-                </a:lnTo>
-                <a:close/>
-              </a:path>
-            </a:pathLst>
-          </a:custGeom>
+          </a:prstGeom>
           <a:solidFill>
-            <a:srgbClr val="FFFFDD"/>
+            <a:srgbClr val="FFFF00"/>
           </a:solidFill>
-          <a:ln w="9525">
-            <a:solidFill>
-              <a:schemeClr val="bg1">
-                <a:lumMod val="50000"/>
-              </a:schemeClr>
-            </a:solidFill>
+          <a:ln>
+            <a:noFill/>
           </a:ln>
-          <a:effectLst/>
+          <a:effectLst>
+            <a:softEdge rad="127000"/>
+          </a:effectLst>
         </p:spPr>
         <p:style>
           <a:lnRef idx="2">
@@ -4126,58 +4651,13 @@
           </a:fontRef>
         </p:style>
         <p:txBody>
-          <a:bodyPr wrap="square" lIns="91429" tIns="45715" rIns="91429" bIns="45715" rtlCol="0" anchor="b" anchorCtr="0">
-            <a:noAutofit/>
-          </a:bodyPr>
+          <a:bodyPr rtlCol="0" anchor="ctr"/>
           <a:lstStyle/>
           <a:p>
             <a:pPr algn="ctr"/>
-            <a:r>
-              <a:rPr lang="en-US" sz="1100" dirty="0">
-                <a:solidFill>
-                  <a:schemeClr val="tx1"/>
-                </a:solidFill>
-              </a:rPr>
-              <a:t>Use ‘</a:t>
-            </a:r>
-            <a:r>
-              <a:rPr lang="en-US" sz="1100" b="1" dirty="0">
-                <a:solidFill>
-                  <a:schemeClr val="tx1"/>
-                </a:solidFill>
-              </a:rPr>
-              <a:t>|</a:t>
-            </a:r>
-            <a:r>
-              <a:rPr lang="en-US" sz="1100" dirty="0">
-                <a:solidFill>
-                  <a:schemeClr val="tx1"/>
-                </a:solidFill>
-              </a:rPr>
-              <a:t>’ or </a:t>
-            </a:r>
-            <a:r>
-              <a:rPr lang="en-US" sz="1100" b="1" dirty="0">
-                <a:solidFill>
-                  <a:schemeClr val="tx1"/>
-                </a:solidFill>
-              </a:rPr>
-              <a:t>TAB</a:t>
-            </a:r>
-            <a:r>
-              <a:rPr lang="en-US" sz="1100" dirty="0">
-                <a:solidFill>
-                  <a:schemeClr val="tx1"/>
-                </a:solidFill>
-              </a:rPr>
-              <a:t> as the separator</a:t>
-            </a:r>
-            <a:endParaRPr lang="en-US" sz="1100" dirty="0">
+            <a:endParaRPr lang="en-SG">
               <a:solidFill>
-                <a:schemeClr val="tx1">
-                  <a:lumMod val="50000"/>
-                  <a:lumOff val="50000"/>
-                </a:schemeClr>
+                <a:schemeClr val="tx1"/>
               </a:solidFill>
             </a:endParaRPr>
           </a:p>
@@ -4185,112 +4665,22 @@
       </p:sp>
       <p:sp>
         <p:nvSpPr>
-          <p:cNvPr id="40" name="Up Arrow 28"/>
+          <p:cNvPr id="9" name="Rectangle 8"/>
           <p:cNvSpPr/>
           <p:nvPr/>
         </p:nvSpPr>
         <p:spPr>
           <a:xfrm>
-            <a:off x="3200400" y="2229644"/>
-            <a:ext cx="4038600" cy="450850"/>
+            <a:off x="7520781" y="1765664"/>
+            <a:ext cx="76200" cy="142875"/>
           </a:xfrm>
-          <a:custGeom>
+          <a:prstGeom prst="rect">
             <a:avLst/>
-            <a:gdLst/>
-            <a:ahLst/>
-            <a:cxnLst/>
-            <a:rect l="l" t="t" r="r" b="b"/>
-            <a:pathLst>
-              <a:path w="4876800" h="450850">
-                <a:moveTo>
-                  <a:pt x="1257299" y="0"/>
-                </a:moveTo>
-                <a:lnTo>
-                  <a:pt x="1371599" y="76200"/>
-                </a:lnTo>
-                <a:lnTo>
-                  <a:pt x="1314449" y="76200"/>
-                </a:lnTo>
-                <a:lnTo>
-                  <a:pt x="1314449" y="146050"/>
-                </a:lnTo>
-                <a:lnTo>
-                  <a:pt x="3632199" y="146050"/>
-                </a:lnTo>
-                <a:lnTo>
-                  <a:pt x="3632199" y="76200"/>
-                </a:lnTo>
-                <a:lnTo>
-                  <a:pt x="3575049" y="76200"/>
-                </a:lnTo>
-                <a:lnTo>
-                  <a:pt x="3689349" y="0"/>
-                </a:lnTo>
-                <a:lnTo>
-                  <a:pt x="3803649" y="76200"/>
-                </a:lnTo>
-                <a:lnTo>
-                  <a:pt x="3746499" y="76200"/>
-                </a:lnTo>
-                <a:lnTo>
-                  <a:pt x="3746499" y="146050"/>
-                </a:lnTo>
-                <a:lnTo>
-                  <a:pt x="4825999" y="146050"/>
-                </a:lnTo>
-                <a:cubicBezTo>
-                  <a:pt x="4854056" y="146050"/>
-                  <a:pt x="4876800" y="168794"/>
-                  <a:pt x="4876800" y="196851"/>
-                </a:cubicBezTo>
-                <a:lnTo>
-                  <a:pt x="4876800" y="400049"/>
-                </a:lnTo>
-                <a:cubicBezTo>
-                  <a:pt x="4876800" y="428106"/>
-                  <a:pt x="4854056" y="450850"/>
-                  <a:pt x="4825999" y="450850"/>
-                </a:cubicBezTo>
-                <a:lnTo>
-                  <a:pt x="50801" y="450850"/>
-                </a:lnTo>
-                <a:cubicBezTo>
-                  <a:pt x="22744" y="450850"/>
-                  <a:pt x="0" y="428106"/>
-                  <a:pt x="0" y="400049"/>
-                </a:cubicBezTo>
-                <a:lnTo>
-                  <a:pt x="0" y="196851"/>
-                </a:lnTo>
-                <a:cubicBezTo>
-                  <a:pt x="0" y="168794"/>
-                  <a:pt x="22744" y="146050"/>
-                  <a:pt x="50801" y="146050"/>
-                </a:cubicBezTo>
-                <a:lnTo>
-                  <a:pt x="1200149" y="146050"/>
-                </a:lnTo>
-                <a:lnTo>
-                  <a:pt x="1200149" y="76200"/>
-                </a:lnTo>
-                <a:lnTo>
-                  <a:pt x="1142999" y="76200"/>
-                </a:lnTo>
-                <a:close/>
-              </a:path>
-            </a:pathLst>
-          </a:custGeom>
-          <a:solidFill>
-            <a:srgbClr val="FFFFDD"/>
-          </a:solidFill>
-          <a:ln w="9525">
-            <a:solidFill>
-              <a:schemeClr val="bg1">
-                <a:lumMod val="50000"/>
-              </a:schemeClr>
-            </a:solidFill>
+          </a:prstGeom>
+          <a:noFill/>
+          <a:ln>
+            <a:noFill/>
           </a:ln>
-          <a:effectLst/>
         </p:spPr>
         <p:style>
           <a:lnRef idx="2">
@@ -4309,62 +4699,886 @@
           </a:fontRef>
         </p:style>
         <p:txBody>
-          <a:bodyPr wrap="square" lIns="91429" tIns="45715" rIns="91429" bIns="45715" rtlCol="0" anchor="b" anchorCtr="0">
-            <a:noAutofit/>
-          </a:bodyPr>
+          <a:bodyPr rtlCol="0" anchor="ctr"/>
           <a:lstStyle/>
           <a:p>
             <a:pPr algn="ctr"/>
-            <a:r>
-              <a:rPr lang="en-US" sz="1100" b="1" dirty="0">
-                <a:solidFill>
-                  <a:schemeClr val="tx1"/>
-                </a:solidFill>
-              </a:rPr>
-              <a:t>Column order: </a:t>
-            </a:r>
-            <a:r>
-              <a:rPr lang="en-US" sz="1100" dirty="0">
-                <a:solidFill>
-                  <a:schemeClr val="tx1"/>
-                </a:solidFill>
-              </a:rPr>
-              <a:t>Team id, Student name, Email, </a:t>
-            </a:r>
-            <a:r>
-              <a:rPr lang="en-US" sz="1100" dirty="0">
-                <a:solidFill>
-                  <a:schemeClr val="tx1">
-                    <a:lumMod val="50000"/>
-                    <a:lumOff val="50000"/>
-                  </a:schemeClr>
-                </a:solidFill>
-              </a:rPr>
-              <a:t>Comments (optional)</a:t>
-            </a:r>
-          </a:p>
-        </p:txBody>
-      </p:sp>
-      <p:sp>
-        <p:nvSpPr>
-          <p:cNvPr id="2" name="Rectangle 1"/>
+            <a:endParaRPr lang="en-SG"/>
+          </a:p>
+        </p:txBody>
+      </p:sp>
+    </p:spTree>
+  </p:cSld>
+  <p:clrMapOvr>
+    <a:masterClrMapping/>
+  </p:clrMapOvr>
+  <mc:AlternateContent xmlns:mc="http://schemas.openxmlformats.org/markup-compatibility/2006" xmlns:p14="http://schemas.microsoft.com/office/powerpoint/2010/main">
+    <mc:Choice Requires="p14">
+      <p:transition spd="slow" p14:dur="2000" advTm="2000"/>
+    </mc:Choice>
+    <mc:Fallback xmlns="">
+      <p:transition spd="slow" advTm="2000"/>
+    </mc:Fallback>
+  </mc:AlternateContent>
+  <p:timing>
+    <p:tnLst>
+      <p:par>
+        <p:cTn id="1" dur="indefinite" restart="never" nodeType="tmRoot">
+          <p:childTnLst>
+            <p:seq concurrent="1" nextAc="seek">
+              <p:cTn id="2" dur="indefinite" nodeType="mainSeq">
+                <p:childTnLst>
+                  <p:par>
+                    <p:cTn id="3" fill="hold">
+                      <p:stCondLst>
+                        <p:cond delay="indefinite"/>
+                        <p:cond evt="onBegin" delay="0">
+                          <p:tn val="2"/>
+                        </p:cond>
+                      </p:stCondLst>
+                      <p:childTnLst>
+                        <p:par>
+                          <p:cTn id="4" fill="hold">
+                            <p:stCondLst>
+                              <p:cond delay="0"/>
+                            </p:stCondLst>
+                            <p:childTnLst>
+                              <p:par>
+                                <p:cTn id="5" presetID="10" presetClass="entr" presetSubtype="0" fill="hold" nodeType="withEffect">
+                                  <p:stCondLst>
+                                    <p:cond delay="0"/>
+                                  </p:stCondLst>
+                                  <p:childTnLst>
+                                    <p:set>
+                                      <p:cBhvr>
+                                        <p:cTn id="6" dur="1" fill="hold">
+                                          <p:stCondLst>
+                                            <p:cond delay="0"/>
+                                          </p:stCondLst>
+                                        </p:cTn>
+                                        <p:tgtEl>
+                                          <p:spTgt spid="96"/>
+                                        </p:tgtEl>
+                                        <p:attrNameLst>
+                                          <p:attrName>style.visibility</p:attrName>
+                                        </p:attrNameLst>
+                                      </p:cBhvr>
+                                      <p:to>
+                                        <p:strVal val="visible"/>
+                                      </p:to>
+                                    </p:set>
+                                    <p:animEffect transition="in" filter="fade">
+                                      <p:cBhvr>
+                                        <p:cTn id="7" dur="100"/>
+                                        <p:tgtEl>
+                                          <p:spTgt spid="96"/>
+                                        </p:tgtEl>
+                                      </p:cBhvr>
+                                    </p:animEffect>
+                                  </p:childTnLst>
+                                </p:cTn>
+                              </p:par>
+                            </p:childTnLst>
+                          </p:cTn>
+                        </p:par>
+                        <p:par>
+                          <p:cTn id="8" fill="hold">
+                            <p:stCondLst>
+                              <p:cond delay="100"/>
+                            </p:stCondLst>
+                            <p:childTnLst>
+                              <p:par>
+                                <p:cTn id="9" presetID="10" presetClass="entr" presetSubtype="0" fill="hold" nodeType="afterEffect">
+                                  <p:stCondLst>
+                                    <p:cond delay="500"/>
+                                  </p:stCondLst>
+                                  <p:childTnLst>
+                                    <p:set>
+                                      <p:cBhvr>
+                                        <p:cTn id="10" dur="1" fill="hold">
+                                          <p:stCondLst>
+                                            <p:cond delay="0"/>
+                                          </p:stCondLst>
+                                        </p:cTn>
+                                        <p:tgtEl>
+                                          <p:spTgt spid="97"/>
+                                        </p:tgtEl>
+                                        <p:attrNameLst>
+                                          <p:attrName>style.visibility</p:attrName>
+                                        </p:attrNameLst>
+                                      </p:cBhvr>
+                                      <p:to>
+                                        <p:strVal val="visible"/>
+                                      </p:to>
+                                    </p:set>
+                                    <p:animEffect transition="in" filter="fade">
+                                      <p:cBhvr>
+                                        <p:cTn id="11" dur="100"/>
+                                        <p:tgtEl>
+                                          <p:spTgt spid="97"/>
+                                        </p:tgtEl>
+                                      </p:cBhvr>
+                                    </p:animEffect>
+                                  </p:childTnLst>
+                                </p:cTn>
+                              </p:par>
+                            </p:childTnLst>
+                          </p:cTn>
+                        </p:par>
+                        <p:par>
+                          <p:cTn id="12" fill="hold">
+                            <p:stCondLst>
+                              <p:cond delay="700"/>
+                            </p:stCondLst>
+                            <p:childTnLst>
+                              <p:par>
+                                <p:cTn id="13" presetID="10" presetClass="entr" presetSubtype="0" fill="hold" nodeType="afterEffect">
+                                  <p:stCondLst>
+                                    <p:cond delay="0"/>
+                                  </p:stCondLst>
+                                  <p:childTnLst>
+                                    <p:set>
+                                      <p:cBhvr>
+                                        <p:cTn id="14" dur="1" fill="hold">
+                                          <p:stCondLst>
+                                            <p:cond delay="0"/>
+                                          </p:stCondLst>
+                                        </p:cTn>
+                                        <p:tgtEl>
+                                          <p:spTgt spid="98"/>
+                                        </p:tgtEl>
+                                        <p:attrNameLst>
+                                          <p:attrName>style.visibility</p:attrName>
+                                        </p:attrNameLst>
+                                      </p:cBhvr>
+                                      <p:to>
+                                        <p:strVal val="visible"/>
+                                      </p:to>
+                                    </p:set>
+                                    <p:animEffect transition="in" filter="fade">
+                                      <p:cBhvr>
+                                        <p:cTn id="15" dur="100"/>
+                                        <p:tgtEl>
+                                          <p:spTgt spid="98"/>
+                                        </p:tgtEl>
+                                      </p:cBhvr>
+                                    </p:animEffect>
+                                  </p:childTnLst>
+                                </p:cTn>
+                              </p:par>
+                            </p:childTnLst>
+                          </p:cTn>
+                        </p:par>
+                        <p:par>
+                          <p:cTn id="16" fill="hold">
+                            <p:stCondLst>
+                              <p:cond delay="800"/>
+                            </p:stCondLst>
+                            <p:childTnLst>
+                              <p:par>
+                                <p:cTn id="17" presetID="10" presetClass="entr" presetSubtype="0" fill="hold" nodeType="afterEffect">
+                                  <p:stCondLst>
+                                    <p:cond delay="0"/>
+                                  </p:stCondLst>
+                                  <p:childTnLst>
+                                    <p:set>
+                                      <p:cBhvr>
+                                        <p:cTn id="18" dur="1" fill="hold">
+                                          <p:stCondLst>
+                                            <p:cond delay="0"/>
+                                          </p:stCondLst>
+                                        </p:cTn>
+                                        <p:tgtEl>
+                                          <p:spTgt spid="99"/>
+                                        </p:tgtEl>
+                                        <p:attrNameLst>
+                                          <p:attrName>style.visibility</p:attrName>
+                                        </p:attrNameLst>
+                                      </p:cBhvr>
+                                      <p:to>
+                                        <p:strVal val="visible"/>
+                                      </p:to>
+                                    </p:set>
+                                    <p:animEffect transition="in" filter="fade">
+                                      <p:cBhvr>
+                                        <p:cTn id="19" dur="100"/>
+                                        <p:tgtEl>
+                                          <p:spTgt spid="99"/>
+                                        </p:tgtEl>
+                                      </p:cBhvr>
+                                    </p:animEffect>
+                                  </p:childTnLst>
+                                </p:cTn>
+                              </p:par>
+                            </p:childTnLst>
+                          </p:cTn>
+                        </p:par>
+                        <p:par>
+                          <p:cTn id="20" fill="hold">
+                            <p:stCondLst>
+                              <p:cond delay="900"/>
+                            </p:stCondLst>
+                            <p:childTnLst>
+                              <p:par>
+                                <p:cTn id="21" presetID="10" presetClass="entr" presetSubtype="0" fill="hold" nodeType="afterEffect">
+                                  <p:stCondLst>
+                                    <p:cond delay="0"/>
+                                  </p:stCondLst>
+                                  <p:childTnLst>
+                                    <p:set>
+                                      <p:cBhvr>
+                                        <p:cTn id="22" dur="1" fill="hold">
+                                          <p:stCondLst>
+                                            <p:cond delay="0"/>
+                                          </p:stCondLst>
+                                        </p:cTn>
+                                        <p:tgtEl>
+                                          <p:spTgt spid="100"/>
+                                        </p:tgtEl>
+                                        <p:attrNameLst>
+                                          <p:attrName>style.visibility</p:attrName>
+                                        </p:attrNameLst>
+                                      </p:cBhvr>
+                                      <p:to>
+                                        <p:strVal val="visible"/>
+                                      </p:to>
+                                    </p:set>
+                                    <p:animEffect transition="in" filter="fade">
+                                      <p:cBhvr>
+                                        <p:cTn id="23" dur="100"/>
+                                        <p:tgtEl>
+                                          <p:spTgt spid="100"/>
+                                        </p:tgtEl>
+                                      </p:cBhvr>
+                                    </p:animEffect>
+                                  </p:childTnLst>
+                                </p:cTn>
+                              </p:par>
+                            </p:childTnLst>
+                          </p:cTn>
+                        </p:par>
+                        <p:par>
+                          <p:cTn id="24" fill="hold">
+                            <p:stCondLst>
+                              <p:cond delay="1000"/>
+                            </p:stCondLst>
+                            <p:childTnLst>
+                              <p:par>
+                                <p:cTn id="25" presetID="3" presetClass="emph" presetSubtype="1" grpId="0" nodeType="afterEffect">
+                                  <p:stCondLst>
+                                    <p:cond delay="500"/>
+                                  </p:stCondLst>
+                                  <p:childTnLst>
+                                    <p:set>
+                                      <p:cBhvr override="childStyle">
+                                        <p:cTn id="26" dur="indefinite"/>
+                                        <p:tgtEl>
+                                          <p:spTgt spid="92"/>
+                                        </p:tgtEl>
+                                        <p:attrNameLst>
+                                          <p:attrName>style.color</p:attrName>
+                                        </p:attrNameLst>
+                                      </p:cBhvr>
+                                      <p:to>
+                                        <p:clrVal>
+                                          <a:srgbClr val="7F7F7F"/>
+                                        </p:clrVal>
+                                      </p:to>
+                                    </p:set>
+                                  </p:childTnLst>
+                                </p:cTn>
+                              </p:par>
+                            </p:childTnLst>
+                          </p:cTn>
+                        </p:par>
+                        <p:par>
+                          <p:cTn id="27" fill="hold">
+                            <p:stCondLst>
+                              <p:cond delay="1500"/>
+                            </p:stCondLst>
+                            <p:childTnLst>
+                              <p:par>
+                                <p:cTn id="28" presetID="10" presetClass="entr" presetSubtype="0" fill="hold" nodeType="afterEffect">
+                                  <p:stCondLst>
+                                    <p:cond delay="0"/>
+                                  </p:stCondLst>
+                                  <p:childTnLst>
+                                    <p:set>
+                                      <p:cBhvr>
+                                        <p:cTn id="29" dur="1" fill="hold">
+                                          <p:stCondLst>
+                                            <p:cond delay="0"/>
+                                          </p:stCondLst>
+                                        </p:cTn>
+                                        <p:tgtEl>
+                                          <p:spTgt spid="102"/>
+                                        </p:tgtEl>
+                                        <p:attrNameLst>
+                                          <p:attrName>style.visibility</p:attrName>
+                                        </p:attrNameLst>
+                                      </p:cBhvr>
+                                      <p:to>
+                                        <p:strVal val="visible"/>
+                                      </p:to>
+                                    </p:set>
+                                    <p:animEffect transition="in" filter="fade">
+                                      <p:cBhvr>
+                                        <p:cTn id="30" dur="100"/>
+                                        <p:tgtEl>
+                                          <p:spTgt spid="102"/>
+                                        </p:tgtEl>
+                                      </p:cBhvr>
+                                    </p:animEffect>
+                                  </p:childTnLst>
+                                </p:cTn>
+                              </p:par>
+                            </p:childTnLst>
+                          </p:cTn>
+                        </p:par>
+                        <p:par>
+                          <p:cTn id="31" fill="hold">
+                            <p:stCondLst>
+                              <p:cond delay="1600"/>
+                            </p:stCondLst>
+                            <p:childTnLst>
+                              <p:par>
+                                <p:cTn id="32" presetID="3" presetClass="emph" presetSubtype="1" grpId="0" nodeType="afterEffect">
+                                  <p:stCondLst>
+                                    <p:cond delay="250"/>
+                                  </p:stCondLst>
+                                  <p:childTnLst>
+                                    <p:set>
+                                      <p:cBhvr override="childStyle">
+                                        <p:cTn id="33" dur="indefinite"/>
+                                        <p:tgtEl>
+                                          <p:spTgt spid="93"/>
+                                        </p:tgtEl>
+                                        <p:attrNameLst>
+                                          <p:attrName>style.color</p:attrName>
+                                        </p:attrNameLst>
+                                      </p:cBhvr>
+                                      <p:to>
+                                        <p:clrVal>
+                                          <a:srgbClr val="0070C0"/>
+                                        </p:clrVal>
+                                      </p:to>
+                                    </p:set>
+                                  </p:childTnLst>
+                                </p:cTn>
+                              </p:par>
+                            </p:childTnLst>
+                          </p:cTn>
+                        </p:par>
+                        <p:par>
+                          <p:cTn id="34" fill="hold">
+                            <p:stCondLst>
+                              <p:cond delay="1850"/>
+                            </p:stCondLst>
+                            <p:childTnLst>
+                              <p:par>
+                                <p:cTn id="35" presetID="1" presetClass="exit" presetSubtype="0" fill="hold" grpId="0" nodeType="afterEffect">
+                                  <p:stCondLst>
+                                    <p:cond delay="750"/>
+                                  </p:stCondLst>
+                                  <p:childTnLst>
+                                    <p:set>
+                                      <p:cBhvr>
+                                        <p:cTn id="36" dur="1" fill="hold">
+                                          <p:stCondLst>
+                                            <p:cond delay="0"/>
+                                          </p:stCondLst>
+                                        </p:cTn>
+                                        <p:tgtEl>
+                                          <p:spTgt spid="101"/>
+                                        </p:tgtEl>
+                                        <p:attrNameLst>
+                                          <p:attrName>style.visibility</p:attrName>
+                                        </p:attrNameLst>
+                                      </p:cBhvr>
+                                      <p:to>
+                                        <p:strVal val="hidden"/>
+                                      </p:to>
+                                    </p:set>
+                                  </p:childTnLst>
+                                </p:cTn>
+                              </p:par>
+                            </p:childTnLst>
+                          </p:cTn>
+                        </p:par>
+                        <p:par>
+                          <p:cTn id="37" fill="hold">
+                            <p:stCondLst>
+                              <p:cond delay="2600"/>
+                            </p:stCondLst>
+                            <p:childTnLst>
+                              <p:par>
+                                <p:cTn id="38" presetID="10" presetClass="entr" presetSubtype="0" fill="hold" grpId="0" nodeType="afterEffect">
+                                  <p:stCondLst>
+                                    <p:cond delay="0"/>
+                                  </p:stCondLst>
+                                  <p:childTnLst>
+                                    <p:set>
+                                      <p:cBhvr>
+                                        <p:cTn id="39" dur="1" fill="hold">
+                                          <p:stCondLst>
+                                            <p:cond delay="0"/>
+                                          </p:stCondLst>
+                                        </p:cTn>
+                                        <p:tgtEl>
+                                          <p:spTgt spid="95"/>
+                                        </p:tgtEl>
+                                        <p:attrNameLst>
+                                          <p:attrName>style.visibility</p:attrName>
+                                        </p:attrNameLst>
+                                      </p:cBhvr>
+                                      <p:to>
+                                        <p:strVal val="visible"/>
+                                      </p:to>
+                                    </p:set>
+                                    <p:animEffect transition="in" filter="fade">
+                                      <p:cBhvr>
+                                        <p:cTn id="40" dur="250"/>
+                                        <p:tgtEl>
+                                          <p:spTgt spid="95"/>
+                                        </p:tgtEl>
+                                      </p:cBhvr>
+                                    </p:animEffect>
+                                  </p:childTnLst>
+                                </p:cTn>
+                              </p:par>
+                            </p:childTnLst>
+                          </p:cTn>
+                        </p:par>
+                        <p:par>
+                          <p:cTn id="41" fill="hold">
+                            <p:stCondLst>
+                              <p:cond delay="2850"/>
+                            </p:stCondLst>
+                            <p:childTnLst>
+                              <p:par>
+                                <p:cTn id="42" presetID="10" presetClass="entr" presetSubtype="0" fill="hold" grpId="0" nodeType="afterEffect">
+                                  <p:stCondLst>
+                                    <p:cond delay="0"/>
+                                  </p:stCondLst>
+                                  <p:childTnLst>
+                                    <p:set>
+                                      <p:cBhvr>
+                                        <p:cTn id="43" dur="1" fill="hold">
+                                          <p:stCondLst>
+                                            <p:cond delay="0"/>
+                                          </p:stCondLst>
+                                        </p:cTn>
+                                        <p:tgtEl>
+                                          <p:spTgt spid="103"/>
+                                        </p:tgtEl>
+                                        <p:attrNameLst>
+                                          <p:attrName>style.visibility</p:attrName>
+                                        </p:attrNameLst>
+                                      </p:cBhvr>
+                                      <p:to>
+                                        <p:strVal val="visible"/>
+                                      </p:to>
+                                    </p:set>
+                                    <p:animEffect transition="in" filter="fade">
+                                      <p:cBhvr>
+                                        <p:cTn id="44" dur="250"/>
+                                        <p:tgtEl>
+                                          <p:spTgt spid="103"/>
+                                        </p:tgtEl>
+                                      </p:cBhvr>
+                                    </p:animEffect>
+                                  </p:childTnLst>
+                                </p:cTn>
+                              </p:par>
+                              <p:par>
+                                <p:cTn id="45" presetID="10" presetClass="entr" presetSubtype="0" fill="hold" nodeType="withEffect">
+                                  <p:stCondLst>
+                                    <p:cond delay="0"/>
+                                  </p:stCondLst>
+                                  <p:childTnLst>
+                                    <p:set>
+                                      <p:cBhvr>
+                                        <p:cTn id="46" dur="1" fill="hold">
+                                          <p:stCondLst>
+                                            <p:cond delay="0"/>
+                                          </p:stCondLst>
+                                        </p:cTn>
+                                        <p:tgtEl>
+                                          <p:spTgt spid="104"/>
+                                        </p:tgtEl>
+                                        <p:attrNameLst>
+                                          <p:attrName>style.visibility</p:attrName>
+                                        </p:attrNameLst>
+                                      </p:cBhvr>
+                                      <p:to>
+                                        <p:strVal val="visible"/>
+                                      </p:to>
+                                    </p:set>
+                                    <p:animEffect transition="in" filter="fade">
+                                      <p:cBhvr>
+                                        <p:cTn id="47" dur="500"/>
+                                        <p:tgtEl>
+                                          <p:spTgt spid="104"/>
+                                        </p:tgtEl>
+                                      </p:cBhvr>
+                                    </p:animEffect>
+                                  </p:childTnLst>
+                                </p:cTn>
+                              </p:par>
+                            </p:childTnLst>
+                          </p:cTn>
+                        </p:par>
+                        <p:par>
+                          <p:cTn id="48" fill="hold">
+                            <p:stCondLst>
+                              <p:cond delay="3350"/>
+                            </p:stCondLst>
+                            <p:childTnLst>
+                              <p:par>
+                                <p:cTn id="49" presetID="10" presetClass="entr" presetSubtype="0" fill="hold" grpId="1" nodeType="afterEffect">
+                                  <p:stCondLst>
+                                    <p:cond delay="0"/>
+                                  </p:stCondLst>
+                                  <p:childTnLst>
+                                    <p:set>
+                                      <p:cBhvr>
+                                        <p:cTn id="50" dur="1" fill="hold">
+                                          <p:stCondLst>
+                                            <p:cond delay="0"/>
+                                          </p:stCondLst>
+                                        </p:cTn>
+                                        <p:tgtEl>
+                                          <p:spTgt spid="105"/>
+                                        </p:tgtEl>
+                                        <p:attrNameLst>
+                                          <p:attrName>style.visibility</p:attrName>
+                                        </p:attrNameLst>
+                                      </p:cBhvr>
+                                      <p:to>
+                                        <p:strVal val="visible"/>
+                                      </p:to>
+                                    </p:set>
+                                    <p:animEffect transition="in" filter="fade">
+                                      <p:cBhvr>
+                                        <p:cTn id="51" dur="250"/>
+                                        <p:tgtEl>
+                                          <p:spTgt spid="105"/>
+                                        </p:tgtEl>
+                                      </p:cBhvr>
+                                    </p:animEffect>
+                                  </p:childTnLst>
+                                </p:cTn>
+                              </p:par>
+                            </p:childTnLst>
+                          </p:cTn>
+                        </p:par>
+                        <p:par>
+                          <p:cTn id="52" fill="hold">
+                            <p:stCondLst>
+                              <p:cond delay="3600"/>
+                            </p:stCondLst>
+                            <p:childTnLst>
+                              <p:par>
+                                <p:cTn id="53" presetID="42" presetClass="path" presetSubtype="0" accel="50000" decel="50000" fill="hold" grpId="0" nodeType="afterEffect">
+                                  <p:stCondLst>
+                                    <p:cond delay="0"/>
+                                  </p:stCondLst>
+                                  <p:childTnLst>
+                                    <p:animMotion origin="layout" path="M -1.38889E-6 -1.17532E-6 L -0.00712 -0.10774 " pathEditMode="relative" rAng="0" ptsTypes="AA">
+                                      <p:cBhvr>
+                                        <p:cTn id="54" dur="250" fill="hold"/>
+                                        <p:tgtEl>
+                                          <p:spTgt spid="105"/>
+                                        </p:tgtEl>
+                                        <p:attrNameLst>
+                                          <p:attrName>ppt_x</p:attrName>
+                                          <p:attrName>ppt_y</p:attrName>
+                                        </p:attrNameLst>
+                                      </p:cBhvr>
+                                      <p:rCtr x="-365" y="-5387"/>
+                                    </p:animMotion>
+                                  </p:childTnLst>
+                                </p:cTn>
+                              </p:par>
+                            </p:childTnLst>
+                          </p:cTn>
+                        </p:par>
+                        <p:par>
+                          <p:cTn id="55" fill="hold">
+                            <p:stCondLst>
+                              <p:cond delay="3850"/>
+                            </p:stCondLst>
+                            <p:childTnLst>
+                              <p:par>
+                                <p:cTn id="56" presetID="53" presetClass="entr" presetSubtype="16" fill="remove" grpId="0" nodeType="afterEffect">
+                                  <p:stCondLst>
+                                    <p:cond delay="0"/>
+                                  </p:stCondLst>
+                                  <p:childTnLst>
+                                    <p:set>
+                                      <p:cBhvr>
+                                        <p:cTn id="57" dur="1" fill="hold">
+                                          <p:stCondLst>
+                                            <p:cond delay="0"/>
+                                          </p:stCondLst>
+                                        </p:cTn>
+                                        <p:tgtEl>
+                                          <p:spTgt spid="106"/>
+                                        </p:tgtEl>
+                                        <p:attrNameLst>
+                                          <p:attrName>style.visibility</p:attrName>
+                                        </p:attrNameLst>
+                                      </p:cBhvr>
+                                      <p:to>
+                                        <p:strVal val="visible"/>
+                                      </p:to>
+                                    </p:set>
+                                    <p:anim calcmode="lin" valueType="num">
+                                      <p:cBhvr>
+                                        <p:cTn id="58" dur="200" fill="hold"/>
+                                        <p:tgtEl>
+                                          <p:spTgt spid="106"/>
+                                        </p:tgtEl>
+                                        <p:attrNameLst>
+                                          <p:attrName>ppt_w</p:attrName>
+                                        </p:attrNameLst>
+                                      </p:cBhvr>
+                                      <p:tavLst>
+                                        <p:tav tm="0">
+                                          <p:val>
+                                            <p:fltVal val="0"/>
+                                          </p:val>
+                                        </p:tav>
+                                        <p:tav tm="100000">
+                                          <p:val>
+                                            <p:strVal val="#ppt_w"/>
+                                          </p:val>
+                                        </p:tav>
+                                      </p:tavLst>
+                                    </p:anim>
+                                    <p:anim calcmode="lin" valueType="num">
+                                      <p:cBhvr>
+                                        <p:cTn id="59" dur="200" fill="hold"/>
+                                        <p:tgtEl>
+                                          <p:spTgt spid="106"/>
+                                        </p:tgtEl>
+                                        <p:attrNameLst>
+                                          <p:attrName>ppt_h</p:attrName>
+                                        </p:attrNameLst>
+                                      </p:cBhvr>
+                                      <p:tavLst>
+                                        <p:tav tm="0">
+                                          <p:val>
+                                            <p:fltVal val="0"/>
+                                          </p:val>
+                                        </p:tav>
+                                        <p:tav tm="100000">
+                                          <p:val>
+                                            <p:strVal val="#ppt_h"/>
+                                          </p:val>
+                                        </p:tav>
+                                      </p:tavLst>
+                                    </p:anim>
+                                    <p:animEffect transition="in" filter="fade">
+                                      <p:cBhvr>
+                                        <p:cTn id="60" dur="200"/>
+                                        <p:tgtEl>
+                                          <p:spTgt spid="106"/>
+                                        </p:tgtEl>
+                                      </p:cBhvr>
+                                    </p:animEffect>
+                                  </p:childTnLst>
+                                  <p:subTnLst>
+                                    <p:audio>
+                                      <p:cMediaNode vol="100000">
+                                        <p:cTn display="0" masterRel="sameClick">
+                                          <p:stCondLst>
+                                            <p:cond evt="begin" delay="0">
+                                              <p:tn val="56"/>
+                                            </p:cond>
+                                          </p:stCondLst>
+                                          <p:endCondLst>
+                                            <p:cond evt="onStopAudio" delay="0">
+                                              <p:tgtEl>
+                                                <p:sldTgt/>
+                                              </p:tgtEl>
+                                            </p:cond>
+                                          </p:endCondLst>
+                                        </p:cTn>
+                                        <p:tgtEl>
+                                          <p:sndTgt r:embed="rId2" name="click.wav"/>
+                                        </p:tgtEl>
+                                      </p:cMediaNode>
+                                    </p:audio>
+                                  </p:subTnLst>
+                                </p:cTn>
+                              </p:par>
+                            </p:childTnLst>
+                          </p:cTn>
+                        </p:par>
+                        <p:par>
+                          <p:cTn id="61" fill="hold">
+                            <p:stCondLst>
+                              <p:cond delay="4050"/>
+                            </p:stCondLst>
+                            <p:childTnLst>
+                              <p:par>
+                                <p:cTn id="62" presetID="10" presetClass="exit" presetSubtype="0" fill="hold" grpId="1" nodeType="afterEffect">
+                                  <p:stCondLst>
+                                    <p:cond delay="0"/>
+                                  </p:stCondLst>
+                                  <p:childTnLst>
+                                    <p:animEffect transition="out" filter="fade">
+                                      <p:cBhvr>
+                                        <p:cTn id="63" dur="700"/>
+                                        <p:tgtEl>
+                                          <p:spTgt spid="106"/>
+                                        </p:tgtEl>
+                                      </p:cBhvr>
+                                    </p:animEffect>
+                                    <p:set>
+                                      <p:cBhvr>
+                                        <p:cTn id="64" dur="1" fill="hold">
+                                          <p:stCondLst>
+                                            <p:cond delay="699"/>
+                                          </p:stCondLst>
+                                        </p:cTn>
+                                        <p:tgtEl>
+                                          <p:spTgt spid="106"/>
+                                        </p:tgtEl>
+                                        <p:attrNameLst>
+                                          <p:attrName>style.visibility</p:attrName>
+                                        </p:attrNameLst>
+                                      </p:cBhvr>
+                                      <p:to>
+                                        <p:strVal val="hidden"/>
+                                      </p:to>
+                                    </p:set>
+                                  </p:childTnLst>
+                                </p:cTn>
+                              </p:par>
+                            </p:childTnLst>
+                          </p:cTn>
+                        </p:par>
+                        <p:par>
+                          <p:cTn id="65" fill="hold">
+                            <p:stCondLst>
+                              <p:cond delay="4750"/>
+                            </p:stCondLst>
+                            <p:childTnLst>
+                              <p:par>
+                                <p:cTn id="66" presetID="1" presetClass="entr" presetSubtype="0" fill="hold" grpId="0" nodeType="afterEffect" nodePh="1">
+                                  <p:stCondLst>
+                                    <p:cond delay="1000"/>
+                                  </p:stCondLst>
+                                  <p:endCondLst>
+                                    <p:cond evt="begin" delay="0">
+                                      <p:tn val="66"/>
+                                    </p:cond>
+                                  </p:endCondLst>
+                                  <p:childTnLst>
+                                    <p:set>
+                                      <p:cBhvr>
+                                        <p:cTn id="67" dur="1" fill="hold">
+                                          <p:stCondLst>
+                                            <p:cond delay="0"/>
+                                          </p:stCondLst>
+                                        </p:cTn>
+                                        <p:tgtEl>
+                                          <p:spTgt spid="9"/>
+                                        </p:tgtEl>
+                                        <p:attrNameLst>
+                                          <p:attrName>style.visibility</p:attrName>
+                                        </p:attrNameLst>
+                                      </p:cBhvr>
+                                      <p:to>
+                                        <p:strVal val="visible"/>
+                                      </p:to>
+                                    </p:set>
+                                  </p:childTnLst>
+                                </p:cTn>
+                              </p:par>
+                            </p:childTnLst>
+                          </p:cTn>
+                        </p:par>
+                      </p:childTnLst>
+                    </p:cTn>
+                  </p:par>
+                </p:childTnLst>
+              </p:cTn>
+              <p:prevCondLst>
+                <p:cond evt="onPrev" delay="0">
+                  <p:tgtEl>
+                    <p:sldTgt/>
+                  </p:tgtEl>
+                </p:cond>
+              </p:prevCondLst>
+              <p:nextCondLst>
+                <p:cond evt="onNext" delay="0">
+                  <p:tgtEl>
+                    <p:sldTgt/>
+                  </p:tgtEl>
+                </p:cond>
+              </p:nextCondLst>
+            </p:seq>
+          </p:childTnLst>
+        </p:cTn>
+      </p:par>
+    </p:tnLst>
+    <p:bldLst>
+      <p:bldP spid="92" grpId="0"/>
+      <p:bldP spid="93" grpId="0"/>
+      <p:bldP spid="95" grpId="0"/>
+      <p:bldP spid="101" grpId="0"/>
+      <p:bldP spid="103" grpId="0" animBg="1"/>
+      <p:bldP spid="105" grpId="0" animBg="1"/>
+      <p:bldP spid="105" grpId="1" animBg="1"/>
+      <p:bldP spid="106" grpId="0" animBg="1"/>
+      <p:bldP spid="106" grpId="1" animBg="1"/>
+      <p:bldP spid="9" grpId="0"/>
+    </p:bldLst>
+  </p:timing>
+</p:sld>
+</file>
+
+<file path=ppt/slides/slide2.xml><?xml version="1.0" encoding="utf-8"?>
+<p:sld xmlns:a="http://schemas.openxmlformats.org/drawingml/2006/main" xmlns:r="http://schemas.openxmlformats.org/officeDocument/2006/relationships" xmlns:p="http://schemas.openxmlformats.org/presentationml/2006/main" show="0">
+  <p:cSld>
+    <p:spTree>
+      <p:nvGrpSpPr>
+        <p:cNvPr id="1" name=""/>
+        <p:cNvGrpSpPr/>
+        <p:nvPr/>
+      </p:nvGrpSpPr>
+      <p:grpSpPr>
+        <a:xfrm>
+          <a:off x="0" y="0"/>
+          <a:ext cx="0" cy="0"/>
+          <a:chOff x="0" y="0"/>
+          <a:chExt cx="0" cy="0"/>
+        </a:xfrm>
+      </p:grpSpPr>
+      <p:sp>
+        <p:nvSpPr>
+          <p:cNvPr id="90" name="Rounded Rectangle 89"/>
           <p:cNvSpPr/>
           <p:nvPr/>
         </p:nvSpPr>
         <p:spPr>
           <a:xfrm>
-            <a:off x="2717053" y="1267619"/>
-            <a:ext cx="2716117" cy="627615"/>
+            <a:off x="60832" y="68263"/>
+            <a:ext cx="8534400" cy="2009717"/>
           </a:xfrm>
-          <a:prstGeom prst="rect">
-            <a:avLst/>
+          <a:prstGeom prst="roundRect">
+            <a:avLst>
+              <a:gd name="adj" fmla="val 7087"/>
+            </a:avLst>
           </a:prstGeom>
           <a:noFill/>
-          <a:ln>
+          <a:ln w="9525">
             <a:solidFill>
-              <a:schemeClr val="accent2">
-                <a:lumMod val="40000"/>
-                <a:lumOff val="60000"/>
+              <a:schemeClr val="bg1">
+                <a:lumMod val="85000"/>
               </a:schemeClr>
             </a:solidFill>
           </a:ln>
@@ -4390,338 +5604,485 @@
           <a:lstStyle/>
           <a:p>
             <a:pPr algn="ctr"/>
-            <a:endParaRPr lang="en-SG"/>
-          </a:p>
-        </p:txBody>
-      </p:sp>
-      <p:sp>
-        <p:nvSpPr>
-          <p:cNvPr id="34" name="Down Arrow 19"/>
+            <a:endParaRPr lang="en-US"/>
+          </a:p>
+        </p:txBody>
+      </p:sp>
+      <p:sp>
+        <p:nvSpPr>
+          <p:cNvPr id="91" name="TextBox 90"/>
+          <p:cNvSpPr txBox="1"/>
+          <p:nvPr/>
+        </p:nvSpPr>
+        <p:spPr>
+          <a:xfrm>
+            <a:off x="326796" y="1346"/>
+            <a:ext cx="869385" cy="169277"/>
+          </a:xfrm>
+          <a:prstGeom prst="rect">
+            <a:avLst/>
+          </a:prstGeom>
+          <a:solidFill>
+            <a:schemeClr val="bg1"/>
+          </a:solidFill>
+        </p:spPr>
+        <p:txBody>
+          <a:bodyPr wrap="square" lIns="0" tIns="0" rIns="0" bIns="0" rtlCol="0">
+            <a:spAutoFit/>
+          </a:bodyPr>
+          <a:lstStyle/>
+          <a:p>
+            <a:r>
+              <a:rPr lang="en-US" sz="1100" dirty="0" smtClean="0">
+                <a:solidFill>
+                  <a:schemeClr val="bg1">
+                    <a:lumMod val="75000"/>
+                  </a:schemeClr>
+                </a:solidFill>
+              </a:rPr>
+              <a:t>[How to enroll]</a:t>
+            </a:r>
+            <a:endParaRPr lang="en-SG" sz="1100" dirty="0">
+              <a:solidFill>
+                <a:schemeClr val="bg1">
+                  <a:lumMod val="75000"/>
+                </a:schemeClr>
+              </a:solidFill>
+            </a:endParaRPr>
+          </a:p>
+        </p:txBody>
+      </p:sp>
+      <p:sp>
+        <p:nvSpPr>
+          <p:cNvPr id="92" name="TextBox 91"/>
+          <p:cNvSpPr txBox="1"/>
+          <p:nvPr/>
+        </p:nvSpPr>
+        <p:spPr>
+          <a:xfrm>
+            <a:off x="388823" y="193675"/>
+            <a:ext cx="2819400" cy="276999"/>
+          </a:xfrm>
+          <a:prstGeom prst="rect">
+            <a:avLst/>
+          </a:prstGeom>
+          <a:noFill/>
+        </p:spPr>
+        <p:txBody>
+          <a:bodyPr wrap="square" rtlCol="0">
+            <a:spAutoFit/>
+          </a:bodyPr>
+          <a:lstStyle>
+            <a:defPPr>
+              <a:defRPr lang="en-US"/>
+            </a:defPPr>
+            <a:lvl1pPr>
+              <a:defRPr sz="1400" b="1">
+                <a:solidFill>
+                  <a:schemeClr val="bg1">
+                    <a:lumMod val="65000"/>
+                  </a:schemeClr>
+                </a:solidFill>
+              </a:defRPr>
+            </a:lvl1pPr>
+          </a:lstStyle>
+          <a:p>
+            <a:r>
+              <a:rPr lang="en-US" sz="1200" b="0" dirty="0">
+                <a:solidFill>
+                  <a:schemeClr val="bg1">
+                    <a:lumMod val="50000"/>
+                  </a:schemeClr>
+                </a:solidFill>
+              </a:rPr>
+              <a:t>1. Copy data from a spreadsheet</a:t>
+            </a:r>
+            <a:endParaRPr lang="en-SG" sz="1200" b="0" dirty="0">
+              <a:solidFill>
+                <a:schemeClr val="bg1">
+                  <a:lumMod val="50000"/>
+                </a:schemeClr>
+              </a:solidFill>
+            </a:endParaRPr>
+          </a:p>
+        </p:txBody>
+      </p:sp>
+      <p:sp>
+        <p:nvSpPr>
+          <p:cNvPr id="93" name="TextBox 92"/>
+          <p:cNvSpPr txBox="1"/>
+          <p:nvPr/>
+        </p:nvSpPr>
+        <p:spPr>
+          <a:xfrm>
+            <a:off x="4323878" y="193675"/>
+            <a:ext cx="4118953" cy="276999"/>
+          </a:xfrm>
+          <a:prstGeom prst="rect">
+            <a:avLst/>
+          </a:prstGeom>
+          <a:noFill/>
+        </p:spPr>
+        <p:txBody>
+          <a:bodyPr wrap="square" rtlCol="0">
+            <a:spAutoFit/>
+          </a:bodyPr>
+          <a:lstStyle>
+            <a:defPPr>
+              <a:defRPr lang="en-US"/>
+            </a:defPPr>
+            <a:lvl1pPr>
+              <a:defRPr sz="1400" b="1">
+                <a:solidFill>
+                  <a:schemeClr val="bg1">
+                    <a:lumMod val="65000"/>
+                  </a:schemeClr>
+                </a:solidFill>
+              </a:defRPr>
+            </a:lvl1pPr>
+          </a:lstStyle>
+          <a:p>
+            <a:r>
+              <a:rPr lang="en-US" sz="1200" b="0" dirty="0" smtClean="0">
+                <a:solidFill>
+                  <a:srgbClr val="7F7F7F"/>
+                </a:solidFill>
+              </a:rPr>
+              <a:t>2. Paste in the text box below and click ‘Enroll students’ button </a:t>
+            </a:r>
+            <a:endParaRPr lang="en-SG" sz="1200" b="0" dirty="0">
+              <a:solidFill>
+                <a:srgbClr val="7F7F7F"/>
+              </a:solidFill>
+            </a:endParaRPr>
+          </a:p>
+        </p:txBody>
+      </p:sp>
+      <p:pic>
+        <p:nvPicPr>
+          <p:cNvPr id="94" name="Picture 4"/>
+          <p:cNvPicPr>
+            <a:picLocks noChangeAspect="1" noChangeArrowheads="1"/>
+          </p:cNvPicPr>
+          <p:nvPr/>
+        </p:nvPicPr>
+        <p:blipFill>
+          <a:blip r:embed="rId2">
+            <a:extLst>
+              <a:ext uri="{BEBA8EAE-BF5A-486C-A8C5-ECC9F3942E4B}">
+                <a14:imgProps xmlns:a14="http://schemas.microsoft.com/office/drawing/2010/main">
+                  <a14:imgLayer r:embed="rId3">
+                    <a14:imgEffect>
+                      <a14:saturation sat="0"/>
+                    </a14:imgEffect>
+                  </a14:imgLayer>
+                </a14:imgProps>
+              </a:ext>
+              <a:ext uri="{28A0092B-C50C-407E-A947-70E740481C1C}">
+                <a14:useLocalDpi xmlns:a14="http://schemas.microsoft.com/office/drawing/2010/main" val="0"/>
+              </a:ext>
+            </a:extLst>
+          </a:blip>
+          <a:srcRect/>
+          <a:stretch>
+            <a:fillRect/>
+          </a:stretch>
+        </p:blipFill>
+        <p:spPr bwMode="auto">
+          <a:xfrm>
+            <a:off x="4251832" y="463948"/>
+            <a:ext cx="4339247" cy="1265255"/>
+          </a:xfrm>
+          <a:prstGeom prst="rect">
+            <a:avLst/>
+          </a:prstGeom>
+          <a:noFill/>
+          <a:ln>
+            <a:noFill/>
+          </a:ln>
+          <a:extLst>
+            <a:ext uri="{909E8E84-426E-40DD-AFC4-6F175D3DCCD1}">
+              <a14:hiddenFill xmlns:a14="http://schemas.microsoft.com/office/drawing/2010/main">
+                <a:solidFill>
+                  <a:schemeClr val="accent1"/>
+                </a:solidFill>
+              </a14:hiddenFill>
+            </a:ext>
+            <a:ext uri="{91240B29-F687-4F45-9708-019B960494DF}">
+              <a14:hiddenLine xmlns:a14="http://schemas.microsoft.com/office/drawing/2010/main" w="9525">
+                <a:solidFill>
+                  <a:schemeClr val="tx1"/>
+                </a:solidFill>
+                <a:miter lim="800000"/>
+                <a:headEnd/>
+                <a:tailEnd/>
+              </a14:hiddenLine>
+            </a:ext>
+          </a:extLst>
+        </p:spPr>
+      </p:pic>
+      <p:sp>
+        <p:nvSpPr>
+          <p:cNvPr id="95" name="TextBox 94"/>
+          <p:cNvSpPr txBox="1"/>
+          <p:nvPr/>
+        </p:nvSpPr>
+        <p:spPr>
+          <a:xfrm>
+            <a:off x="5021425" y="588601"/>
+            <a:ext cx="3513332" cy="1169551"/>
+          </a:xfrm>
+          <a:prstGeom prst="rect">
+            <a:avLst/>
+          </a:prstGeom>
+          <a:noFill/>
+        </p:spPr>
+        <p:txBody>
+          <a:bodyPr wrap="square" rtlCol="0">
+            <a:spAutoFit/>
+          </a:bodyPr>
+          <a:lstStyle/>
+          <a:p>
+            <a:r>
+              <a:rPr lang="en-US" sz="1000" b="1" dirty="0" smtClean="0">
+                <a:solidFill>
+                  <a:schemeClr val="tx2">
+                    <a:lumMod val="60000"/>
+                    <a:lumOff val="40000"/>
+                  </a:schemeClr>
+                </a:solidFill>
+                <a:latin typeface="Consolas" panose="020B0609020204030204" pitchFamily="49" charset="0"/>
+                <a:cs typeface="Consolas" panose="020B0609020204030204" pitchFamily="49" charset="0"/>
+              </a:rPr>
+              <a:t>Team    Name         Email             Comments</a:t>
+            </a:r>
+          </a:p>
+          <a:p>
+            <a:r>
+              <a:rPr lang="en-SG" sz="1000" dirty="0" smtClean="0">
+                <a:solidFill>
+                  <a:schemeClr val="tx2">
+                    <a:lumMod val="60000"/>
+                    <a:lumOff val="40000"/>
+                  </a:schemeClr>
+                </a:solidFill>
+                <a:latin typeface="Consolas" panose="020B0609020204030204" pitchFamily="49" charset="0"/>
+                <a:cs typeface="Consolas" panose="020B0609020204030204" pitchFamily="49" charset="0"/>
+              </a:rPr>
+              <a:t>Team 1  Tom Jacobs   tom@email.com	</a:t>
+            </a:r>
+          </a:p>
+          <a:p>
+            <a:r>
+              <a:rPr lang="en-SG" sz="1000" dirty="0" smtClean="0">
+                <a:solidFill>
+                  <a:schemeClr val="tx2">
+                    <a:lumMod val="60000"/>
+                    <a:lumOff val="40000"/>
+                  </a:schemeClr>
+                </a:solidFill>
+                <a:latin typeface="Consolas" panose="020B0609020204030204" pitchFamily="49" charset="0"/>
+                <a:cs typeface="Consolas" panose="020B0609020204030204" pitchFamily="49" charset="0"/>
+              </a:rPr>
+              <a:t>Team 1  Jean Wong    jean@email.com    Exchange</a:t>
+            </a:r>
+          </a:p>
+          <a:p>
+            <a:r>
+              <a:rPr lang="en-SG" sz="1000" dirty="0" smtClean="0">
+                <a:solidFill>
+                  <a:schemeClr val="tx2">
+                    <a:lumMod val="60000"/>
+                    <a:lumOff val="40000"/>
+                  </a:schemeClr>
+                </a:solidFill>
+                <a:latin typeface="Consolas" panose="020B0609020204030204" pitchFamily="49" charset="0"/>
+                <a:cs typeface="Consolas" panose="020B0609020204030204" pitchFamily="49" charset="0"/>
+              </a:rPr>
+              <a:t>Team 1  Ravi Kumar   ravi@email.com	</a:t>
+            </a:r>
+          </a:p>
+          <a:p>
+            <a:r>
+              <a:rPr lang="en-SG" sz="1000" dirty="0" smtClean="0">
+                <a:solidFill>
+                  <a:schemeClr val="tx2">
+                    <a:lumMod val="60000"/>
+                    <a:lumOff val="40000"/>
+                  </a:schemeClr>
+                </a:solidFill>
+                <a:latin typeface="Consolas" panose="020B0609020204030204" pitchFamily="49" charset="0"/>
+                <a:cs typeface="Consolas" panose="020B0609020204030204" pitchFamily="49" charset="0"/>
+              </a:rPr>
+              <a:t>Team 2  Chun Ling    ling@coolmai.com</a:t>
+            </a:r>
+            <a:r>
+              <a:rPr lang="en-SG" sz="1000" dirty="0">
+                <a:solidFill>
+                  <a:schemeClr val="tx2">
+                    <a:lumMod val="60000"/>
+                    <a:lumOff val="40000"/>
+                  </a:schemeClr>
+                </a:solidFill>
+                <a:latin typeface="Consolas" panose="020B0609020204030204" pitchFamily="49" charset="0"/>
+                <a:cs typeface="Consolas" panose="020B0609020204030204" pitchFamily="49" charset="0"/>
+              </a:rPr>
+              <a:t>	</a:t>
+            </a:r>
+          </a:p>
+          <a:p>
+            <a:r>
+              <a:rPr lang="en-SG" sz="1000" dirty="0">
+                <a:solidFill>
+                  <a:schemeClr val="tx2">
+                    <a:lumMod val="60000"/>
+                    <a:lumOff val="40000"/>
+                  </a:schemeClr>
+                </a:solidFill>
+                <a:latin typeface="Consolas" panose="020B0609020204030204" pitchFamily="49" charset="0"/>
+                <a:cs typeface="Consolas" panose="020B0609020204030204" pitchFamily="49" charset="0"/>
+              </a:rPr>
+              <a:t>Team </a:t>
+            </a:r>
+            <a:r>
+              <a:rPr lang="en-SG" sz="1000" dirty="0" smtClean="0">
+                <a:solidFill>
+                  <a:schemeClr val="tx2">
+                    <a:lumMod val="60000"/>
+                    <a:lumOff val="40000"/>
+                  </a:schemeClr>
+                </a:solidFill>
+                <a:latin typeface="Consolas" panose="020B0609020204030204" pitchFamily="49" charset="0"/>
+                <a:cs typeface="Consolas" panose="020B0609020204030204" pitchFamily="49" charset="0"/>
+              </a:rPr>
+              <a:t>2  Desmond Wu   desmond@email.com</a:t>
+            </a:r>
+          </a:p>
+          <a:p>
+            <a:r>
+              <a:rPr lang="en-US" sz="1000" dirty="0" smtClean="0">
+                <a:solidFill>
+                  <a:schemeClr val="tx2">
+                    <a:lumMod val="60000"/>
+                    <a:lumOff val="40000"/>
+                  </a:schemeClr>
+                </a:solidFill>
+                <a:latin typeface="Consolas" panose="020B0609020204030204" pitchFamily="49" charset="0"/>
+                <a:cs typeface="Consolas" panose="020B0609020204030204" pitchFamily="49" charset="0"/>
+              </a:rPr>
+              <a:t>Team 2  </a:t>
+            </a:r>
+            <a:r>
+              <a:rPr lang="en-US" sz="1000" dirty="0" err="1" smtClean="0">
+                <a:solidFill>
+                  <a:schemeClr val="tx2">
+                    <a:lumMod val="60000"/>
+                    <a:lumOff val="40000"/>
+                  </a:schemeClr>
+                </a:solidFill>
+                <a:latin typeface="Consolas" panose="020B0609020204030204" pitchFamily="49" charset="0"/>
+                <a:cs typeface="Consolas" panose="020B0609020204030204" pitchFamily="49" charset="0"/>
+              </a:rPr>
+              <a:t>Harsha</a:t>
+            </a:r>
+            <a:r>
+              <a:rPr lang="en-US" sz="1000" dirty="0" smtClean="0">
+                <a:solidFill>
+                  <a:schemeClr val="tx2">
+                    <a:lumMod val="60000"/>
+                    <a:lumOff val="40000"/>
+                  </a:schemeClr>
+                </a:solidFill>
+                <a:latin typeface="Consolas" panose="020B0609020204030204" pitchFamily="49" charset="0"/>
+                <a:cs typeface="Consolas" panose="020B0609020204030204" pitchFamily="49" charset="0"/>
+              </a:rPr>
+              <a:t> Silva harsha@school.com</a:t>
+            </a:r>
+            <a:endParaRPr lang="en-SG" sz="1000" dirty="0">
+              <a:solidFill>
+                <a:schemeClr val="tx2">
+                  <a:lumMod val="60000"/>
+                  <a:lumOff val="40000"/>
+                </a:schemeClr>
+              </a:solidFill>
+              <a:latin typeface="Consolas" panose="020B0609020204030204" pitchFamily="49" charset="0"/>
+              <a:cs typeface="Consolas" panose="020B0609020204030204" pitchFamily="49" charset="0"/>
+            </a:endParaRPr>
+          </a:p>
+        </p:txBody>
+      </p:sp>
+      <p:pic>
+        <p:nvPicPr>
+          <p:cNvPr id="100" name="Picture 9"/>
+          <p:cNvPicPr>
+            <a:picLocks noChangeAspect="1" noChangeArrowheads="1"/>
+          </p:cNvPicPr>
+          <p:nvPr/>
+        </p:nvPicPr>
+        <p:blipFill>
+          <a:blip r:embed="rId4">
+            <a:extLst>
+              <a:ext uri="{28A0092B-C50C-407E-A947-70E740481C1C}">
+                <a14:useLocalDpi xmlns:a14="http://schemas.microsoft.com/office/drawing/2010/main" val="0"/>
+              </a:ext>
+            </a:extLst>
+          </a:blip>
+          <a:srcRect/>
+          <a:stretch>
+            <a:fillRect/>
+          </a:stretch>
+        </p:blipFill>
+        <p:spPr bwMode="auto">
+          <a:xfrm>
+            <a:off x="372258" y="501452"/>
+            <a:ext cx="3803374" cy="1443797"/>
+          </a:xfrm>
+          <a:prstGeom prst="rect">
+            <a:avLst/>
+          </a:prstGeom>
+          <a:noFill/>
+          <a:ln>
+            <a:noFill/>
+          </a:ln>
+          <a:extLst>
+            <a:ext uri="{909E8E84-426E-40DD-AFC4-6F175D3DCCD1}">
+              <a14:hiddenFill xmlns:a14="http://schemas.microsoft.com/office/drawing/2010/main">
+                <a:solidFill>
+                  <a:schemeClr val="accent1"/>
+                </a:solidFill>
+              </a14:hiddenFill>
+            </a:ext>
+            <a:ext uri="{91240B29-F687-4F45-9708-019B960494DF}">
+              <a14:hiddenLine xmlns:a14="http://schemas.microsoft.com/office/drawing/2010/main" w="9525">
+                <a:solidFill>
+                  <a:schemeClr val="tx1"/>
+                </a:solidFill>
+                <a:miter lim="800000"/>
+                <a:headEnd/>
+                <a:tailEnd/>
+              </a14:hiddenLine>
+            </a:ext>
+          </a:extLst>
+        </p:spPr>
+      </p:pic>
+      <p:sp>
+        <p:nvSpPr>
+          <p:cNvPr id="9" name="Rectangle 8"/>
           <p:cNvSpPr/>
           <p:nvPr/>
         </p:nvSpPr>
         <p:spPr>
-          <a:xfrm rot="2949793">
-            <a:off x="2896139" y="1842707"/>
-            <a:ext cx="162059" cy="276989"/>
+          <a:xfrm>
+            <a:off x="7520781" y="1765664"/>
+            <a:ext cx="76200" cy="142875"/>
           </a:xfrm>
-          <a:custGeom>
+          <a:prstGeom prst="rect">
             <a:avLst/>
-            <a:gdLst>
-              <a:gd name="connsiteX0" fmla="*/ 0 w 228600"/>
-              <a:gd name="connsiteY0" fmla="*/ 222134 h 336434"/>
-              <a:gd name="connsiteX1" fmla="*/ 57150 w 228600"/>
-              <a:gd name="connsiteY1" fmla="*/ 222134 h 336434"/>
-              <a:gd name="connsiteX2" fmla="*/ 57150 w 228600"/>
-              <a:gd name="connsiteY2" fmla="*/ 0 h 336434"/>
-              <a:gd name="connsiteX3" fmla="*/ 171450 w 228600"/>
-              <a:gd name="connsiteY3" fmla="*/ 0 h 336434"/>
-              <a:gd name="connsiteX4" fmla="*/ 171450 w 228600"/>
-              <a:gd name="connsiteY4" fmla="*/ 222134 h 336434"/>
-              <a:gd name="connsiteX5" fmla="*/ 228600 w 228600"/>
-              <a:gd name="connsiteY5" fmla="*/ 222134 h 336434"/>
-              <a:gd name="connsiteX6" fmla="*/ 114300 w 228600"/>
-              <a:gd name="connsiteY6" fmla="*/ 336434 h 336434"/>
-              <a:gd name="connsiteX7" fmla="*/ 0 w 228600"/>
-              <a:gd name="connsiteY7" fmla="*/ 222134 h 336434"/>
-              <a:gd name="connsiteX0" fmla="*/ 0 w 228600"/>
-              <a:gd name="connsiteY0" fmla="*/ 324671 h 438971"/>
-              <a:gd name="connsiteX1" fmla="*/ 57150 w 228600"/>
-              <a:gd name="connsiteY1" fmla="*/ 324671 h 438971"/>
-              <a:gd name="connsiteX2" fmla="*/ 120592 w 228600"/>
-              <a:gd name="connsiteY2" fmla="*/ 0 h 438971"/>
-              <a:gd name="connsiteX3" fmla="*/ 171450 w 228600"/>
-              <a:gd name="connsiteY3" fmla="*/ 102537 h 438971"/>
-              <a:gd name="connsiteX4" fmla="*/ 171450 w 228600"/>
-              <a:gd name="connsiteY4" fmla="*/ 324671 h 438971"/>
-              <a:gd name="connsiteX5" fmla="*/ 228600 w 228600"/>
-              <a:gd name="connsiteY5" fmla="*/ 324671 h 438971"/>
-              <a:gd name="connsiteX6" fmla="*/ 114300 w 228600"/>
-              <a:gd name="connsiteY6" fmla="*/ 438971 h 438971"/>
-              <a:gd name="connsiteX7" fmla="*/ 0 w 228600"/>
-              <a:gd name="connsiteY7" fmla="*/ 324671 h 438971"/>
-              <a:gd name="connsiteX0" fmla="*/ 0 w 228600"/>
-              <a:gd name="connsiteY0" fmla="*/ 324671 h 438971"/>
-              <a:gd name="connsiteX1" fmla="*/ 57150 w 228600"/>
-              <a:gd name="connsiteY1" fmla="*/ 324671 h 438971"/>
-              <a:gd name="connsiteX2" fmla="*/ 120592 w 228600"/>
-              <a:gd name="connsiteY2" fmla="*/ 0 h 438971"/>
-              <a:gd name="connsiteX3" fmla="*/ 155841 w 228600"/>
-              <a:gd name="connsiteY3" fmla="*/ 4066 h 438971"/>
-              <a:gd name="connsiteX4" fmla="*/ 171450 w 228600"/>
-              <a:gd name="connsiteY4" fmla="*/ 324671 h 438971"/>
-              <a:gd name="connsiteX5" fmla="*/ 228600 w 228600"/>
-              <a:gd name="connsiteY5" fmla="*/ 324671 h 438971"/>
-              <a:gd name="connsiteX6" fmla="*/ 114300 w 228600"/>
-              <a:gd name="connsiteY6" fmla="*/ 438971 h 438971"/>
-              <a:gd name="connsiteX7" fmla="*/ 0 w 228600"/>
-              <a:gd name="connsiteY7" fmla="*/ 324671 h 438971"/>
-              <a:gd name="connsiteX0" fmla="*/ 0 w 228600"/>
-              <a:gd name="connsiteY0" fmla="*/ 324671 h 438971"/>
-              <a:gd name="connsiteX1" fmla="*/ 57150 w 228600"/>
-              <a:gd name="connsiteY1" fmla="*/ 324671 h 438971"/>
-              <a:gd name="connsiteX2" fmla="*/ 89026 w 228600"/>
-              <a:gd name="connsiteY2" fmla="*/ 163406 h 438971"/>
-              <a:gd name="connsiteX3" fmla="*/ 120592 w 228600"/>
-              <a:gd name="connsiteY3" fmla="*/ 0 h 438971"/>
-              <a:gd name="connsiteX4" fmla="*/ 155841 w 228600"/>
-              <a:gd name="connsiteY4" fmla="*/ 4066 h 438971"/>
-              <a:gd name="connsiteX5" fmla="*/ 171450 w 228600"/>
-              <a:gd name="connsiteY5" fmla="*/ 324671 h 438971"/>
-              <a:gd name="connsiteX6" fmla="*/ 228600 w 228600"/>
-              <a:gd name="connsiteY6" fmla="*/ 324671 h 438971"/>
-              <a:gd name="connsiteX7" fmla="*/ 114300 w 228600"/>
-              <a:gd name="connsiteY7" fmla="*/ 438971 h 438971"/>
-              <a:gd name="connsiteX8" fmla="*/ 0 w 228600"/>
-              <a:gd name="connsiteY8" fmla="*/ 324671 h 438971"/>
-              <a:gd name="connsiteX0" fmla="*/ 0 w 228600"/>
-              <a:gd name="connsiteY0" fmla="*/ 324671 h 438971"/>
-              <a:gd name="connsiteX1" fmla="*/ 57150 w 228600"/>
-              <a:gd name="connsiteY1" fmla="*/ 324671 h 438971"/>
-              <a:gd name="connsiteX2" fmla="*/ 107866 w 228600"/>
-              <a:gd name="connsiteY2" fmla="*/ 167099 h 438971"/>
-              <a:gd name="connsiteX3" fmla="*/ 120592 w 228600"/>
-              <a:gd name="connsiteY3" fmla="*/ 0 h 438971"/>
-              <a:gd name="connsiteX4" fmla="*/ 155841 w 228600"/>
-              <a:gd name="connsiteY4" fmla="*/ 4066 h 438971"/>
-              <a:gd name="connsiteX5" fmla="*/ 171450 w 228600"/>
-              <a:gd name="connsiteY5" fmla="*/ 324671 h 438971"/>
-              <a:gd name="connsiteX6" fmla="*/ 228600 w 228600"/>
-              <a:gd name="connsiteY6" fmla="*/ 324671 h 438971"/>
-              <a:gd name="connsiteX7" fmla="*/ 114300 w 228600"/>
-              <a:gd name="connsiteY7" fmla="*/ 438971 h 438971"/>
-              <a:gd name="connsiteX8" fmla="*/ 0 w 228600"/>
-              <a:gd name="connsiteY8" fmla="*/ 324671 h 438971"/>
-              <a:gd name="connsiteX0" fmla="*/ 0 w 228600"/>
-              <a:gd name="connsiteY0" fmla="*/ 324671 h 438971"/>
-              <a:gd name="connsiteX1" fmla="*/ 57150 w 228600"/>
-              <a:gd name="connsiteY1" fmla="*/ 324671 h 438971"/>
-              <a:gd name="connsiteX2" fmla="*/ 107866 w 228600"/>
-              <a:gd name="connsiteY2" fmla="*/ 167099 h 438971"/>
-              <a:gd name="connsiteX3" fmla="*/ 120592 w 228600"/>
-              <a:gd name="connsiteY3" fmla="*/ 0 h 438971"/>
-              <a:gd name="connsiteX4" fmla="*/ 155841 w 228600"/>
-              <a:gd name="connsiteY4" fmla="*/ 4066 h 438971"/>
-              <a:gd name="connsiteX5" fmla="*/ 160293 w 228600"/>
-              <a:gd name="connsiteY5" fmla="*/ 168347 h 438971"/>
-              <a:gd name="connsiteX6" fmla="*/ 171450 w 228600"/>
-              <a:gd name="connsiteY6" fmla="*/ 324671 h 438971"/>
-              <a:gd name="connsiteX7" fmla="*/ 228600 w 228600"/>
-              <a:gd name="connsiteY7" fmla="*/ 324671 h 438971"/>
-              <a:gd name="connsiteX8" fmla="*/ 114300 w 228600"/>
-              <a:gd name="connsiteY8" fmla="*/ 438971 h 438971"/>
-              <a:gd name="connsiteX9" fmla="*/ 0 w 228600"/>
-              <a:gd name="connsiteY9" fmla="*/ 324671 h 438971"/>
-              <a:gd name="connsiteX0" fmla="*/ 0 w 228600"/>
-              <a:gd name="connsiteY0" fmla="*/ 324671 h 438971"/>
-              <a:gd name="connsiteX1" fmla="*/ 57150 w 228600"/>
-              <a:gd name="connsiteY1" fmla="*/ 324671 h 438971"/>
-              <a:gd name="connsiteX2" fmla="*/ 107866 w 228600"/>
-              <a:gd name="connsiteY2" fmla="*/ 167099 h 438971"/>
-              <a:gd name="connsiteX3" fmla="*/ 120592 w 228600"/>
-              <a:gd name="connsiteY3" fmla="*/ 0 h 438971"/>
-              <a:gd name="connsiteX4" fmla="*/ 155841 w 228600"/>
-              <a:gd name="connsiteY4" fmla="*/ 4066 h 438971"/>
-              <a:gd name="connsiteX5" fmla="*/ 178889 w 228600"/>
-              <a:gd name="connsiteY5" fmla="*/ 168682 h 438971"/>
-              <a:gd name="connsiteX6" fmla="*/ 171450 w 228600"/>
-              <a:gd name="connsiteY6" fmla="*/ 324671 h 438971"/>
-              <a:gd name="connsiteX7" fmla="*/ 228600 w 228600"/>
-              <a:gd name="connsiteY7" fmla="*/ 324671 h 438971"/>
-              <a:gd name="connsiteX8" fmla="*/ 114300 w 228600"/>
-              <a:gd name="connsiteY8" fmla="*/ 438971 h 438971"/>
-              <a:gd name="connsiteX9" fmla="*/ 0 w 228600"/>
-              <a:gd name="connsiteY9" fmla="*/ 324671 h 438971"/>
-              <a:gd name="connsiteX0" fmla="*/ 0 w 228600"/>
-              <a:gd name="connsiteY0" fmla="*/ 402256 h 516556"/>
-              <a:gd name="connsiteX1" fmla="*/ 57150 w 228600"/>
-              <a:gd name="connsiteY1" fmla="*/ 402256 h 516556"/>
-              <a:gd name="connsiteX2" fmla="*/ 107866 w 228600"/>
-              <a:gd name="connsiteY2" fmla="*/ 244684 h 516556"/>
-              <a:gd name="connsiteX3" fmla="*/ 96374 w 228600"/>
-              <a:gd name="connsiteY3" fmla="*/ 0 h 516556"/>
-              <a:gd name="connsiteX4" fmla="*/ 155841 w 228600"/>
-              <a:gd name="connsiteY4" fmla="*/ 81651 h 516556"/>
-              <a:gd name="connsiteX5" fmla="*/ 178889 w 228600"/>
-              <a:gd name="connsiteY5" fmla="*/ 246267 h 516556"/>
-              <a:gd name="connsiteX6" fmla="*/ 171450 w 228600"/>
-              <a:gd name="connsiteY6" fmla="*/ 402256 h 516556"/>
-              <a:gd name="connsiteX7" fmla="*/ 228600 w 228600"/>
-              <a:gd name="connsiteY7" fmla="*/ 402256 h 516556"/>
-              <a:gd name="connsiteX8" fmla="*/ 114300 w 228600"/>
-              <a:gd name="connsiteY8" fmla="*/ 516556 h 516556"/>
-              <a:gd name="connsiteX9" fmla="*/ 0 w 228600"/>
-              <a:gd name="connsiteY9" fmla="*/ 402256 h 516556"/>
-              <a:gd name="connsiteX0" fmla="*/ 0 w 228600"/>
-              <a:gd name="connsiteY0" fmla="*/ 402256 h 516556"/>
-              <a:gd name="connsiteX1" fmla="*/ 57150 w 228600"/>
-              <a:gd name="connsiteY1" fmla="*/ 402256 h 516556"/>
-              <a:gd name="connsiteX2" fmla="*/ 107866 w 228600"/>
-              <a:gd name="connsiteY2" fmla="*/ 244684 h 516556"/>
-              <a:gd name="connsiteX3" fmla="*/ 96374 w 228600"/>
-              <a:gd name="connsiteY3" fmla="*/ 0 h 516556"/>
-              <a:gd name="connsiteX4" fmla="*/ 124661 w 228600"/>
-              <a:gd name="connsiteY4" fmla="*/ 1196 h 516556"/>
-              <a:gd name="connsiteX5" fmla="*/ 178889 w 228600"/>
-              <a:gd name="connsiteY5" fmla="*/ 246267 h 516556"/>
-              <a:gd name="connsiteX6" fmla="*/ 171450 w 228600"/>
-              <a:gd name="connsiteY6" fmla="*/ 402256 h 516556"/>
-              <a:gd name="connsiteX7" fmla="*/ 228600 w 228600"/>
-              <a:gd name="connsiteY7" fmla="*/ 402256 h 516556"/>
-              <a:gd name="connsiteX8" fmla="*/ 114300 w 228600"/>
-              <a:gd name="connsiteY8" fmla="*/ 516556 h 516556"/>
-              <a:gd name="connsiteX9" fmla="*/ 0 w 228600"/>
-              <a:gd name="connsiteY9" fmla="*/ 402256 h 516556"/>
-              <a:gd name="connsiteX0" fmla="*/ 0 w 228600"/>
-              <a:gd name="connsiteY0" fmla="*/ 402256 h 516556"/>
-              <a:gd name="connsiteX1" fmla="*/ 57150 w 228600"/>
-              <a:gd name="connsiteY1" fmla="*/ 402256 h 516556"/>
-              <a:gd name="connsiteX2" fmla="*/ 107866 w 228600"/>
-              <a:gd name="connsiteY2" fmla="*/ 244684 h 516556"/>
-              <a:gd name="connsiteX3" fmla="*/ 96374 w 228600"/>
-              <a:gd name="connsiteY3" fmla="*/ 0 h 516556"/>
-              <a:gd name="connsiteX4" fmla="*/ 124661 w 228600"/>
-              <a:gd name="connsiteY4" fmla="*/ 1196 h 516556"/>
-              <a:gd name="connsiteX5" fmla="*/ 178889 w 228600"/>
-              <a:gd name="connsiteY5" fmla="*/ 246267 h 516556"/>
-              <a:gd name="connsiteX6" fmla="*/ 171450 w 228600"/>
-              <a:gd name="connsiteY6" fmla="*/ 402256 h 516556"/>
-              <a:gd name="connsiteX7" fmla="*/ 228600 w 228600"/>
-              <a:gd name="connsiteY7" fmla="*/ 402256 h 516556"/>
-              <a:gd name="connsiteX8" fmla="*/ 114300 w 228600"/>
-              <a:gd name="connsiteY8" fmla="*/ 516556 h 516556"/>
-              <a:gd name="connsiteX9" fmla="*/ 0 w 228600"/>
-              <a:gd name="connsiteY9" fmla="*/ 402256 h 516556"/>
-              <a:gd name="connsiteX0" fmla="*/ 0 w 228600"/>
-              <a:gd name="connsiteY0" fmla="*/ 402256 h 516556"/>
-              <a:gd name="connsiteX1" fmla="*/ 57150 w 228600"/>
-              <a:gd name="connsiteY1" fmla="*/ 402256 h 516556"/>
-              <a:gd name="connsiteX2" fmla="*/ 107866 w 228600"/>
-              <a:gd name="connsiteY2" fmla="*/ 244684 h 516556"/>
-              <a:gd name="connsiteX3" fmla="*/ 96374 w 228600"/>
-              <a:gd name="connsiteY3" fmla="*/ 0 h 516556"/>
-              <a:gd name="connsiteX4" fmla="*/ 124661 w 228600"/>
-              <a:gd name="connsiteY4" fmla="*/ 1196 h 516556"/>
-              <a:gd name="connsiteX5" fmla="*/ 178889 w 228600"/>
-              <a:gd name="connsiteY5" fmla="*/ 246267 h 516556"/>
-              <a:gd name="connsiteX6" fmla="*/ 171450 w 228600"/>
-              <a:gd name="connsiteY6" fmla="*/ 402256 h 516556"/>
-              <a:gd name="connsiteX7" fmla="*/ 228600 w 228600"/>
-              <a:gd name="connsiteY7" fmla="*/ 402256 h 516556"/>
-              <a:gd name="connsiteX8" fmla="*/ 114300 w 228600"/>
-              <a:gd name="connsiteY8" fmla="*/ 516556 h 516556"/>
-              <a:gd name="connsiteX9" fmla="*/ 0 w 228600"/>
-              <a:gd name="connsiteY9" fmla="*/ 402256 h 516556"/>
-              <a:gd name="connsiteX0" fmla="*/ 0 w 228600"/>
-              <a:gd name="connsiteY0" fmla="*/ 413852 h 528152"/>
-              <a:gd name="connsiteX1" fmla="*/ 57150 w 228600"/>
-              <a:gd name="connsiteY1" fmla="*/ 413852 h 528152"/>
-              <a:gd name="connsiteX2" fmla="*/ 107866 w 228600"/>
-              <a:gd name="connsiteY2" fmla="*/ 256280 h 528152"/>
-              <a:gd name="connsiteX3" fmla="*/ 96374 w 228600"/>
-              <a:gd name="connsiteY3" fmla="*/ 11596 h 528152"/>
-              <a:gd name="connsiteX4" fmla="*/ 91653 w 228600"/>
-              <a:gd name="connsiteY4" fmla="*/ 0 h 528152"/>
-              <a:gd name="connsiteX5" fmla="*/ 178889 w 228600"/>
-              <a:gd name="connsiteY5" fmla="*/ 257863 h 528152"/>
-              <a:gd name="connsiteX6" fmla="*/ 171450 w 228600"/>
-              <a:gd name="connsiteY6" fmla="*/ 413852 h 528152"/>
-              <a:gd name="connsiteX7" fmla="*/ 228600 w 228600"/>
-              <a:gd name="connsiteY7" fmla="*/ 413852 h 528152"/>
-              <a:gd name="connsiteX8" fmla="*/ 114300 w 228600"/>
-              <a:gd name="connsiteY8" fmla="*/ 528152 h 528152"/>
-              <a:gd name="connsiteX9" fmla="*/ 0 w 228600"/>
-              <a:gd name="connsiteY9" fmla="*/ 413852 h 528152"/>
-            </a:gdLst>
-            <a:ahLst/>
-            <a:cxnLst>
-              <a:cxn ang="0">
-                <a:pos x="connsiteX0" y="connsiteY0"/>
-              </a:cxn>
-              <a:cxn ang="0">
-                <a:pos x="connsiteX1" y="connsiteY1"/>
-              </a:cxn>
-              <a:cxn ang="0">
-                <a:pos x="connsiteX2" y="connsiteY2"/>
-              </a:cxn>
-              <a:cxn ang="0">
-                <a:pos x="connsiteX3" y="connsiteY3"/>
-              </a:cxn>
-              <a:cxn ang="0">
-                <a:pos x="connsiteX4" y="connsiteY4"/>
-              </a:cxn>
-              <a:cxn ang="0">
-                <a:pos x="connsiteX5" y="connsiteY5"/>
-              </a:cxn>
-              <a:cxn ang="0">
-                <a:pos x="connsiteX6" y="connsiteY6"/>
-              </a:cxn>
-              <a:cxn ang="0">
-                <a:pos x="connsiteX7" y="connsiteY7"/>
-              </a:cxn>
-              <a:cxn ang="0">
-                <a:pos x="connsiteX8" y="connsiteY8"/>
-              </a:cxn>
-              <a:cxn ang="0">
-                <a:pos x="connsiteX9" y="connsiteY9"/>
-              </a:cxn>
-            </a:cxnLst>
-            <a:rect l="l" t="t" r="r" b="b"/>
-            <a:pathLst>
-              <a:path w="228600" h="528152">
-                <a:moveTo>
-                  <a:pt x="0" y="413852"/>
-                </a:moveTo>
-                <a:lnTo>
-                  <a:pt x="57150" y="413852"/>
-                </a:lnTo>
-                <a:cubicBezTo>
-                  <a:pt x="75128" y="387590"/>
-                  <a:pt x="101329" y="323323"/>
-                  <a:pt x="107866" y="256280"/>
-                </a:cubicBezTo>
-                <a:cubicBezTo>
-                  <a:pt x="114403" y="189237"/>
-                  <a:pt x="93575" y="52177"/>
-                  <a:pt x="96374" y="11596"/>
-                </a:cubicBezTo>
-                <a:lnTo>
-                  <a:pt x="91653" y="0"/>
-                </a:lnTo>
-                <a:cubicBezTo>
-                  <a:pt x="105406" y="41045"/>
-                  <a:pt x="165590" y="188888"/>
-                  <a:pt x="178889" y="257863"/>
-                </a:cubicBezTo>
-                <a:cubicBezTo>
-                  <a:pt x="192188" y="326838"/>
-                  <a:pt x="163165" y="387854"/>
-                  <a:pt x="171450" y="413852"/>
-                </a:cubicBezTo>
-                <a:lnTo>
-                  <a:pt x="228600" y="413852"/>
-                </a:lnTo>
-                <a:lnTo>
-                  <a:pt x="114300" y="528152"/>
-                </a:lnTo>
-                <a:lnTo>
-                  <a:pt x="0" y="413852"/>
-                </a:lnTo>
-                <a:close/>
-              </a:path>
-            </a:pathLst>
-          </a:custGeom>
-          <a:solidFill>
-            <a:srgbClr val="FFFFDD"/>
-          </a:solidFill>
-          <a:ln w="9525">
-            <a:solidFill>
-              <a:schemeClr val="bg1">
-                <a:lumMod val="50000"/>
-              </a:schemeClr>
-            </a:solidFill>
+          </a:prstGeom>
+          <a:noFill/>
+          <a:ln>
+            <a:noFill/>
           </a:ln>
-          <a:effectLst/>
         </p:spPr>
         <p:style>
           <a:lnRef idx="2">
@@ -4740,25 +6101,32 @@
           </a:fontRef>
         </p:style>
         <p:txBody>
-          <a:bodyPr wrap="square" lIns="91429" tIns="45715" rIns="91429" bIns="45715" rtlCol="0" anchor="ctr">
-            <a:spAutoFit/>
-          </a:bodyPr>
+          <a:bodyPr rtlCol="0" anchor="ctr"/>
           <a:lstStyle/>
           <a:p>
-            <a:pPr marL="228600"/>
-            <a:endParaRPr lang="en-US" sz="1200" dirty="0" smtClean="0">
-              <a:solidFill>
-                <a:schemeClr val="tx1"/>
-              </a:solidFill>
-            </a:endParaRPr>
+            <a:pPr algn="ctr"/>
+            <a:endParaRPr lang="en-SG"/>
           </a:p>
         </p:txBody>
       </p:sp>
     </p:spTree>
+    <p:extLst>
+      <p:ext uri="{BB962C8B-B14F-4D97-AF65-F5344CB8AC3E}">
+        <p14:creationId xmlns:p14="http://schemas.microsoft.com/office/powerpoint/2010/main" val="632949669"/>
+      </p:ext>
+    </p:extLst>
   </p:cSld>
   <p:clrMapOvr>
     <a:masterClrMapping/>
   </p:clrMapOvr>
+  <mc:AlternateContent xmlns:mc="http://schemas.openxmlformats.org/markup-compatibility/2006">
+    <mc:Choice xmlns:p14="http://schemas.microsoft.com/office/powerpoint/2010/main" Requires="p14">
+      <p:transition spd="slow" p14:dur="2000" advTm="2000"/>
+    </mc:Choice>
+    <mc:Fallback>
+      <p:transition spd="slow" advTm="2000"/>
+    </mc:Fallback>
+  </mc:AlternateContent>
   <p:timing>
     <p:tnLst>
       <p:par>

</xml_diff>